<commit_message>
More on staging and walking around
</commit_message>
<xml_diff>
--- a/git101.pptx
+++ b/git101.pptx
@@ -13,10 +13,15 @@
     <p:sldId id="261" r:id="rId7"/>
     <p:sldId id="262" r:id="rId8"/>
     <p:sldId id="263" r:id="rId9"/>
-    <p:sldId id="264" r:id="rId10"/>
-    <p:sldId id="265" r:id="rId11"/>
-    <p:sldId id="266" r:id="rId12"/>
-    <p:sldId id="267" r:id="rId13"/>
+    <p:sldId id="270" r:id="rId10"/>
+    <p:sldId id="269" r:id="rId11"/>
+    <p:sldId id="271" r:id="rId12"/>
+    <p:sldId id="272" r:id="rId13"/>
+    <p:sldId id="264" r:id="rId14"/>
+    <p:sldId id="265" r:id="rId15"/>
+    <p:sldId id="266" r:id="rId16"/>
+    <p:sldId id="267" r:id="rId17"/>
+    <p:sldId id="268" r:id="rId18"/>
   </p:sldIdLst>
   <p:sldSz cx="12192000" cy="6858000"/>
   <p:notesSz cx="6858000" cy="9144000"/>
@@ -115,6 +120,11 @@
       </a:defRPr>
     </a:lvl9pPr>
   </p:defaultTextStyle>
+  <p:extLst>
+    <p:ext uri="{EFAFB233-063F-42B5-8137-9DF3F51BA10A}">
+      <p15:sldGuideLst xmlns:p15="http://schemas.microsoft.com/office/powerpoint/2012/main"/>
+    </p:ext>
+  </p:extLst>
 </p:presentation>
 </file>
 
@@ -249,7 +259,7 @@
           <a:p>
             <a:fld id="{7DBCE0E9-B642-4654-B380-6C7D8CA0540E}" type="datetimeFigureOut">
               <a:rPr lang="en-US" smtClean="0"/>
-              <a:t>01-Nov-15</a:t>
+              <a:t>09-Jan-16</a:t>
             </a:fld>
             <a:endParaRPr lang="en-US"/>
           </a:p>
@@ -419,7 +429,7 @@
           <a:p>
             <a:fld id="{7DBCE0E9-B642-4654-B380-6C7D8CA0540E}" type="datetimeFigureOut">
               <a:rPr lang="en-US" smtClean="0"/>
-              <a:t>01-Nov-15</a:t>
+              <a:t>09-Jan-16</a:t>
             </a:fld>
             <a:endParaRPr lang="en-US"/>
           </a:p>
@@ -599,7 +609,7 @@
           <a:p>
             <a:fld id="{7DBCE0E9-B642-4654-B380-6C7D8CA0540E}" type="datetimeFigureOut">
               <a:rPr lang="en-US" smtClean="0"/>
-              <a:t>01-Nov-15</a:t>
+              <a:t>09-Jan-16</a:t>
             </a:fld>
             <a:endParaRPr lang="en-US"/>
           </a:p>
@@ -769,7 +779,7 @@
           <a:p>
             <a:fld id="{7DBCE0E9-B642-4654-B380-6C7D8CA0540E}" type="datetimeFigureOut">
               <a:rPr lang="en-US" smtClean="0"/>
-              <a:t>01-Nov-15</a:t>
+              <a:t>09-Jan-16</a:t>
             </a:fld>
             <a:endParaRPr lang="en-US"/>
           </a:p>
@@ -1015,7 +1025,7 @@
           <a:p>
             <a:fld id="{7DBCE0E9-B642-4654-B380-6C7D8CA0540E}" type="datetimeFigureOut">
               <a:rPr lang="en-US" smtClean="0"/>
-              <a:t>01-Nov-15</a:t>
+              <a:t>09-Jan-16</a:t>
             </a:fld>
             <a:endParaRPr lang="en-US"/>
           </a:p>
@@ -1247,7 +1257,7 @@
           <a:p>
             <a:fld id="{7DBCE0E9-B642-4654-B380-6C7D8CA0540E}" type="datetimeFigureOut">
               <a:rPr lang="en-US" smtClean="0"/>
-              <a:t>01-Nov-15</a:t>
+              <a:t>09-Jan-16</a:t>
             </a:fld>
             <a:endParaRPr lang="en-US"/>
           </a:p>
@@ -1614,7 +1624,7 @@
           <a:p>
             <a:fld id="{7DBCE0E9-B642-4654-B380-6C7D8CA0540E}" type="datetimeFigureOut">
               <a:rPr lang="en-US" smtClean="0"/>
-              <a:t>01-Nov-15</a:t>
+              <a:t>09-Jan-16</a:t>
             </a:fld>
             <a:endParaRPr lang="en-US"/>
           </a:p>
@@ -1732,7 +1742,7 @@
           <a:p>
             <a:fld id="{7DBCE0E9-B642-4654-B380-6C7D8CA0540E}" type="datetimeFigureOut">
               <a:rPr lang="en-US" smtClean="0"/>
-              <a:t>01-Nov-15</a:t>
+              <a:t>09-Jan-16</a:t>
             </a:fld>
             <a:endParaRPr lang="en-US"/>
           </a:p>
@@ -1827,7 +1837,7 @@
           <a:p>
             <a:fld id="{7DBCE0E9-B642-4654-B380-6C7D8CA0540E}" type="datetimeFigureOut">
               <a:rPr lang="en-US" smtClean="0"/>
-              <a:t>01-Nov-15</a:t>
+              <a:t>09-Jan-16</a:t>
             </a:fld>
             <a:endParaRPr lang="en-US"/>
           </a:p>
@@ -2104,7 +2114,7 @@
           <a:p>
             <a:fld id="{7DBCE0E9-B642-4654-B380-6C7D8CA0540E}" type="datetimeFigureOut">
               <a:rPr lang="en-US" smtClean="0"/>
-              <a:t>01-Nov-15</a:t>
+              <a:t>09-Jan-16</a:t>
             </a:fld>
             <a:endParaRPr lang="en-US"/>
           </a:p>
@@ -2357,7 +2367,7 @@
           <a:p>
             <a:fld id="{7DBCE0E9-B642-4654-B380-6C7D8CA0540E}" type="datetimeFigureOut">
               <a:rPr lang="en-US" smtClean="0"/>
-              <a:t>01-Nov-15</a:t>
+              <a:t>09-Jan-16</a:t>
             </a:fld>
             <a:endParaRPr lang="en-US"/>
           </a:p>
@@ -2570,7 +2580,7 @@
           <a:p>
             <a:fld id="{7DBCE0E9-B642-4654-B380-6C7D8CA0540E}" type="datetimeFigureOut">
               <a:rPr lang="en-US" smtClean="0"/>
-              <a:t>01-Nov-15</a:t>
+              <a:t>09-Jan-16</a:t>
             </a:fld>
             <a:endParaRPr lang="en-US"/>
           </a:p>
@@ -3135,13 +3145,6 @@
   <p:clrMapOvr>
     <a:masterClrMapping/>
   </p:clrMapOvr>
-  <p:timing>
-    <p:tnLst>
-      <p:par>
-        <p:cTn id="1" dur="indefinite" restart="never" nodeType="tmRoot"/>
-      </p:par>
-    </p:tnLst>
-  </p:timing>
 </p:sld>
 </file>
 
@@ -3171,6 +3174,2999 @@
         <p:spPr>
           <a:xfrm>
             <a:off x="481449" y="393032"/>
+            <a:ext cx="4436151" cy="769441"/>
+          </a:xfrm>
+          <a:prstGeom prst="rect">
+            <a:avLst/>
+          </a:prstGeom>
+          <a:noFill/>
+        </p:spPr>
+        <p:txBody>
+          <a:bodyPr wrap="none" rtlCol="0">
+            <a:spAutoFit/>
+          </a:bodyPr>
+          <a:lstStyle/>
+          <a:p>
+            <a:r>
+              <a:rPr lang="en-US" sz="4400" dirty="0" smtClean="0"/>
+              <a:t>Concept of staging</a:t>
+            </a:r>
+            <a:endParaRPr lang="en-US" sz="4400" dirty="0"/>
+          </a:p>
+        </p:txBody>
+      </p:sp>
+      <p:sp>
+        <p:nvSpPr>
+          <p:cNvPr id="2" name="Rectangle 1"/>
+          <p:cNvSpPr/>
+          <p:nvPr/>
+        </p:nvSpPr>
+        <p:spPr>
+          <a:xfrm>
+            <a:off x="569494" y="1949115"/>
+            <a:ext cx="2237874" cy="4531896"/>
+          </a:xfrm>
+          <a:prstGeom prst="rect">
+            <a:avLst/>
+          </a:prstGeom>
+        </p:spPr>
+        <p:style>
+          <a:lnRef idx="2">
+            <a:schemeClr val="accent1">
+              <a:shade val="50000"/>
+            </a:schemeClr>
+          </a:lnRef>
+          <a:fillRef idx="1">
+            <a:schemeClr val="accent1"/>
+          </a:fillRef>
+          <a:effectRef idx="0">
+            <a:schemeClr val="accent1"/>
+          </a:effectRef>
+          <a:fontRef idx="minor">
+            <a:schemeClr val="lt1"/>
+          </a:fontRef>
+        </p:style>
+        <p:txBody>
+          <a:bodyPr rtlCol="0" anchor="ctr"/>
+          <a:lstStyle/>
+          <a:p>
+            <a:pPr algn="ctr"/>
+            <a:endParaRPr lang="en-US"/>
+          </a:p>
+        </p:txBody>
+      </p:sp>
+      <p:sp>
+        <p:nvSpPr>
+          <p:cNvPr id="4" name="Rectangle 3"/>
+          <p:cNvSpPr/>
+          <p:nvPr/>
+        </p:nvSpPr>
+        <p:spPr>
+          <a:xfrm>
+            <a:off x="4652211" y="1949114"/>
+            <a:ext cx="2237874" cy="3954379"/>
+          </a:xfrm>
+          <a:prstGeom prst="rect">
+            <a:avLst/>
+          </a:prstGeom>
+        </p:spPr>
+        <p:style>
+          <a:lnRef idx="2">
+            <a:schemeClr val="accent1">
+              <a:shade val="50000"/>
+            </a:schemeClr>
+          </a:lnRef>
+          <a:fillRef idx="1">
+            <a:schemeClr val="accent1"/>
+          </a:fillRef>
+          <a:effectRef idx="0">
+            <a:schemeClr val="accent1"/>
+          </a:effectRef>
+          <a:fontRef idx="minor">
+            <a:schemeClr val="lt1"/>
+          </a:fontRef>
+        </p:style>
+        <p:txBody>
+          <a:bodyPr rtlCol="0" anchor="ctr"/>
+          <a:lstStyle/>
+          <a:p>
+            <a:pPr algn="ctr"/>
+            <a:endParaRPr lang="en-US"/>
+          </a:p>
+        </p:txBody>
+      </p:sp>
+      <p:sp>
+        <p:nvSpPr>
+          <p:cNvPr id="6" name="Rectangle 5"/>
+          <p:cNvSpPr/>
+          <p:nvPr/>
+        </p:nvSpPr>
+        <p:spPr>
+          <a:xfrm>
+            <a:off x="8911390" y="1949113"/>
+            <a:ext cx="2237874" cy="4531898"/>
+          </a:xfrm>
+          <a:prstGeom prst="rect">
+            <a:avLst/>
+          </a:prstGeom>
+        </p:spPr>
+        <p:style>
+          <a:lnRef idx="2">
+            <a:schemeClr val="accent1">
+              <a:shade val="50000"/>
+            </a:schemeClr>
+          </a:lnRef>
+          <a:fillRef idx="1">
+            <a:schemeClr val="accent1"/>
+          </a:fillRef>
+          <a:effectRef idx="0">
+            <a:schemeClr val="accent1"/>
+          </a:effectRef>
+          <a:fontRef idx="minor">
+            <a:schemeClr val="lt1"/>
+          </a:fontRef>
+        </p:style>
+        <p:txBody>
+          <a:bodyPr rtlCol="0" anchor="ctr"/>
+          <a:lstStyle/>
+          <a:p>
+            <a:pPr algn="ctr"/>
+            <a:endParaRPr lang="en-US"/>
+          </a:p>
+        </p:txBody>
+      </p:sp>
+      <p:sp>
+        <p:nvSpPr>
+          <p:cNvPr id="3" name="TextBox 2"/>
+          <p:cNvSpPr txBox="1"/>
+          <p:nvPr/>
+        </p:nvSpPr>
+        <p:spPr>
+          <a:xfrm>
+            <a:off x="481449" y="1499936"/>
+            <a:ext cx="2369431" cy="369332"/>
+          </a:xfrm>
+          <a:prstGeom prst="rect">
+            <a:avLst/>
+          </a:prstGeom>
+          <a:noFill/>
+        </p:spPr>
+        <p:txBody>
+          <a:bodyPr wrap="none" rtlCol="0">
+            <a:spAutoFit/>
+          </a:bodyPr>
+          <a:lstStyle/>
+          <a:p>
+            <a:r>
+              <a:rPr lang="en-US" dirty="0" smtClean="0"/>
+              <a:t>Local working directory</a:t>
+            </a:r>
+            <a:endParaRPr lang="en-US" dirty="0"/>
+          </a:p>
+        </p:txBody>
+      </p:sp>
+      <p:sp>
+        <p:nvSpPr>
+          <p:cNvPr id="7" name="TextBox 6"/>
+          <p:cNvSpPr txBox="1"/>
+          <p:nvPr/>
+        </p:nvSpPr>
+        <p:spPr>
+          <a:xfrm>
+            <a:off x="4640180" y="1499936"/>
+            <a:ext cx="2042867" cy="369332"/>
+          </a:xfrm>
+          <a:prstGeom prst="rect">
+            <a:avLst/>
+          </a:prstGeom>
+          <a:noFill/>
+        </p:spPr>
+        <p:txBody>
+          <a:bodyPr wrap="none" rtlCol="0">
+            <a:spAutoFit/>
+          </a:bodyPr>
+          <a:lstStyle/>
+          <a:p>
+            <a:r>
+              <a:rPr lang="en-US" dirty="0" smtClean="0"/>
+              <a:t>Staging area / Index</a:t>
+            </a:r>
+            <a:endParaRPr lang="en-US" dirty="0"/>
+          </a:p>
+        </p:txBody>
+      </p:sp>
+      <p:sp>
+        <p:nvSpPr>
+          <p:cNvPr id="10" name="TextBox 9"/>
+          <p:cNvSpPr txBox="1"/>
+          <p:nvPr/>
+        </p:nvSpPr>
+        <p:spPr>
+          <a:xfrm>
+            <a:off x="9240947" y="1499936"/>
+            <a:ext cx="1189428" cy="369332"/>
+          </a:xfrm>
+          <a:prstGeom prst="rect">
+            <a:avLst/>
+          </a:prstGeom>
+          <a:noFill/>
+        </p:spPr>
+        <p:txBody>
+          <a:bodyPr wrap="none" rtlCol="0">
+            <a:spAutoFit/>
+          </a:bodyPr>
+          <a:lstStyle/>
+          <a:p>
+            <a:r>
+              <a:rPr lang="en-US" dirty="0" smtClean="0"/>
+              <a:t>Repository</a:t>
+            </a:r>
+            <a:endParaRPr lang="en-US" dirty="0"/>
+          </a:p>
+        </p:txBody>
+      </p:sp>
+      <p:sp>
+        <p:nvSpPr>
+          <p:cNvPr id="11" name="Right Arrow 10"/>
+          <p:cNvSpPr/>
+          <p:nvPr/>
+        </p:nvSpPr>
+        <p:spPr>
+          <a:xfrm>
+            <a:off x="2807368" y="2775284"/>
+            <a:ext cx="1844843" cy="529389"/>
+          </a:xfrm>
+          <a:prstGeom prst="rightArrow">
+            <a:avLst/>
+          </a:prstGeom>
+        </p:spPr>
+        <p:style>
+          <a:lnRef idx="2">
+            <a:schemeClr val="accent1">
+              <a:shade val="50000"/>
+            </a:schemeClr>
+          </a:lnRef>
+          <a:fillRef idx="1">
+            <a:schemeClr val="accent1"/>
+          </a:fillRef>
+          <a:effectRef idx="0">
+            <a:schemeClr val="accent1"/>
+          </a:effectRef>
+          <a:fontRef idx="minor">
+            <a:schemeClr val="lt1"/>
+          </a:fontRef>
+        </p:style>
+        <p:txBody>
+          <a:bodyPr rtlCol="0" anchor="ctr"/>
+          <a:lstStyle/>
+          <a:p>
+            <a:pPr algn="ctr"/>
+            <a:r>
+              <a:rPr lang="en-US" dirty="0" err="1" smtClean="0"/>
+              <a:t>git</a:t>
+            </a:r>
+            <a:r>
+              <a:rPr lang="en-US" dirty="0" smtClean="0"/>
+              <a:t> add</a:t>
+            </a:r>
+            <a:endParaRPr lang="en-US" dirty="0"/>
+          </a:p>
+        </p:txBody>
+      </p:sp>
+      <p:sp>
+        <p:nvSpPr>
+          <p:cNvPr id="12" name="Right Arrow 11"/>
+          <p:cNvSpPr/>
+          <p:nvPr/>
+        </p:nvSpPr>
+        <p:spPr>
+          <a:xfrm>
+            <a:off x="6890085" y="2775282"/>
+            <a:ext cx="2021305" cy="529391"/>
+          </a:xfrm>
+          <a:prstGeom prst="rightArrow">
+            <a:avLst/>
+          </a:prstGeom>
+        </p:spPr>
+        <p:style>
+          <a:lnRef idx="2">
+            <a:schemeClr val="accent1">
+              <a:shade val="50000"/>
+            </a:schemeClr>
+          </a:lnRef>
+          <a:fillRef idx="1">
+            <a:schemeClr val="accent1"/>
+          </a:fillRef>
+          <a:effectRef idx="0">
+            <a:schemeClr val="accent1"/>
+          </a:effectRef>
+          <a:fontRef idx="minor">
+            <a:schemeClr val="lt1"/>
+          </a:fontRef>
+        </p:style>
+        <p:txBody>
+          <a:bodyPr rtlCol="0" anchor="ctr"/>
+          <a:lstStyle/>
+          <a:p>
+            <a:pPr algn="ctr"/>
+            <a:r>
+              <a:rPr lang="en-US" dirty="0" err="1" smtClean="0"/>
+              <a:t>git</a:t>
+            </a:r>
+            <a:r>
+              <a:rPr lang="en-US" dirty="0" smtClean="0"/>
+              <a:t> commit</a:t>
+            </a:r>
+            <a:endParaRPr lang="en-US" dirty="0"/>
+          </a:p>
+        </p:txBody>
+      </p:sp>
+      <p:sp>
+        <p:nvSpPr>
+          <p:cNvPr id="27" name="Left Arrow 26"/>
+          <p:cNvSpPr/>
+          <p:nvPr/>
+        </p:nvSpPr>
+        <p:spPr>
+          <a:xfrm>
+            <a:off x="2807368" y="3712851"/>
+            <a:ext cx="1832812" cy="572503"/>
+          </a:xfrm>
+          <a:prstGeom prst="leftArrow">
+            <a:avLst/>
+          </a:prstGeom>
+          <a:solidFill>
+            <a:schemeClr val="accent2">
+              <a:lumMod val="40000"/>
+              <a:lumOff val="60000"/>
+            </a:schemeClr>
+          </a:solidFill>
+        </p:spPr>
+        <p:style>
+          <a:lnRef idx="2">
+            <a:schemeClr val="accent1">
+              <a:shade val="50000"/>
+            </a:schemeClr>
+          </a:lnRef>
+          <a:fillRef idx="1">
+            <a:schemeClr val="accent1"/>
+          </a:fillRef>
+          <a:effectRef idx="0">
+            <a:schemeClr val="accent1"/>
+          </a:effectRef>
+          <a:fontRef idx="minor">
+            <a:schemeClr val="lt1"/>
+          </a:fontRef>
+        </p:style>
+        <p:txBody>
+          <a:bodyPr rtlCol="0" anchor="ctr"/>
+          <a:lstStyle/>
+          <a:p>
+            <a:pPr algn="ctr"/>
+            <a:r>
+              <a:rPr lang="en-US" dirty="0" err="1" smtClean="0">
+                <a:solidFill>
+                  <a:schemeClr val="tx1"/>
+                </a:solidFill>
+              </a:rPr>
+              <a:t>git</a:t>
+            </a:r>
+            <a:r>
+              <a:rPr lang="en-US" dirty="0" smtClean="0">
+                <a:solidFill>
+                  <a:schemeClr val="tx1"/>
+                </a:solidFill>
+              </a:rPr>
+              <a:t> reset</a:t>
+            </a:r>
+            <a:endParaRPr lang="en-US" dirty="0">
+              <a:solidFill>
+                <a:schemeClr val="tx1"/>
+              </a:solidFill>
+            </a:endParaRPr>
+          </a:p>
+        </p:txBody>
+      </p:sp>
+      <p:sp>
+        <p:nvSpPr>
+          <p:cNvPr id="28" name="Left Arrow 27"/>
+          <p:cNvSpPr/>
+          <p:nvPr/>
+        </p:nvSpPr>
+        <p:spPr>
+          <a:xfrm>
+            <a:off x="2807368" y="4743002"/>
+            <a:ext cx="6104022" cy="572503"/>
+          </a:xfrm>
+          <a:prstGeom prst="leftArrow">
+            <a:avLst/>
+          </a:prstGeom>
+          <a:solidFill>
+            <a:schemeClr val="accent2">
+              <a:lumMod val="40000"/>
+              <a:lumOff val="60000"/>
+            </a:schemeClr>
+          </a:solidFill>
+        </p:spPr>
+        <p:style>
+          <a:lnRef idx="2">
+            <a:schemeClr val="accent1">
+              <a:shade val="50000"/>
+            </a:schemeClr>
+          </a:lnRef>
+          <a:fillRef idx="1">
+            <a:schemeClr val="accent1"/>
+          </a:fillRef>
+          <a:effectRef idx="0">
+            <a:schemeClr val="accent1"/>
+          </a:effectRef>
+          <a:fontRef idx="minor">
+            <a:schemeClr val="lt1"/>
+          </a:fontRef>
+        </p:style>
+        <p:txBody>
+          <a:bodyPr rtlCol="0" anchor="ctr"/>
+          <a:lstStyle/>
+          <a:p>
+            <a:pPr algn="ctr"/>
+            <a:r>
+              <a:rPr lang="en-US" dirty="0" err="1" smtClean="0">
+                <a:solidFill>
+                  <a:schemeClr val="tx1"/>
+                </a:solidFill>
+              </a:rPr>
+              <a:t>git</a:t>
+            </a:r>
+            <a:r>
+              <a:rPr lang="en-US" dirty="0" smtClean="0">
+                <a:solidFill>
+                  <a:schemeClr val="tx1"/>
+                </a:solidFill>
+              </a:rPr>
+              <a:t> reset --hard</a:t>
+            </a:r>
+            <a:endParaRPr lang="en-US" dirty="0">
+              <a:solidFill>
+                <a:schemeClr val="tx1"/>
+              </a:solidFill>
+            </a:endParaRPr>
+          </a:p>
+        </p:txBody>
+      </p:sp>
+      <p:sp>
+        <p:nvSpPr>
+          <p:cNvPr id="35" name="Left Arrow 34"/>
+          <p:cNvSpPr/>
+          <p:nvPr/>
+        </p:nvSpPr>
+        <p:spPr>
+          <a:xfrm>
+            <a:off x="2807368" y="5983339"/>
+            <a:ext cx="6104022" cy="435230"/>
+          </a:xfrm>
+          <a:prstGeom prst="leftArrow">
+            <a:avLst/>
+          </a:prstGeom>
+          <a:solidFill>
+            <a:schemeClr val="accent2">
+              <a:lumMod val="40000"/>
+              <a:lumOff val="60000"/>
+            </a:schemeClr>
+          </a:solidFill>
+        </p:spPr>
+        <p:style>
+          <a:lnRef idx="2">
+            <a:schemeClr val="accent1">
+              <a:shade val="50000"/>
+            </a:schemeClr>
+          </a:lnRef>
+          <a:fillRef idx="1">
+            <a:schemeClr val="accent1"/>
+          </a:fillRef>
+          <a:effectRef idx="0">
+            <a:schemeClr val="accent1"/>
+          </a:effectRef>
+          <a:fontRef idx="minor">
+            <a:schemeClr val="lt1"/>
+          </a:fontRef>
+        </p:style>
+        <p:txBody>
+          <a:bodyPr rtlCol="0" anchor="ctr"/>
+          <a:lstStyle/>
+          <a:p>
+            <a:pPr algn="ctr"/>
+            <a:r>
+              <a:rPr lang="en-US" dirty="0" err="1" smtClean="0">
+                <a:solidFill>
+                  <a:schemeClr val="tx1"/>
+                </a:solidFill>
+              </a:rPr>
+              <a:t>git</a:t>
+            </a:r>
+            <a:r>
+              <a:rPr lang="en-US" dirty="0" smtClean="0">
+                <a:solidFill>
+                  <a:schemeClr val="tx1"/>
+                </a:solidFill>
+              </a:rPr>
+              <a:t> checkout</a:t>
+            </a:r>
+            <a:endParaRPr lang="en-US" dirty="0">
+              <a:solidFill>
+                <a:schemeClr val="tx1"/>
+              </a:solidFill>
+            </a:endParaRPr>
+          </a:p>
+        </p:txBody>
+      </p:sp>
+    </p:spTree>
+    <p:extLst>
+      <p:ext uri="{BB962C8B-B14F-4D97-AF65-F5344CB8AC3E}">
+        <p14:creationId xmlns:p14="http://schemas.microsoft.com/office/powerpoint/2010/main" val="215996464"/>
+      </p:ext>
+    </p:extLst>
+  </p:cSld>
+  <p:clrMapOvr>
+    <a:masterClrMapping/>
+  </p:clrMapOvr>
+</p:sld>
+</file>
+
+<file path=ppt/slides/slide11.xml><?xml version="1.0" encoding="utf-8"?>
+<p:sld xmlns:a="http://schemas.openxmlformats.org/drawingml/2006/main" xmlns:r="http://schemas.openxmlformats.org/officeDocument/2006/relationships" xmlns:p="http://schemas.openxmlformats.org/presentationml/2006/main">
+  <p:cSld>
+    <p:spTree>
+      <p:nvGrpSpPr>
+        <p:cNvPr id="1" name=""/>
+        <p:cNvGrpSpPr/>
+        <p:nvPr/>
+      </p:nvGrpSpPr>
+      <p:grpSpPr>
+        <a:xfrm>
+          <a:off x="0" y="0"/>
+          <a:ext cx="0" cy="0"/>
+          <a:chOff x="0" y="0"/>
+          <a:chExt cx="0" cy="0"/>
+        </a:xfrm>
+      </p:grpSpPr>
+      <p:sp>
+        <p:nvSpPr>
+          <p:cNvPr id="5" name="TextBox 4"/>
+          <p:cNvSpPr txBox="1"/>
+          <p:nvPr/>
+        </p:nvSpPr>
+        <p:spPr>
+          <a:xfrm>
+            <a:off x="481449" y="393032"/>
+            <a:ext cx="4436151" cy="769441"/>
+          </a:xfrm>
+          <a:prstGeom prst="rect">
+            <a:avLst/>
+          </a:prstGeom>
+          <a:noFill/>
+        </p:spPr>
+        <p:txBody>
+          <a:bodyPr wrap="none" rtlCol="0">
+            <a:spAutoFit/>
+          </a:bodyPr>
+          <a:lstStyle/>
+          <a:p>
+            <a:r>
+              <a:rPr lang="en-US" sz="4400" dirty="0" smtClean="0"/>
+              <a:t>Concept of staging</a:t>
+            </a:r>
+            <a:endParaRPr lang="en-US" sz="4400" dirty="0"/>
+          </a:p>
+        </p:txBody>
+      </p:sp>
+      <p:graphicFrame>
+        <p:nvGraphicFramePr>
+          <p:cNvPr id="8" name="Table 7"/>
+          <p:cNvGraphicFramePr>
+            <a:graphicFrameLocks noGrp="1"/>
+          </p:cNvGraphicFramePr>
+          <p:nvPr>
+            <p:extLst>
+              <p:ext uri="{D42A27DB-BD31-4B8C-83A1-F6EECF244321}">
+                <p14:modId xmlns:p14="http://schemas.microsoft.com/office/powerpoint/2010/main" val="2852276749"/>
+              </p:ext>
+            </p:extLst>
+          </p:nvPr>
+        </p:nvGraphicFramePr>
+        <p:xfrm>
+          <a:off x="481449" y="1617000"/>
+          <a:ext cx="8128000" cy="1849120"/>
+        </p:xfrm>
+        <a:graphic>
+          <a:graphicData uri="http://schemas.openxmlformats.org/drawingml/2006/table">
+            <a:tbl>
+              <a:tblPr firstRow="1" bandRow="1">
+                <a:tableStyleId>{5C22544A-7EE6-4342-B048-85BDC9FD1C3A}</a:tableStyleId>
+              </a:tblPr>
+              <a:tblGrid>
+                <a:gridCol w="2032000">
+                  <a:extLst>
+                    <a:ext uri="{9D8B030D-6E8A-4147-A177-3AD203B41FA5}">
+                      <a16:colId xmlns:a16="http://schemas.microsoft.com/office/drawing/2014/main" val="3617689339"/>
+                    </a:ext>
+                  </a:extLst>
+                </a:gridCol>
+                <a:gridCol w="2032000">
+                  <a:extLst>
+                    <a:ext uri="{9D8B030D-6E8A-4147-A177-3AD203B41FA5}">
+                      <a16:colId xmlns:a16="http://schemas.microsoft.com/office/drawing/2014/main" val="2433632195"/>
+                    </a:ext>
+                  </a:extLst>
+                </a:gridCol>
+                <a:gridCol w="2032000">
+                  <a:extLst>
+                    <a:ext uri="{9D8B030D-6E8A-4147-A177-3AD203B41FA5}">
+                      <a16:colId xmlns:a16="http://schemas.microsoft.com/office/drawing/2014/main" val="1726091307"/>
+                    </a:ext>
+                  </a:extLst>
+                </a:gridCol>
+                <a:gridCol w="2032000">
+                  <a:extLst>
+                    <a:ext uri="{9D8B030D-6E8A-4147-A177-3AD203B41FA5}">
+                      <a16:colId xmlns:a16="http://schemas.microsoft.com/office/drawing/2014/main" val="3384477846"/>
+                    </a:ext>
+                  </a:extLst>
+                </a:gridCol>
+              </a:tblGrid>
+              <a:tr h="0">
+                <a:tc>
+                  <a:txBody>
+                    <a:bodyPr/>
+                    <a:lstStyle/>
+                    <a:p>
+                      <a:r>
+                        <a:rPr lang="en-US" dirty="0" smtClean="0"/>
+                        <a:t>Action</a:t>
+                      </a:r>
+                      <a:endParaRPr lang="en-US" dirty="0"/>
+                    </a:p>
+                  </a:txBody>
+                  <a:tcPr/>
+                </a:tc>
+                <a:tc>
+                  <a:txBody>
+                    <a:bodyPr/>
+                    <a:lstStyle/>
+                    <a:p>
+                      <a:r>
+                        <a:rPr lang="en-US" dirty="0" smtClean="0"/>
+                        <a:t>Working directory</a:t>
+                      </a:r>
+                      <a:endParaRPr lang="en-US" dirty="0"/>
+                    </a:p>
+                  </a:txBody>
+                  <a:tcPr/>
+                </a:tc>
+                <a:tc>
+                  <a:txBody>
+                    <a:bodyPr/>
+                    <a:lstStyle/>
+                    <a:p>
+                      <a:r>
+                        <a:rPr lang="en-US" dirty="0" smtClean="0"/>
+                        <a:t>Staging/Index</a:t>
+                      </a:r>
+                      <a:endParaRPr lang="en-US" dirty="0"/>
+                    </a:p>
+                  </a:txBody>
+                  <a:tcPr/>
+                </a:tc>
+                <a:tc>
+                  <a:txBody>
+                    <a:bodyPr/>
+                    <a:lstStyle/>
+                    <a:p>
+                      <a:r>
+                        <a:rPr lang="en-US" dirty="0" smtClean="0"/>
+                        <a:t>Repository</a:t>
+                      </a:r>
+                      <a:endParaRPr lang="en-US" dirty="0"/>
+                    </a:p>
+                  </a:txBody>
+                  <a:tcPr/>
+                </a:tc>
+                <a:extLst>
+                  <a:ext uri="{0D108BD9-81ED-4DB2-BD59-A6C34878D82A}">
+                    <a16:rowId xmlns:a16="http://schemas.microsoft.com/office/drawing/2014/main" val="133413624"/>
+                  </a:ext>
+                </a:extLst>
+              </a:tr>
+              <a:tr h="370840">
+                <a:tc>
+                  <a:txBody>
+                    <a:bodyPr/>
+                    <a:lstStyle/>
+                    <a:p>
+                      <a:r>
+                        <a:rPr lang="en-US" dirty="0" smtClean="0"/>
+                        <a:t>&lt;initial</a:t>
+                      </a:r>
+                      <a:r>
+                        <a:rPr lang="en-US" baseline="0" dirty="0" smtClean="0"/>
+                        <a:t> state&gt;</a:t>
+                      </a:r>
+                      <a:endParaRPr lang="en-US" dirty="0"/>
+                    </a:p>
+                  </a:txBody>
+                  <a:tcPr/>
+                </a:tc>
+                <a:tc>
+                  <a:txBody>
+                    <a:bodyPr/>
+                    <a:lstStyle/>
+                    <a:p>
+                      <a:r>
+                        <a:rPr lang="en-US" dirty="0" smtClean="0"/>
+                        <a:t>A</a:t>
+                      </a:r>
+                      <a:endParaRPr lang="en-US" dirty="0"/>
+                    </a:p>
+                  </a:txBody>
+                  <a:tcPr/>
+                </a:tc>
+                <a:tc>
+                  <a:txBody>
+                    <a:bodyPr/>
+                    <a:lstStyle/>
+                    <a:p>
+                      <a:r>
+                        <a:rPr lang="en-US" dirty="0" smtClean="0"/>
+                        <a:t>A</a:t>
+                      </a:r>
+                      <a:endParaRPr lang="en-US" dirty="0"/>
+                    </a:p>
+                  </a:txBody>
+                  <a:tcPr/>
+                </a:tc>
+                <a:tc>
+                  <a:txBody>
+                    <a:bodyPr/>
+                    <a:lstStyle/>
+                    <a:p>
+                      <a:r>
+                        <a:rPr lang="en-US" dirty="0" smtClean="0"/>
+                        <a:t>A</a:t>
+                      </a:r>
+                      <a:endParaRPr lang="en-US" dirty="0"/>
+                    </a:p>
+                  </a:txBody>
+                  <a:tcPr/>
+                </a:tc>
+                <a:extLst>
+                  <a:ext uri="{0D108BD9-81ED-4DB2-BD59-A6C34878D82A}">
+                    <a16:rowId xmlns:a16="http://schemas.microsoft.com/office/drawing/2014/main" val="3589252323"/>
+                  </a:ext>
+                </a:extLst>
+              </a:tr>
+              <a:tr h="370840">
+                <a:tc>
+                  <a:txBody>
+                    <a:bodyPr/>
+                    <a:lstStyle/>
+                    <a:p>
+                      <a:r>
+                        <a:rPr lang="en-US" dirty="0" smtClean="0"/>
+                        <a:t>&lt;edit</a:t>
+                      </a:r>
+                      <a:r>
+                        <a:rPr lang="en-US" baseline="0" dirty="0" smtClean="0"/>
+                        <a:t> files&gt;</a:t>
+                      </a:r>
+                      <a:endParaRPr lang="en-US" dirty="0"/>
+                    </a:p>
+                  </a:txBody>
+                  <a:tcPr/>
+                </a:tc>
+                <a:tc>
+                  <a:txBody>
+                    <a:bodyPr/>
+                    <a:lstStyle/>
+                    <a:p>
+                      <a:r>
+                        <a:rPr lang="en-US" dirty="0" smtClean="0">
+                          <a:solidFill>
+                            <a:srgbClr val="FF0000"/>
+                          </a:solidFill>
+                        </a:rPr>
+                        <a:t>A’</a:t>
+                      </a:r>
+                      <a:endParaRPr lang="en-US" dirty="0">
+                        <a:solidFill>
+                          <a:srgbClr val="FF0000"/>
+                        </a:solidFill>
+                      </a:endParaRPr>
+                    </a:p>
+                  </a:txBody>
+                  <a:tcPr/>
+                </a:tc>
+                <a:tc>
+                  <a:txBody>
+                    <a:bodyPr/>
+                    <a:lstStyle/>
+                    <a:p>
+                      <a:r>
+                        <a:rPr lang="en-US" dirty="0" smtClean="0"/>
+                        <a:t>A</a:t>
+                      </a:r>
+                      <a:endParaRPr lang="en-US" dirty="0"/>
+                    </a:p>
+                  </a:txBody>
+                  <a:tcPr/>
+                </a:tc>
+                <a:tc>
+                  <a:txBody>
+                    <a:bodyPr/>
+                    <a:lstStyle/>
+                    <a:p>
+                      <a:r>
+                        <a:rPr lang="en-US" dirty="0" smtClean="0"/>
+                        <a:t>A</a:t>
+                      </a:r>
+                      <a:endParaRPr lang="en-US" dirty="0"/>
+                    </a:p>
+                  </a:txBody>
+                  <a:tcPr/>
+                </a:tc>
+                <a:extLst>
+                  <a:ext uri="{0D108BD9-81ED-4DB2-BD59-A6C34878D82A}">
+                    <a16:rowId xmlns:a16="http://schemas.microsoft.com/office/drawing/2014/main" val="1470576046"/>
+                  </a:ext>
+                </a:extLst>
+              </a:tr>
+              <a:tr h="370840">
+                <a:tc>
+                  <a:txBody>
+                    <a:bodyPr/>
+                    <a:lstStyle/>
+                    <a:p>
+                      <a:r>
+                        <a:rPr lang="en-US" dirty="0" err="1" smtClean="0"/>
+                        <a:t>git</a:t>
+                      </a:r>
+                      <a:r>
+                        <a:rPr lang="en-US" baseline="0" dirty="0" smtClean="0"/>
+                        <a:t> add</a:t>
+                      </a:r>
+                      <a:endParaRPr lang="en-US" dirty="0"/>
+                    </a:p>
+                  </a:txBody>
+                  <a:tcPr/>
+                </a:tc>
+                <a:tc>
+                  <a:txBody>
+                    <a:bodyPr/>
+                    <a:lstStyle/>
+                    <a:p>
+                      <a:r>
+                        <a:rPr lang="en-US" dirty="0" smtClean="0">
+                          <a:solidFill>
+                            <a:srgbClr val="FF0000"/>
+                          </a:solidFill>
+                        </a:rPr>
+                        <a:t>A’</a:t>
+                      </a:r>
+                      <a:endParaRPr lang="en-US" dirty="0">
+                        <a:solidFill>
+                          <a:srgbClr val="FF0000"/>
+                        </a:solidFill>
+                      </a:endParaRPr>
+                    </a:p>
+                  </a:txBody>
+                  <a:tcPr/>
+                </a:tc>
+                <a:tc>
+                  <a:txBody>
+                    <a:bodyPr/>
+                    <a:lstStyle/>
+                    <a:p>
+                      <a:r>
+                        <a:rPr lang="en-US" dirty="0" smtClean="0">
+                          <a:solidFill>
+                            <a:srgbClr val="FF0000"/>
+                          </a:solidFill>
+                        </a:rPr>
+                        <a:t>A’</a:t>
+                      </a:r>
+                      <a:endParaRPr lang="en-US" dirty="0">
+                        <a:solidFill>
+                          <a:srgbClr val="FF0000"/>
+                        </a:solidFill>
+                      </a:endParaRPr>
+                    </a:p>
+                  </a:txBody>
+                  <a:tcPr/>
+                </a:tc>
+                <a:tc>
+                  <a:txBody>
+                    <a:bodyPr/>
+                    <a:lstStyle/>
+                    <a:p>
+                      <a:r>
+                        <a:rPr lang="en-US" dirty="0" smtClean="0"/>
+                        <a:t>A</a:t>
+                      </a:r>
+                      <a:endParaRPr lang="en-US" dirty="0"/>
+                    </a:p>
+                  </a:txBody>
+                  <a:tcPr/>
+                </a:tc>
+                <a:extLst>
+                  <a:ext uri="{0D108BD9-81ED-4DB2-BD59-A6C34878D82A}">
+                    <a16:rowId xmlns:a16="http://schemas.microsoft.com/office/drawing/2014/main" val="3420387158"/>
+                  </a:ext>
+                </a:extLst>
+              </a:tr>
+              <a:tr h="370840">
+                <a:tc>
+                  <a:txBody>
+                    <a:bodyPr/>
+                    <a:lstStyle/>
+                    <a:p>
+                      <a:r>
+                        <a:rPr lang="en-US" dirty="0" err="1" smtClean="0"/>
+                        <a:t>git</a:t>
+                      </a:r>
+                      <a:r>
+                        <a:rPr lang="en-US" dirty="0" smtClean="0"/>
+                        <a:t> commit</a:t>
+                      </a:r>
+                      <a:endParaRPr lang="en-US" dirty="0"/>
+                    </a:p>
+                  </a:txBody>
+                  <a:tcPr/>
+                </a:tc>
+                <a:tc>
+                  <a:txBody>
+                    <a:bodyPr/>
+                    <a:lstStyle/>
+                    <a:p>
+                      <a:r>
+                        <a:rPr lang="en-US" dirty="0" smtClean="0">
+                          <a:solidFill>
+                            <a:srgbClr val="FF0000"/>
+                          </a:solidFill>
+                        </a:rPr>
+                        <a:t>A’</a:t>
+                      </a:r>
+                      <a:endParaRPr lang="en-US" dirty="0">
+                        <a:solidFill>
+                          <a:srgbClr val="FF0000"/>
+                        </a:solidFill>
+                      </a:endParaRPr>
+                    </a:p>
+                  </a:txBody>
+                  <a:tcPr/>
+                </a:tc>
+                <a:tc>
+                  <a:txBody>
+                    <a:bodyPr/>
+                    <a:lstStyle/>
+                    <a:p>
+                      <a:r>
+                        <a:rPr lang="en-US" dirty="0" smtClean="0">
+                          <a:solidFill>
+                            <a:srgbClr val="FF0000"/>
+                          </a:solidFill>
+                        </a:rPr>
+                        <a:t>A’</a:t>
+                      </a:r>
+                      <a:endParaRPr lang="en-US" dirty="0">
+                        <a:solidFill>
+                          <a:srgbClr val="FF0000"/>
+                        </a:solidFill>
+                      </a:endParaRPr>
+                    </a:p>
+                  </a:txBody>
+                  <a:tcPr/>
+                </a:tc>
+                <a:tc>
+                  <a:txBody>
+                    <a:bodyPr/>
+                    <a:lstStyle/>
+                    <a:p>
+                      <a:r>
+                        <a:rPr lang="en-US" dirty="0" smtClean="0">
+                          <a:solidFill>
+                            <a:srgbClr val="FF0000"/>
+                          </a:solidFill>
+                        </a:rPr>
+                        <a:t>A’</a:t>
+                      </a:r>
+                      <a:endParaRPr lang="en-US" dirty="0">
+                        <a:solidFill>
+                          <a:srgbClr val="FF0000"/>
+                        </a:solidFill>
+                      </a:endParaRPr>
+                    </a:p>
+                  </a:txBody>
+                  <a:tcPr/>
+                </a:tc>
+                <a:extLst>
+                  <a:ext uri="{0D108BD9-81ED-4DB2-BD59-A6C34878D82A}">
+                    <a16:rowId xmlns:a16="http://schemas.microsoft.com/office/drawing/2014/main" val="3703622154"/>
+                  </a:ext>
+                </a:extLst>
+              </a:tr>
+            </a:tbl>
+          </a:graphicData>
+        </a:graphic>
+      </p:graphicFrame>
+      <p:sp>
+        <p:nvSpPr>
+          <p:cNvPr id="9" name="TextBox 8"/>
+          <p:cNvSpPr txBox="1"/>
+          <p:nvPr/>
+        </p:nvSpPr>
+        <p:spPr>
+          <a:xfrm>
+            <a:off x="649705" y="1243263"/>
+            <a:ext cx="3529263" cy="369332"/>
+          </a:xfrm>
+          <a:prstGeom prst="rect">
+            <a:avLst/>
+          </a:prstGeom>
+          <a:noFill/>
+        </p:spPr>
+        <p:txBody>
+          <a:bodyPr wrap="square" rtlCol="0">
+            <a:spAutoFit/>
+          </a:bodyPr>
+          <a:lstStyle/>
+          <a:p>
+            <a:r>
+              <a:rPr lang="en-US" dirty="0" smtClean="0"/>
+              <a:t>Simple case</a:t>
+            </a:r>
+            <a:endParaRPr lang="en-US" dirty="0"/>
+          </a:p>
+        </p:txBody>
+      </p:sp>
+      <p:graphicFrame>
+        <p:nvGraphicFramePr>
+          <p:cNvPr id="23" name="Table 22"/>
+          <p:cNvGraphicFramePr>
+            <a:graphicFrameLocks noGrp="1"/>
+          </p:cNvGraphicFramePr>
+          <p:nvPr>
+            <p:extLst>
+              <p:ext uri="{D42A27DB-BD31-4B8C-83A1-F6EECF244321}">
+                <p14:modId xmlns:p14="http://schemas.microsoft.com/office/powerpoint/2010/main" val="4211217907"/>
+              </p:ext>
+            </p:extLst>
+          </p:nvPr>
+        </p:nvGraphicFramePr>
+        <p:xfrm>
+          <a:off x="481449" y="4051177"/>
+          <a:ext cx="8128000" cy="2219960"/>
+        </p:xfrm>
+        <a:graphic>
+          <a:graphicData uri="http://schemas.openxmlformats.org/drawingml/2006/table">
+            <a:tbl>
+              <a:tblPr firstRow="1" bandRow="1">
+                <a:tableStyleId>{5C22544A-7EE6-4342-B048-85BDC9FD1C3A}</a:tableStyleId>
+              </a:tblPr>
+              <a:tblGrid>
+                <a:gridCol w="2032000">
+                  <a:extLst>
+                    <a:ext uri="{9D8B030D-6E8A-4147-A177-3AD203B41FA5}">
+                      <a16:colId xmlns:a16="http://schemas.microsoft.com/office/drawing/2014/main" val="3617689339"/>
+                    </a:ext>
+                  </a:extLst>
+                </a:gridCol>
+                <a:gridCol w="2032000">
+                  <a:extLst>
+                    <a:ext uri="{9D8B030D-6E8A-4147-A177-3AD203B41FA5}">
+                      <a16:colId xmlns:a16="http://schemas.microsoft.com/office/drawing/2014/main" val="2433632195"/>
+                    </a:ext>
+                  </a:extLst>
+                </a:gridCol>
+                <a:gridCol w="2032000">
+                  <a:extLst>
+                    <a:ext uri="{9D8B030D-6E8A-4147-A177-3AD203B41FA5}">
+                      <a16:colId xmlns:a16="http://schemas.microsoft.com/office/drawing/2014/main" val="1726091307"/>
+                    </a:ext>
+                  </a:extLst>
+                </a:gridCol>
+                <a:gridCol w="2032000">
+                  <a:extLst>
+                    <a:ext uri="{9D8B030D-6E8A-4147-A177-3AD203B41FA5}">
+                      <a16:colId xmlns:a16="http://schemas.microsoft.com/office/drawing/2014/main" val="3384477846"/>
+                    </a:ext>
+                  </a:extLst>
+                </a:gridCol>
+              </a:tblGrid>
+              <a:tr h="0">
+                <a:tc>
+                  <a:txBody>
+                    <a:bodyPr/>
+                    <a:lstStyle/>
+                    <a:p>
+                      <a:r>
+                        <a:rPr lang="en-US" dirty="0" smtClean="0"/>
+                        <a:t>Action</a:t>
+                      </a:r>
+                      <a:endParaRPr lang="en-US" dirty="0"/>
+                    </a:p>
+                  </a:txBody>
+                  <a:tcPr/>
+                </a:tc>
+                <a:tc>
+                  <a:txBody>
+                    <a:bodyPr/>
+                    <a:lstStyle/>
+                    <a:p>
+                      <a:r>
+                        <a:rPr lang="en-US" dirty="0" smtClean="0"/>
+                        <a:t>Working directory</a:t>
+                      </a:r>
+                      <a:endParaRPr lang="en-US" dirty="0"/>
+                    </a:p>
+                  </a:txBody>
+                  <a:tcPr/>
+                </a:tc>
+                <a:tc>
+                  <a:txBody>
+                    <a:bodyPr/>
+                    <a:lstStyle/>
+                    <a:p>
+                      <a:r>
+                        <a:rPr lang="en-US" dirty="0" smtClean="0"/>
+                        <a:t>Staging/Index</a:t>
+                      </a:r>
+                      <a:endParaRPr lang="en-US" dirty="0"/>
+                    </a:p>
+                  </a:txBody>
+                  <a:tcPr/>
+                </a:tc>
+                <a:tc>
+                  <a:txBody>
+                    <a:bodyPr/>
+                    <a:lstStyle/>
+                    <a:p>
+                      <a:r>
+                        <a:rPr lang="en-US" dirty="0" smtClean="0"/>
+                        <a:t>Repository</a:t>
+                      </a:r>
+                      <a:endParaRPr lang="en-US" dirty="0"/>
+                    </a:p>
+                  </a:txBody>
+                  <a:tcPr/>
+                </a:tc>
+                <a:extLst>
+                  <a:ext uri="{0D108BD9-81ED-4DB2-BD59-A6C34878D82A}">
+                    <a16:rowId xmlns:a16="http://schemas.microsoft.com/office/drawing/2014/main" val="133413624"/>
+                  </a:ext>
+                </a:extLst>
+              </a:tr>
+              <a:tr h="370840">
+                <a:tc>
+                  <a:txBody>
+                    <a:bodyPr/>
+                    <a:lstStyle/>
+                    <a:p>
+                      <a:r>
+                        <a:rPr lang="en-US" dirty="0" smtClean="0"/>
+                        <a:t>&lt;initial state&gt;</a:t>
+                      </a:r>
+                      <a:endParaRPr lang="en-US" dirty="0"/>
+                    </a:p>
+                  </a:txBody>
+                  <a:tcPr/>
+                </a:tc>
+                <a:tc>
+                  <a:txBody>
+                    <a:bodyPr/>
+                    <a:lstStyle/>
+                    <a:p>
+                      <a:r>
+                        <a:rPr lang="en-US" dirty="0" smtClean="0"/>
+                        <a:t>A</a:t>
+                      </a:r>
+                      <a:endParaRPr lang="en-US" dirty="0"/>
+                    </a:p>
+                  </a:txBody>
+                  <a:tcPr/>
+                </a:tc>
+                <a:tc>
+                  <a:txBody>
+                    <a:bodyPr/>
+                    <a:lstStyle/>
+                    <a:p>
+                      <a:r>
+                        <a:rPr lang="en-US" dirty="0" smtClean="0"/>
+                        <a:t>A</a:t>
+                      </a:r>
+                      <a:endParaRPr lang="en-US" dirty="0"/>
+                    </a:p>
+                  </a:txBody>
+                  <a:tcPr/>
+                </a:tc>
+                <a:tc>
+                  <a:txBody>
+                    <a:bodyPr/>
+                    <a:lstStyle/>
+                    <a:p>
+                      <a:r>
+                        <a:rPr lang="en-US" dirty="0" smtClean="0"/>
+                        <a:t>A</a:t>
+                      </a:r>
+                      <a:endParaRPr lang="en-US" dirty="0"/>
+                    </a:p>
+                  </a:txBody>
+                  <a:tcPr/>
+                </a:tc>
+                <a:extLst>
+                  <a:ext uri="{0D108BD9-81ED-4DB2-BD59-A6C34878D82A}">
+                    <a16:rowId xmlns:a16="http://schemas.microsoft.com/office/drawing/2014/main" val="3589252323"/>
+                  </a:ext>
+                </a:extLst>
+              </a:tr>
+              <a:tr h="370840">
+                <a:tc>
+                  <a:txBody>
+                    <a:bodyPr/>
+                    <a:lstStyle/>
+                    <a:p>
+                      <a:r>
+                        <a:rPr lang="en-US" dirty="0" smtClean="0"/>
+                        <a:t>&lt;edit</a:t>
+                      </a:r>
+                      <a:r>
+                        <a:rPr lang="en-US" baseline="0" dirty="0" smtClean="0"/>
+                        <a:t> files&gt;</a:t>
+                      </a:r>
+                      <a:endParaRPr lang="en-US" dirty="0"/>
+                    </a:p>
+                  </a:txBody>
+                  <a:tcPr/>
+                </a:tc>
+                <a:tc>
+                  <a:txBody>
+                    <a:bodyPr/>
+                    <a:lstStyle/>
+                    <a:p>
+                      <a:r>
+                        <a:rPr lang="en-US" dirty="0" smtClean="0">
+                          <a:solidFill>
+                            <a:srgbClr val="FF0000"/>
+                          </a:solidFill>
+                        </a:rPr>
+                        <a:t>A’</a:t>
+                      </a:r>
+                      <a:endParaRPr lang="en-US" dirty="0">
+                        <a:solidFill>
+                          <a:srgbClr val="FF0000"/>
+                        </a:solidFill>
+                      </a:endParaRPr>
+                    </a:p>
+                  </a:txBody>
+                  <a:tcPr/>
+                </a:tc>
+                <a:tc>
+                  <a:txBody>
+                    <a:bodyPr/>
+                    <a:lstStyle/>
+                    <a:p>
+                      <a:r>
+                        <a:rPr lang="en-US" dirty="0" smtClean="0"/>
+                        <a:t>A</a:t>
+                      </a:r>
+                      <a:endParaRPr lang="en-US" dirty="0"/>
+                    </a:p>
+                  </a:txBody>
+                  <a:tcPr/>
+                </a:tc>
+                <a:tc>
+                  <a:txBody>
+                    <a:bodyPr/>
+                    <a:lstStyle/>
+                    <a:p>
+                      <a:r>
+                        <a:rPr lang="en-US" dirty="0" smtClean="0"/>
+                        <a:t>A</a:t>
+                      </a:r>
+                      <a:endParaRPr lang="en-US" dirty="0"/>
+                    </a:p>
+                  </a:txBody>
+                  <a:tcPr/>
+                </a:tc>
+                <a:extLst>
+                  <a:ext uri="{0D108BD9-81ED-4DB2-BD59-A6C34878D82A}">
+                    <a16:rowId xmlns:a16="http://schemas.microsoft.com/office/drawing/2014/main" val="1470576046"/>
+                  </a:ext>
+                </a:extLst>
+              </a:tr>
+              <a:tr h="370840">
+                <a:tc>
+                  <a:txBody>
+                    <a:bodyPr/>
+                    <a:lstStyle/>
+                    <a:p>
+                      <a:r>
+                        <a:rPr lang="en-US" dirty="0" err="1" smtClean="0"/>
+                        <a:t>git</a:t>
+                      </a:r>
+                      <a:r>
+                        <a:rPr lang="en-US" baseline="0" dirty="0" smtClean="0"/>
+                        <a:t> add</a:t>
+                      </a:r>
+                      <a:endParaRPr lang="en-US" dirty="0"/>
+                    </a:p>
+                  </a:txBody>
+                  <a:tcPr/>
+                </a:tc>
+                <a:tc>
+                  <a:txBody>
+                    <a:bodyPr/>
+                    <a:lstStyle/>
+                    <a:p>
+                      <a:r>
+                        <a:rPr lang="en-US" dirty="0" smtClean="0">
+                          <a:solidFill>
+                            <a:srgbClr val="FF0000"/>
+                          </a:solidFill>
+                        </a:rPr>
+                        <a:t>A’</a:t>
+                      </a:r>
+                      <a:endParaRPr lang="en-US" dirty="0">
+                        <a:solidFill>
+                          <a:srgbClr val="FF0000"/>
+                        </a:solidFill>
+                      </a:endParaRPr>
+                    </a:p>
+                  </a:txBody>
+                  <a:tcPr/>
+                </a:tc>
+                <a:tc>
+                  <a:txBody>
+                    <a:bodyPr/>
+                    <a:lstStyle/>
+                    <a:p>
+                      <a:r>
+                        <a:rPr lang="en-US" dirty="0" smtClean="0">
+                          <a:solidFill>
+                            <a:srgbClr val="FF0000"/>
+                          </a:solidFill>
+                        </a:rPr>
+                        <a:t>A’</a:t>
+                      </a:r>
+                      <a:endParaRPr lang="en-US" dirty="0">
+                        <a:solidFill>
+                          <a:srgbClr val="FF0000"/>
+                        </a:solidFill>
+                      </a:endParaRPr>
+                    </a:p>
+                  </a:txBody>
+                  <a:tcPr/>
+                </a:tc>
+                <a:tc>
+                  <a:txBody>
+                    <a:bodyPr/>
+                    <a:lstStyle/>
+                    <a:p>
+                      <a:r>
+                        <a:rPr lang="en-US" dirty="0" smtClean="0"/>
+                        <a:t>A</a:t>
+                      </a:r>
+                      <a:endParaRPr lang="en-US" dirty="0"/>
+                    </a:p>
+                  </a:txBody>
+                  <a:tcPr/>
+                </a:tc>
+                <a:extLst>
+                  <a:ext uri="{0D108BD9-81ED-4DB2-BD59-A6C34878D82A}">
+                    <a16:rowId xmlns:a16="http://schemas.microsoft.com/office/drawing/2014/main" val="3420387158"/>
+                  </a:ext>
+                </a:extLst>
+              </a:tr>
+              <a:tr h="370840">
+                <a:tc>
+                  <a:txBody>
+                    <a:bodyPr/>
+                    <a:lstStyle/>
+                    <a:p>
+                      <a:r>
+                        <a:rPr lang="en-US" dirty="0" smtClean="0"/>
+                        <a:t>&lt;edit</a:t>
+                      </a:r>
+                      <a:r>
+                        <a:rPr lang="en-US" baseline="0" dirty="0" smtClean="0"/>
+                        <a:t> files&gt;</a:t>
+                      </a:r>
+                      <a:endParaRPr lang="en-US" dirty="0"/>
+                    </a:p>
+                  </a:txBody>
+                  <a:tcPr/>
+                </a:tc>
+                <a:tc>
+                  <a:txBody>
+                    <a:bodyPr/>
+                    <a:lstStyle/>
+                    <a:p>
+                      <a:pPr marL="0" marR="0" indent="0" algn="l" defTabSz="914400" rtl="0" eaLnBrk="1" fontAlgn="auto" latinLnBrk="0" hangingPunct="1">
+                        <a:lnSpc>
+                          <a:spcPct val="100000"/>
+                        </a:lnSpc>
+                        <a:spcBef>
+                          <a:spcPts val="0"/>
+                        </a:spcBef>
+                        <a:spcAft>
+                          <a:spcPts val="0"/>
+                        </a:spcAft>
+                        <a:buClrTx/>
+                        <a:buSzTx/>
+                        <a:buFontTx/>
+                        <a:buNone/>
+                        <a:tabLst/>
+                        <a:defRPr/>
+                      </a:pPr>
+                      <a:r>
+                        <a:rPr lang="en-US" dirty="0" smtClean="0">
+                          <a:solidFill>
+                            <a:srgbClr val="FF0000"/>
+                          </a:solidFill>
+                        </a:rPr>
+                        <a:t>A’’</a:t>
+                      </a:r>
+                    </a:p>
+                  </a:txBody>
+                  <a:tcPr/>
+                </a:tc>
+                <a:tc>
+                  <a:txBody>
+                    <a:bodyPr/>
+                    <a:lstStyle/>
+                    <a:p>
+                      <a:r>
+                        <a:rPr lang="en-US" dirty="0" smtClean="0">
+                          <a:solidFill>
+                            <a:srgbClr val="FF0000"/>
+                          </a:solidFill>
+                        </a:rPr>
+                        <a:t>A’</a:t>
+                      </a:r>
+                      <a:endParaRPr lang="en-US" dirty="0">
+                        <a:solidFill>
+                          <a:srgbClr val="FF0000"/>
+                        </a:solidFill>
+                      </a:endParaRPr>
+                    </a:p>
+                  </a:txBody>
+                  <a:tcPr/>
+                </a:tc>
+                <a:tc>
+                  <a:txBody>
+                    <a:bodyPr/>
+                    <a:lstStyle/>
+                    <a:p>
+                      <a:r>
+                        <a:rPr lang="en-US" dirty="0" smtClean="0"/>
+                        <a:t>A</a:t>
+                      </a:r>
+                      <a:endParaRPr lang="en-US" dirty="0"/>
+                    </a:p>
+                  </a:txBody>
+                  <a:tcPr/>
+                </a:tc>
+                <a:extLst>
+                  <a:ext uri="{0D108BD9-81ED-4DB2-BD59-A6C34878D82A}">
+                    <a16:rowId xmlns:a16="http://schemas.microsoft.com/office/drawing/2014/main" val="354729325"/>
+                  </a:ext>
+                </a:extLst>
+              </a:tr>
+              <a:tr h="370840">
+                <a:tc>
+                  <a:txBody>
+                    <a:bodyPr/>
+                    <a:lstStyle/>
+                    <a:p>
+                      <a:r>
+                        <a:rPr lang="en-US" dirty="0" err="1" smtClean="0"/>
+                        <a:t>git</a:t>
+                      </a:r>
+                      <a:r>
+                        <a:rPr lang="en-US" dirty="0" smtClean="0"/>
+                        <a:t> commit</a:t>
+                      </a:r>
+                      <a:endParaRPr lang="en-US" dirty="0"/>
+                    </a:p>
+                  </a:txBody>
+                  <a:tcPr/>
+                </a:tc>
+                <a:tc>
+                  <a:txBody>
+                    <a:bodyPr/>
+                    <a:lstStyle/>
+                    <a:p>
+                      <a:r>
+                        <a:rPr lang="en-US" dirty="0" smtClean="0">
+                          <a:solidFill>
+                            <a:srgbClr val="FF0000"/>
+                          </a:solidFill>
+                        </a:rPr>
+                        <a:t>A</a:t>
+                      </a:r>
+                      <a:r>
+                        <a:rPr lang="en-US" dirty="0" smtClean="0">
+                          <a:solidFill>
+                            <a:srgbClr val="FF0000"/>
+                          </a:solidFill>
+                        </a:rPr>
+                        <a:t>’’</a:t>
+                      </a:r>
+                      <a:endParaRPr lang="en-US" dirty="0">
+                        <a:solidFill>
+                          <a:srgbClr val="FF0000"/>
+                        </a:solidFill>
+                      </a:endParaRPr>
+                    </a:p>
+                  </a:txBody>
+                  <a:tcPr/>
+                </a:tc>
+                <a:tc>
+                  <a:txBody>
+                    <a:bodyPr/>
+                    <a:lstStyle/>
+                    <a:p>
+                      <a:r>
+                        <a:rPr lang="en-US" dirty="0" smtClean="0">
+                          <a:solidFill>
+                            <a:srgbClr val="FF0000"/>
+                          </a:solidFill>
+                        </a:rPr>
+                        <a:t>A’</a:t>
+                      </a:r>
+                      <a:endParaRPr lang="en-US" dirty="0">
+                        <a:solidFill>
+                          <a:srgbClr val="FF0000"/>
+                        </a:solidFill>
+                      </a:endParaRPr>
+                    </a:p>
+                  </a:txBody>
+                  <a:tcPr/>
+                </a:tc>
+                <a:tc>
+                  <a:txBody>
+                    <a:bodyPr/>
+                    <a:lstStyle/>
+                    <a:p>
+                      <a:r>
+                        <a:rPr lang="en-US" dirty="0" smtClean="0">
+                          <a:solidFill>
+                            <a:srgbClr val="FF0000"/>
+                          </a:solidFill>
+                        </a:rPr>
+                        <a:t>A’</a:t>
+                      </a:r>
+                      <a:endParaRPr lang="en-US" dirty="0">
+                        <a:solidFill>
+                          <a:srgbClr val="FF0000"/>
+                        </a:solidFill>
+                      </a:endParaRPr>
+                    </a:p>
+                  </a:txBody>
+                  <a:tcPr/>
+                </a:tc>
+                <a:extLst>
+                  <a:ext uri="{0D108BD9-81ED-4DB2-BD59-A6C34878D82A}">
+                    <a16:rowId xmlns:a16="http://schemas.microsoft.com/office/drawing/2014/main" val="2017908480"/>
+                  </a:ext>
+                </a:extLst>
+              </a:tr>
+            </a:tbl>
+          </a:graphicData>
+        </a:graphic>
+      </p:graphicFrame>
+      <p:sp>
+        <p:nvSpPr>
+          <p:cNvPr id="18" name="TextBox 17"/>
+          <p:cNvSpPr txBox="1"/>
+          <p:nvPr/>
+        </p:nvSpPr>
+        <p:spPr>
+          <a:xfrm>
+            <a:off x="649705" y="3681663"/>
+            <a:ext cx="6813468" cy="369332"/>
+          </a:xfrm>
+          <a:prstGeom prst="rect">
+            <a:avLst/>
+          </a:prstGeom>
+          <a:noFill/>
+        </p:spPr>
+        <p:txBody>
+          <a:bodyPr wrap="none" rtlCol="0">
+            <a:spAutoFit/>
+          </a:bodyPr>
+          <a:lstStyle/>
+          <a:p>
+            <a:r>
+              <a:rPr lang="en-US" dirty="0" smtClean="0"/>
+              <a:t>Beware! Don’t forget to add files after edit if you want them in commit</a:t>
+            </a:r>
+            <a:endParaRPr lang="en-US" dirty="0"/>
+          </a:p>
+        </p:txBody>
+      </p:sp>
+    </p:spTree>
+    <p:extLst>
+      <p:ext uri="{BB962C8B-B14F-4D97-AF65-F5344CB8AC3E}">
+        <p14:creationId xmlns:p14="http://schemas.microsoft.com/office/powerpoint/2010/main" val="3473846930"/>
+      </p:ext>
+    </p:extLst>
+  </p:cSld>
+  <p:clrMapOvr>
+    <a:masterClrMapping/>
+  </p:clrMapOvr>
+</p:sld>
+</file>
+
+<file path=ppt/slides/slide12.xml><?xml version="1.0" encoding="utf-8"?>
+<p:sld xmlns:a="http://schemas.openxmlformats.org/drawingml/2006/main" xmlns:r="http://schemas.openxmlformats.org/officeDocument/2006/relationships" xmlns:p="http://schemas.openxmlformats.org/presentationml/2006/main">
+  <p:cSld>
+    <p:spTree>
+      <p:nvGrpSpPr>
+        <p:cNvPr id="1" name=""/>
+        <p:cNvGrpSpPr/>
+        <p:nvPr/>
+      </p:nvGrpSpPr>
+      <p:grpSpPr>
+        <a:xfrm>
+          <a:off x="0" y="0"/>
+          <a:ext cx="0" cy="0"/>
+          <a:chOff x="0" y="0"/>
+          <a:chExt cx="0" cy="0"/>
+        </a:xfrm>
+      </p:grpSpPr>
+      <p:sp>
+        <p:nvSpPr>
+          <p:cNvPr id="5" name="TextBox 4"/>
+          <p:cNvSpPr txBox="1"/>
+          <p:nvPr/>
+        </p:nvSpPr>
+        <p:spPr>
+          <a:xfrm>
+            <a:off x="481449" y="393032"/>
+            <a:ext cx="3658374" cy="769441"/>
+          </a:xfrm>
+          <a:prstGeom prst="rect">
+            <a:avLst/>
+          </a:prstGeom>
+          <a:noFill/>
+        </p:spPr>
+        <p:txBody>
+          <a:bodyPr wrap="none" rtlCol="0">
+            <a:spAutoFit/>
+          </a:bodyPr>
+          <a:lstStyle/>
+          <a:p>
+            <a:r>
+              <a:rPr lang="en-US" sz="4400" dirty="0" smtClean="0"/>
+              <a:t>Undoing things</a:t>
+            </a:r>
+            <a:endParaRPr lang="en-US" sz="4400" dirty="0"/>
+          </a:p>
+        </p:txBody>
+      </p:sp>
+      <p:graphicFrame>
+        <p:nvGraphicFramePr>
+          <p:cNvPr id="8" name="Table 7"/>
+          <p:cNvGraphicFramePr>
+            <a:graphicFrameLocks noGrp="1"/>
+          </p:cNvGraphicFramePr>
+          <p:nvPr>
+            <p:extLst>
+              <p:ext uri="{D42A27DB-BD31-4B8C-83A1-F6EECF244321}">
+                <p14:modId xmlns:p14="http://schemas.microsoft.com/office/powerpoint/2010/main" val="3727179338"/>
+              </p:ext>
+            </p:extLst>
+          </p:nvPr>
+        </p:nvGraphicFramePr>
+        <p:xfrm>
+          <a:off x="540084" y="1162473"/>
+          <a:ext cx="8128000" cy="4450080"/>
+        </p:xfrm>
+        <a:graphic>
+          <a:graphicData uri="http://schemas.openxmlformats.org/drawingml/2006/table">
+            <a:tbl>
+              <a:tblPr firstRow="1" bandRow="1">
+                <a:tableStyleId>{5C22544A-7EE6-4342-B048-85BDC9FD1C3A}</a:tableStyleId>
+              </a:tblPr>
+              <a:tblGrid>
+                <a:gridCol w="2122905">
+                  <a:extLst>
+                    <a:ext uri="{9D8B030D-6E8A-4147-A177-3AD203B41FA5}">
+                      <a16:colId xmlns:a16="http://schemas.microsoft.com/office/drawing/2014/main" val="3617689339"/>
+                    </a:ext>
+                  </a:extLst>
+                </a:gridCol>
+                <a:gridCol w="1941095">
+                  <a:extLst>
+                    <a:ext uri="{9D8B030D-6E8A-4147-A177-3AD203B41FA5}">
+                      <a16:colId xmlns:a16="http://schemas.microsoft.com/office/drawing/2014/main" val="2433632195"/>
+                    </a:ext>
+                  </a:extLst>
+                </a:gridCol>
+                <a:gridCol w="2032000">
+                  <a:extLst>
+                    <a:ext uri="{9D8B030D-6E8A-4147-A177-3AD203B41FA5}">
+                      <a16:colId xmlns:a16="http://schemas.microsoft.com/office/drawing/2014/main" val="1726091307"/>
+                    </a:ext>
+                  </a:extLst>
+                </a:gridCol>
+                <a:gridCol w="2032000">
+                  <a:extLst>
+                    <a:ext uri="{9D8B030D-6E8A-4147-A177-3AD203B41FA5}">
+                      <a16:colId xmlns:a16="http://schemas.microsoft.com/office/drawing/2014/main" val="3384477846"/>
+                    </a:ext>
+                  </a:extLst>
+                </a:gridCol>
+              </a:tblGrid>
+              <a:tr h="370840">
+                <a:tc>
+                  <a:txBody>
+                    <a:bodyPr/>
+                    <a:lstStyle/>
+                    <a:p>
+                      <a:r>
+                        <a:rPr lang="en-US" dirty="0" smtClean="0"/>
+                        <a:t>Action</a:t>
+                      </a:r>
+                      <a:endParaRPr lang="en-US" dirty="0"/>
+                    </a:p>
+                  </a:txBody>
+                  <a:tcPr/>
+                </a:tc>
+                <a:tc>
+                  <a:txBody>
+                    <a:bodyPr/>
+                    <a:lstStyle/>
+                    <a:p>
+                      <a:r>
+                        <a:rPr lang="en-US" dirty="0" smtClean="0"/>
+                        <a:t>Working directory</a:t>
+                      </a:r>
+                      <a:endParaRPr lang="en-US" dirty="0"/>
+                    </a:p>
+                  </a:txBody>
+                  <a:tcPr/>
+                </a:tc>
+                <a:tc>
+                  <a:txBody>
+                    <a:bodyPr/>
+                    <a:lstStyle/>
+                    <a:p>
+                      <a:r>
+                        <a:rPr lang="en-US" dirty="0" smtClean="0"/>
+                        <a:t>Staging/Index</a:t>
+                      </a:r>
+                      <a:endParaRPr lang="en-US" dirty="0"/>
+                    </a:p>
+                  </a:txBody>
+                  <a:tcPr/>
+                </a:tc>
+                <a:tc>
+                  <a:txBody>
+                    <a:bodyPr/>
+                    <a:lstStyle/>
+                    <a:p>
+                      <a:r>
+                        <a:rPr lang="en-US" dirty="0" smtClean="0"/>
+                        <a:t>Repository</a:t>
+                      </a:r>
+                      <a:endParaRPr lang="en-US" dirty="0"/>
+                    </a:p>
+                  </a:txBody>
+                  <a:tcPr/>
+                </a:tc>
+                <a:extLst>
+                  <a:ext uri="{0D108BD9-81ED-4DB2-BD59-A6C34878D82A}">
+                    <a16:rowId xmlns:a16="http://schemas.microsoft.com/office/drawing/2014/main" val="133413624"/>
+                  </a:ext>
+                </a:extLst>
+              </a:tr>
+              <a:tr h="370840">
+                <a:tc>
+                  <a:txBody>
+                    <a:bodyPr/>
+                    <a:lstStyle/>
+                    <a:p>
+                      <a:r>
+                        <a:rPr lang="en-US" dirty="0" smtClean="0"/>
+                        <a:t>&lt;edit files&gt;</a:t>
+                      </a:r>
+                      <a:endParaRPr lang="en-US" dirty="0"/>
+                    </a:p>
+                  </a:txBody>
+                  <a:tcPr/>
+                </a:tc>
+                <a:tc>
+                  <a:txBody>
+                    <a:bodyPr/>
+                    <a:lstStyle/>
+                    <a:p>
+                      <a:r>
+                        <a:rPr lang="en-US" dirty="0" smtClean="0">
+                          <a:solidFill>
+                            <a:srgbClr val="FF0000"/>
+                          </a:solidFill>
+                        </a:rPr>
+                        <a:t>A’</a:t>
+                      </a:r>
+                      <a:endParaRPr lang="en-US" dirty="0">
+                        <a:solidFill>
+                          <a:srgbClr val="FF0000"/>
+                        </a:solidFill>
+                      </a:endParaRPr>
+                    </a:p>
+                  </a:txBody>
+                  <a:tcPr/>
+                </a:tc>
+                <a:tc>
+                  <a:txBody>
+                    <a:bodyPr/>
+                    <a:lstStyle/>
+                    <a:p>
+                      <a:r>
+                        <a:rPr lang="en-US" dirty="0" smtClean="0"/>
+                        <a:t>A</a:t>
+                      </a:r>
+                      <a:endParaRPr lang="en-US" dirty="0"/>
+                    </a:p>
+                  </a:txBody>
+                  <a:tcPr/>
+                </a:tc>
+                <a:tc>
+                  <a:txBody>
+                    <a:bodyPr/>
+                    <a:lstStyle/>
+                    <a:p>
+                      <a:r>
+                        <a:rPr lang="en-US" dirty="0" smtClean="0"/>
+                        <a:t>A</a:t>
+                      </a:r>
+                      <a:endParaRPr lang="en-US" dirty="0"/>
+                    </a:p>
+                  </a:txBody>
+                  <a:tcPr/>
+                </a:tc>
+                <a:extLst>
+                  <a:ext uri="{0D108BD9-81ED-4DB2-BD59-A6C34878D82A}">
+                    <a16:rowId xmlns:a16="http://schemas.microsoft.com/office/drawing/2014/main" val="201230203"/>
+                  </a:ext>
+                </a:extLst>
+              </a:tr>
+              <a:tr h="370840">
+                <a:tc>
+                  <a:txBody>
+                    <a:bodyPr/>
+                    <a:lstStyle/>
+                    <a:p>
+                      <a:r>
+                        <a:rPr lang="en-US" dirty="0" err="1" smtClean="0"/>
+                        <a:t>git</a:t>
+                      </a:r>
+                      <a:r>
+                        <a:rPr lang="en-US" dirty="0" smtClean="0"/>
+                        <a:t> checkout -- &lt;file&gt;</a:t>
+                      </a:r>
+                      <a:endParaRPr lang="en-US" dirty="0"/>
+                    </a:p>
+                  </a:txBody>
+                  <a:tcPr/>
+                </a:tc>
+                <a:tc>
+                  <a:txBody>
+                    <a:bodyPr/>
+                    <a:lstStyle/>
+                    <a:p>
+                      <a:r>
+                        <a:rPr lang="en-US" dirty="0" smtClean="0"/>
+                        <a:t>A</a:t>
+                      </a:r>
+                      <a:endParaRPr lang="en-US" dirty="0"/>
+                    </a:p>
+                  </a:txBody>
+                  <a:tcPr/>
+                </a:tc>
+                <a:tc>
+                  <a:txBody>
+                    <a:bodyPr/>
+                    <a:lstStyle/>
+                    <a:p>
+                      <a:r>
+                        <a:rPr lang="en-US" dirty="0" smtClean="0"/>
+                        <a:t>A</a:t>
+                      </a:r>
+                      <a:endParaRPr lang="en-US" dirty="0"/>
+                    </a:p>
+                  </a:txBody>
+                  <a:tcPr/>
+                </a:tc>
+                <a:tc>
+                  <a:txBody>
+                    <a:bodyPr/>
+                    <a:lstStyle/>
+                    <a:p>
+                      <a:r>
+                        <a:rPr lang="en-US" dirty="0" smtClean="0"/>
+                        <a:t>A</a:t>
+                      </a:r>
+                      <a:endParaRPr lang="en-US" dirty="0"/>
+                    </a:p>
+                  </a:txBody>
+                  <a:tcPr/>
+                </a:tc>
+                <a:extLst>
+                  <a:ext uri="{0D108BD9-81ED-4DB2-BD59-A6C34878D82A}">
+                    <a16:rowId xmlns:a16="http://schemas.microsoft.com/office/drawing/2014/main" val="953477973"/>
+                  </a:ext>
+                </a:extLst>
+              </a:tr>
+              <a:tr h="370840">
+                <a:tc>
+                  <a:txBody>
+                    <a:bodyPr/>
+                    <a:lstStyle/>
+                    <a:p>
+                      <a:endParaRPr lang="en-US" dirty="0"/>
+                    </a:p>
+                  </a:txBody>
+                  <a:tcPr/>
+                </a:tc>
+                <a:tc>
+                  <a:txBody>
+                    <a:bodyPr/>
+                    <a:lstStyle/>
+                    <a:p>
+                      <a:endParaRPr lang="en-US" dirty="0"/>
+                    </a:p>
+                  </a:txBody>
+                  <a:tcPr/>
+                </a:tc>
+                <a:tc>
+                  <a:txBody>
+                    <a:bodyPr/>
+                    <a:lstStyle/>
+                    <a:p>
+                      <a:endParaRPr lang="en-US" dirty="0"/>
+                    </a:p>
+                  </a:txBody>
+                  <a:tcPr/>
+                </a:tc>
+                <a:tc>
+                  <a:txBody>
+                    <a:bodyPr/>
+                    <a:lstStyle/>
+                    <a:p>
+                      <a:endParaRPr lang="en-US" dirty="0"/>
+                    </a:p>
+                  </a:txBody>
+                  <a:tcPr/>
+                </a:tc>
+                <a:extLst>
+                  <a:ext uri="{0D108BD9-81ED-4DB2-BD59-A6C34878D82A}">
+                    <a16:rowId xmlns:a16="http://schemas.microsoft.com/office/drawing/2014/main" val="2402014133"/>
+                  </a:ext>
+                </a:extLst>
+              </a:tr>
+              <a:tr h="370840">
+                <a:tc>
+                  <a:txBody>
+                    <a:bodyPr/>
+                    <a:lstStyle/>
+                    <a:p>
+                      <a:r>
+                        <a:rPr lang="en-US" dirty="0" err="1" smtClean="0"/>
+                        <a:t>git</a:t>
+                      </a:r>
+                      <a:r>
+                        <a:rPr lang="en-US" dirty="0" smtClean="0"/>
+                        <a:t>  add</a:t>
+                      </a:r>
+                      <a:endParaRPr lang="en-US" dirty="0"/>
+                    </a:p>
+                  </a:txBody>
+                  <a:tcPr/>
+                </a:tc>
+                <a:tc>
+                  <a:txBody>
+                    <a:bodyPr/>
+                    <a:lstStyle/>
+                    <a:p>
+                      <a:r>
+                        <a:rPr lang="en-US" dirty="0" smtClean="0">
+                          <a:solidFill>
+                            <a:srgbClr val="FF0000"/>
+                          </a:solidFill>
+                        </a:rPr>
+                        <a:t>A</a:t>
+                      </a:r>
+                      <a:r>
+                        <a:rPr lang="en-US" dirty="0" smtClean="0">
+                          <a:solidFill>
+                            <a:srgbClr val="FF0000"/>
+                          </a:solidFill>
+                        </a:rPr>
+                        <a:t>’</a:t>
+                      </a:r>
+                      <a:endParaRPr lang="en-US" dirty="0">
+                        <a:solidFill>
+                          <a:srgbClr val="FF0000"/>
+                        </a:solidFill>
+                      </a:endParaRPr>
+                    </a:p>
+                  </a:txBody>
+                  <a:tcPr/>
+                </a:tc>
+                <a:tc>
+                  <a:txBody>
+                    <a:bodyPr/>
+                    <a:lstStyle/>
+                    <a:p>
+                      <a:r>
+                        <a:rPr lang="en-US" dirty="0" smtClean="0">
+                          <a:solidFill>
+                            <a:srgbClr val="FF0000"/>
+                          </a:solidFill>
+                        </a:rPr>
+                        <a:t>A’</a:t>
+                      </a:r>
+                      <a:endParaRPr lang="en-US" dirty="0">
+                        <a:solidFill>
+                          <a:srgbClr val="FF0000"/>
+                        </a:solidFill>
+                      </a:endParaRPr>
+                    </a:p>
+                  </a:txBody>
+                  <a:tcPr/>
+                </a:tc>
+                <a:tc>
+                  <a:txBody>
+                    <a:bodyPr/>
+                    <a:lstStyle/>
+                    <a:p>
+                      <a:r>
+                        <a:rPr lang="en-US" dirty="0" smtClean="0"/>
+                        <a:t>A</a:t>
+                      </a:r>
+                      <a:endParaRPr lang="en-US" dirty="0"/>
+                    </a:p>
+                  </a:txBody>
+                  <a:tcPr/>
+                </a:tc>
+                <a:extLst>
+                  <a:ext uri="{0D108BD9-81ED-4DB2-BD59-A6C34878D82A}">
+                    <a16:rowId xmlns:a16="http://schemas.microsoft.com/office/drawing/2014/main" val="3435802017"/>
+                  </a:ext>
+                </a:extLst>
+              </a:tr>
+              <a:tr h="370840">
+                <a:tc>
+                  <a:txBody>
+                    <a:bodyPr/>
+                    <a:lstStyle/>
+                    <a:p>
+                      <a:r>
+                        <a:rPr lang="en-US" dirty="0" err="1" smtClean="0"/>
+                        <a:t>git</a:t>
+                      </a:r>
+                      <a:r>
+                        <a:rPr lang="en-US" dirty="0" smtClean="0"/>
+                        <a:t> reset</a:t>
+                      </a:r>
+                      <a:endParaRPr lang="en-US" dirty="0"/>
+                    </a:p>
+                  </a:txBody>
+                  <a:tcPr/>
+                </a:tc>
+                <a:tc>
+                  <a:txBody>
+                    <a:bodyPr/>
+                    <a:lstStyle/>
+                    <a:p>
+                      <a:pPr marL="0" marR="0" indent="0" algn="l" defTabSz="914400" rtl="0" eaLnBrk="1" fontAlgn="auto" latinLnBrk="0" hangingPunct="1">
+                        <a:lnSpc>
+                          <a:spcPct val="100000"/>
+                        </a:lnSpc>
+                        <a:spcBef>
+                          <a:spcPts val="0"/>
+                        </a:spcBef>
+                        <a:spcAft>
+                          <a:spcPts val="0"/>
+                        </a:spcAft>
+                        <a:buClrTx/>
+                        <a:buSzTx/>
+                        <a:buFontTx/>
+                        <a:buNone/>
+                        <a:tabLst/>
+                        <a:defRPr/>
+                      </a:pPr>
+                      <a:r>
+                        <a:rPr lang="en-US" dirty="0" smtClean="0">
+                          <a:solidFill>
+                            <a:srgbClr val="FF0000"/>
+                          </a:solidFill>
+                        </a:rPr>
+                        <a:t>A’</a:t>
+                      </a:r>
+                    </a:p>
+                  </a:txBody>
+                  <a:tcPr/>
+                </a:tc>
+                <a:tc>
+                  <a:txBody>
+                    <a:bodyPr/>
+                    <a:lstStyle/>
+                    <a:p>
+                      <a:r>
+                        <a:rPr lang="en-US" dirty="0" smtClean="0"/>
+                        <a:t>A</a:t>
+                      </a:r>
+                      <a:endParaRPr lang="en-US" dirty="0"/>
+                    </a:p>
+                  </a:txBody>
+                  <a:tcPr/>
+                </a:tc>
+                <a:tc>
+                  <a:txBody>
+                    <a:bodyPr/>
+                    <a:lstStyle/>
+                    <a:p>
+                      <a:r>
+                        <a:rPr lang="en-US" dirty="0" smtClean="0"/>
+                        <a:t>A</a:t>
+                      </a:r>
+                      <a:endParaRPr lang="en-US" dirty="0"/>
+                    </a:p>
+                  </a:txBody>
+                  <a:tcPr/>
+                </a:tc>
+                <a:extLst>
+                  <a:ext uri="{0D108BD9-81ED-4DB2-BD59-A6C34878D82A}">
+                    <a16:rowId xmlns:a16="http://schemas.microsoft.com/office/drawing/2014/main" val="1896741139"/>
+                  </a:ext>
+                </a:extLst>
+              </a:tr>
+              <a:tr h="370840">
+                <a:tc>
+                  <a:txBody>
+                    <a:bodyPr/>
+                    <a:lstStyle/>
+                    <a:p>
+                      <a:endParaRPr lang="en-US" dirty="0"/>
+                    </a:p>
+                  </a:txBody>
+                  <a:tcPr/>
+                </a:tc>
+                <a:tc>
+                  <a:txBody>
+                    <a:bodyPr/>
+                    <a:lstStyle/>
+                    <a:p>
+                      <a:endParaRPr lang="en-US" dirty="0"/>
+                    </a:p>
+                  </a:txBody>
+                  <a:tcPr/>
+                </a:tc>
+                <a:tc>
+                  <a:txBody>
+                    <a:bodyPr/>
+                    <a:lstStyle/>
+                    <a:p>
+                      <a:endParaRPr lang="en-US" dirty="0"/>
+                    </a:p>
+                  </a:txBody>
+                  <a:tcPr/>
+                </a:tc>
+                <a:tc>
+                  <a:txBody>
+                    <a:bodyPr/>
+                    <a:lstStyle/>
+                    <a:p>
+                      <a:endParaRPr lang="en-US" dirty="0"/>
+                    </a:p>
+                  </a:txBody>
+                  <a:tcPr/>
+                </a:tc>
+                <a:extLst>
+                  <a:ext uri="{0D108BD9-81ED-4DB2-BD59-A6C34878D82A}">
+                    <a16:rowId xmlns:a16="http://schemas.microsoft.com/office/drawing/2014/main" val="3089134014"/>
+                  </a:ext>
+                </a:extLst>
+              </a:tr>
+              <a:tr h="370840">
+                <a:tc>
+                  <a:txBody>
+                    <a:bodyPr/>
+                    <a:lstStyle/>
+                    <a:p>
+                      <a:r>
+                        <a:rPr lang="en-US" dirty="0" err="1" smtClean="0"/>
+                        <a:t>git</a:t>
+                      </a:r>
+                      <a:r>
+                        <a:rPr lang="en-US" baseline="0" dirty="0" smtClean="0"/>
+                        <a:t> add</a:t>
+                      </a:r>
+                      <a:endParaRPr lang="en-US" dirty="0"/>
+                    </a:p>
+                  </a:txBody>
+                  <a:tcPr/>
+                </a:tc>
+                <a:tc>
+                  <a:txBody>
+                    <a:bodyPr/>
+                    <a:lstStyle/>
+                    <a:p>
+                      <a:r>
+                        <a:rPr lang="en-US" dirty="0" smtClean="0">
+                          <a:solidFill>
+                            <a:srgbClr val="FF0000"/>
+                          </a:solidFill>
+                        </a:rPr>
+                        <a:t>A</a:t>
+                      </a:r>
+                      <a:r>
+                        <a:rPr lang="en-US" dirty="0" smtClean="0">
+                          <a:solidFill>
+                            <a:srgbClr val="FF0000"/>
+                          </a:solidFill>
+                        </a:rPr>
+                        <a:t>’</a:t>
+                      </a:r>
+                      <a:endParaRPr lang="en-US" dirty="0">
+                        <a:solidFill>
+                          <a:srgbClr val="FF0000"/>
+                        </a:solidFill>
+                      </a:endParaRPr>
+                    </a:p>
+                  </a:txBody>
+                  <a:tcPr/>
+                </a:tc>
+                <a:tc>
+                  <a:txBody>
+                    <a:bodyPr/>
+                    <a:lstStyle/>
+                    <a:p>
+                      <a:r>
+                        <a:rPr lang="en-US" dirty="0" smtClean="0">
+                          <a:solidFill>
+                            <a:srgbClr val="FF0000"/>
+                          </a:solidFill>
+                        </a:rPr>
+                        <a:t>A’</a:t>
+                      </a:r>
+                      <a:endParaRPr lang="en-US" dirty="0">
+                        <a:solidFill>
+                          <a:srgbClr val="FF0000"/>
+                        </a:solidFill>
+                      </a:endParaRPr>
+                    </a:p>
+                  </a:txBody>
+                  <a:tcPr/>
+                </a:tc>
+                <a:tc>
+                  <a:txBody>
+                    <a:bodyPr/>
+                    <a:lstStyle/>
+                    <a:p>
+                      <a:r>
+                        <a:rPr lang="en-US" dirty="0" smtClean="0"/>
+                        <a:t>A</a:t>
+                      </a:r>
+                      <a:endParaRPr lang="en-US" dirty="0"/>
+                    </a:p>
+                  </a:txBody>
+                  <a:tcPr/>
+                </a:tc>
+                <a:extLst>
+                  <a:ext uri="{0D108BD9-81ED-4DB2-BD59-A6C34878D82A}">
+                    <a16:rowId xmlns:a16="http://schemas.microsoft.com/office/drawing/2014/main" val="3479310661"/>
+                  </a:ext>
+                </a:extLst>
+              </a:tr>
+              <a:tr h="370840">
+                <a:tc>
+                  <a:txBody>
+                    <a:bodyPr/>
+                    <a:lstStyle/>
+                    <a:p>
+                      <a:r>
+                        <a:rPr lang="en-US" dirty="0" err="1" smtClean="0"/>
+                        <a:t>git</a:t>
+                      </a:r>
+                      <a:r>
+                        <a:rPr lang="en-US" dirty="0" smtClean="0"/>
+                        <a:t> reset --hard</a:t>
+                      </a:r>
+                      <a:endParaRPr lang="en-US" dirty="0"/>
+                    </a:p>
+                  </a:txBody>
+                  <a:tcPr/>
+                </a:tc>
+                <a:tc>
+                  <a:txBody>
+                    <a:bodyPr/>
+                    <a:lstStyle/>
+                    <a:p>
+                      <a:r>
+                        <a:rPr lang="en-US" dirty="0" smtClean="0"/>
+                        <a:t>A</a:t>
+                      </a:r>
+                      <a:endParaRPr lang="en-US" dirty="0"/>
+                    </a:p>
+                  </a:txBody>
+                  <a:tcPr/>
+                </a:tc>
+                <a:tc>
+                  <a:txBody>
+                    <a:bodyPr/>
+                    <a:lstStyle/>
+                    <a:p>
+                      <a:r>
+                        <a:rPr lang="en-US" dirty="0" smtClean="0"/>
+                        <a:t>A</a:t>
+                      </a:r>
+                      <a:endParaRPr lang="en-US" dirty="0"/>
+                    </a:p>
+                  </a:txBody>
+                  <a:tcPr/>
+                </a:tc>
+                <a:tc>
+                  <a:txBody>
+                    <a:bodyPr/>
+                    <a:lstStyle/>
+                    <a:p>
+                      <a:r>
+                        <a:rPr lang="en-US" dirty="0" smtClean="0"/>
+                        <a:t>A</a:t>
+                      </a:r>
+                      <a:endParaRPr lang="en-US" dirty="0"/>
+                    </a:p>
+                  </a:txBody>
+                  <a:tcPr/>
+                </a:tc>
+                <a:extLst>
+                  <a:ext uri="{0D108BD9-81ED-4DB2-BD59-A6C34878D82A}">
+                    <a16:rowId xmlns:a16="http://schemas.microsoft.com/office/drawing/2014/main" val="3586486138"/>
+                  </a:ext>
+                </a:extLst>
+              </a:tr>
+              <a:tr h="370840">
+                <a:tc>
+                  <a:txBody>
+                    <a:bodyPr/>
+                    <a:lstStyle/>
+                    <a:p>
+                      <a:endParaRPr lang="en-US" dirty="0"/>
+                    </a:p>
+                  </a:txBody>
+                  <a:tcPr/>
+                </a:tc>
+                <a:tc>
+                  <a:txBody>
+                    <a:bodyPr/>
+                    <a:lstStyle/>
+                    <a:p>
+                      <a:endParaRPr lang="en-US" dirty="0"/>
+                    </a:p>
+                  </a:txBody>
+                  <a:tcPr/>
+                </a:tc>
+                <a:tc>
+                  <a:txBody>
+                    <a:bodyPr/>
+                    <a:lstStyle/>
+                    <a:p>
+                      <a:endParaRPr lang="en-US" dirty="0"/>
+                    </a:p>
+                  </a:txBody>
+                  <a:tcPr/>
+                </a:tc>
+                <a:tc>
+                  <a:txBody>
+                    <a:bodyPr/>
+                    <a:lstStyle/>
+                    <a:p>
+                      <a:endParaRPr lang="en-US" dirty="0"/>
+                    </a:p>
+                  </a:txBody>
+                  <a:tcPr/>
+                </a:tc>
+                <a:extLst>
+                  <a:ext uri="{0D108BD9-81ED-4DB2-BD59-A6C34878D82A}">
+                    <a16:rowId xmlns:a16="http://schemas.microsoft.com/office/drawing/2014/main" val="2667176097"/>
+                  </a:ext>
+                </a:extLst>
+              </a:tr>
+              <a:tr h="370840">
+                <a:tc>
+                  <a:txBody>
+                    <a:bodyPr/>
+                    <a:lstStyle/>
+                    <a:p>
+                      <a:r>
+                        <a:rPr lang="en-US" dirty="0" err="1" smtClean="0"/>
+                        <a:t>git</a:t>
+                      </a:r>
+                      <a:r>
+                        <a:rPr lang="en-US" dirty="0" smtClean="0"/>
+                        <a:t> commit</a:t>
+                      </a:r>
+                      <a:endParaRPr lang="en-US" dirty="0"/>
+                    </a:p>
+                  </a:txBody>
+                  <a:tcPr/>
+                </a:tc>
+                <a:tc>
+                  <a:txBody>
+                    <a:bodyPr/>
+                    <a:lstStyle/>
+                    <a:p>
+                      <a:r>
+                        <a:rPr lang="en-US" dirty="0" smtClean="0">
+                          <a:solidFill>
+                            <a:srgbClr val="FF0000"/>
+                          </a:solidFill>
+                        </a:rPr>
+                        <a:t>A</a:t>
+                      </a:r>
+                      <a:r>
+                        <a:rPr lang="en-US" dirty="0" smtClean="0">
+                          <a:solidFill>
+                            <a:srgbClr val="FF0000"/>
+                          </a:solidFill>
+                        </a:rPr>
+                        <a:t>’</a:t>
+                      </a:r>
+                      <a:endParaRPr lang="en-US" dirty="0">
+                        <a:solidFill>
+                          <a:srgbClr val="FF0000"/>
+                        </a:solidFill>
+                      </a:endParaRPr>
+                    </a:p>
+                  </a:txBody>
+                  <a:tcPr/>
+                </a:tc>
+                <a:tc>
+                  <a:txBody>
+                    <a:bodyPr/>
+                    <a:lstStyle/>
+                    <a:p>
+                      <a:r>
+                        <a:rPr lang="en-US" dirty="0" smtClean="0">
+                          <a:solidFill>
+                            <a:srgbClr val="FF0000"/>
+                          </a:solidFill>
+                        </a:rPr>
+                        <a:t>A’</a:t>
+                      </a:r>
+                      <a:endParaRPr lang="en-US" dirty="0">
+                        <a:solidFill>
+                          <a:srgbClr val="FF0000"/>
+                        </a:solidFill>
+                      </a:endParaRPr>
+                    </a:p>
+                  </a:txBody>
+                  <a:tcPr/>
+                </a:tc>
+                <a:tc>
+                  <a:txBody>
+                    <a:bodyPr/>
+                    <a:lstStyle/>
+                    <a:p>
+                      <a:r>
+                        <a:rPr lang="en-US" dirty="0" smtClean="0">
+                          <a:solidFill>
+                            <a:srgbClr val="FF0000"/>
+                          </a:solidFill>
+                        </a:rPr>
+                        <a:t>A’</a:t>
+                      </a:r>
+                      <a:endParaRPr lang="en-US" dirty="0">
+                        <a:solidFill>
+                          <a:srgbClr val="FF0000"/>
+                        </a:solidFill>
+                      </a:endParaRPr>
+                    </a:p>
+                  </a:txBody>
+                  <a:tcPr/>
+                </a:tc>
+                <a:extLst>
+                  <a:ext uri="{0D108BD9-81ED-4DB2-BD59-A6C34878D82A}">
+                    <a16:rowId xmlns:a16="http://schemas.microsoft.com/office/drawing/2014/main" val="342299926"/>
+                  </a:ext>
+                </a:extLst>
+              </a:tr>
+              <a:tr h="370840">
+                <a:tc>
+                  <a:txBody>
+                    <a:bodyPr/>
+                    <a:lstStyle/>
+                    <a:p>
+                      <a:r>
+                        <a:rPr lang="en-US" dirty="0" err="1" smtClean="0"/>
+                        <a:t>git</a:t>
+                      </a:r>
+                      <a:r>
+                        <a:rPr lang="en-US" dirty="0" smtClean="0"/>
+                        <a:t> reset</a:t>
+                      </a:r>
+                      <a:r>
+                        <a:rPr lang="en-US" baseline="0" dirty="0" smtClean="0"/>
+                        <a:t> HEAD~1</a:t>
+                      </a:r>
+                      <a:endParaRPr lang="en-US" dirty="0"/>
+                    </a:p>
+                  </a:txBody>
+                  <a:tcPr/>
+                </a:tc>
+                <a:tc>
+                  <a:txBody>
+                    <a:bodyPr/>
+                    <a:lstStyle/>
+                    <a:p>
+                      <a:pPr marL="0" marR="0" indent="0" algn="l" defTabSz="914400" rtl="0" eaLnBrk="1" fontAlgn="auto" latinLnBrk="0" hangingPunct="1">
+                        <a:lnSpc>
+                          <a:spcPct val="100000"/>
+                        </a:lnSpc>
+                        <a:spcBef>
+                          <a:spcPts val="0"/>
+                        </a:spcBef>
+                        <a:spcAft>
+                          <a:spcPts val="0"/>
+                        </a:spcAft>
+                        <a:buClrTx/>
+                        <a:buSzTx/>
+                        <a:buFontTx/>
+                        <a:buNone/>
+                        <a:tabLst/>
+                        <a:defRPr/>
+                      </a:pPr>
+                      <a:r>
+                        <a:rPr lang="en-US" dirty="0" smtClean="0">
+                          <a:solidFill>
+                            <a:srgbClr val="FF0000"/>
+                          </a:solidFill>
+                        </a:rPr>
+                        <a:t>A’</a:t>
+                      </a:r>
+                    </a:p>
+                  </a:txBody>
+                  <a:tcPr/>
+                </a:tc>
+                <a:tc>
+                  <a:txBody>
+                    <a:bodyPr/>
+                    <a:lstStyle/>
+                    <a:p>
+                      <a:pPr marL="0" marR="0" indent="0" algn="l" defTabSz="914400" rtl="0" eaLnBrk="1" fontAlgn="auto" latinLnBrk="0" hangingPunct="1">
+                        <a:lnSpc>
+                          <a:spcPct val="100000"/>
+                        </a:lnSpc>
+                        <a:spcBef>
+                          <a:spcPts val="0"/>
+                        </a:spcBef>
+                        <a:spcAft>
+                          <a:spcPts val="0"/>
+                        </a:spcAft>
+                        <a:buClrTx/>
+                        <a:buSzTx/>
+                        <a:buFontTx/>
+                        <a:buNone/>
+                        <a:tabLst/>
+                        <a:defRPr/>
+                      </a:pPr>
+                      <a:r>
+                        <a:rPr lang="en-US" dirty="0" smtClean="0"/>
+                        <a:t>A</a:t>
+                      </a:r>
+                    </a:p>
+                  </a:txBody>
+                  <a:tcPr/>
+                </a:tc>
+                <a:tc>
+                  <a:txBody>
+                    <a:bodyPr/>
+                    <a:lstStyle/>
+                    <a:p>
+                      <a:r>
+                        <a:rPr lang="en-US" dirty="0" smtClean="0"/>
+                        <a:t>A</a:t>
+                      </a:r>
+                      <a:endParaRPr lang="en-US" dirty="0"/>
+                    </a:p>
+                  </a:txBody>
+                  <a:tcPr/>
+                </a:tc>
+                <a:extLst>
+                  <a:ext uri="{0D108BD9-81ED-4DB2-BD59-A6C34878D82A}">
+                    <a16:rowId xmlns:a16="http://schemas.microsoft.com/office/drawing/2014/main" val="382387784"/>
+                  </a:ext>
+                </a:extLst>
+              </a:tr>
+            </a:tbl>
+          </a:graphicData>
+        </a:graphic>
+      </p:graphicFrame>
+      <p:sp>
+        <p:nvSpPr>
+          <p:cNvPr id="2" name="TextBox 1"/>
+          <p:cNvSpPr txBox="1"/>
+          <p:nvPr/>
+        </p:nvSpPr>
+        <p:spPr>
+          <a:xfrm>
+            <a:off x="1155032" y="5612553"/>
+            <a:ext cx="7295459" cy="369332"/>
+          </a:xfrm>
+          <a:prstGeom prst="rect">
+            <a:avLst/>
+          </a:prstGeom>
+          <a:noFill/>
+        </p:spPr>
+        <p:txBody>
+          <a:bodyPr wrap="none" rtlCol="0">
+            <a:spAutoFit/>
+          </a:bodyPr>
+          <a:lstStyle/>
+          <a:p>
+            <a:r>
+              <a:rPr lang="en-US" dirty="0" smtClean="0"/>
+              <a:t>* use </a:t>
+            </a:r>
+            <a:r>
+              <a:rPr lang="en-US" dirty="0" err="1" smtClean="0"/>
+              <a:t>git</a:t>
+            </a:r>
+            <a:r>
+              <a:rPr lang="en-US" dirty="0" smtClean="0"/>
+              <a:t> revert to undo commits visible to public (creates new fixup commit)</a:t>
+            </a:r>
+            <a:endParaRPr lang="en-US" dirty="0"/>
+          </a:p>
+        </p:txBody>
+      </p:sp>
+    </p:spTree>
+    <p:extLst>
+      <p:ext uri="{BB962C8B-B14F-4D97-AF65-F5344CB8AC3E}">
+        <p14:creationId xmlns:p14="http://schemas.microsoft.com/office/powerpoint/2010/main" val="2228637065"/>
+      </p:ext>
+    </p:extLst>
+  </p:cSld>
+  <p:clrMapOvr>
+    <a:masterClrMapping/>
+  </p:clrMapOvr>
+</p:sld>
+</file>
+
+<file path=ppt/slides/slide13.xml><?xml version="1.0" encoding="utf-8"?>
+<p:sld xmlns:a="http://schemas.openxmlformats.org/drawingml/2006/main" xmlns:r="http://schemas.openxmlformats.org/officeDocument/2006/relationships" xmlns:p="http://schemas.openxmlformats.org/presentationml/2006/main">
+  <p:cSld>
+    <p:spTree>
+      <p:nvGrpSpPr>
+        <p:cNvPr id="1" name=""/>
+        <p:cNvGrpSpPr/>
+        <p:nvPr/>
+      </p:nvGrpSpPr>
+      <p:grpSpPr>
+        <a:xfrm>
+          <a:off x="0" y="0"/>
+          <a:ext cx="0" cy="0"/>
+          <a:chOff x="0" y="0"/>
+          <a:chExt cx="0" cy="0"/>
+        </a:xfrm>
+      </p:grpSpPr>
+      <p:sp>
+        <p:nvSpPr>
+          <p:cNvPr id="5" name="TextBox 4"/>
+          <p:cNvSpPr txBox="1"/>
+          <p:nvPr/>
+        </p:nvSpPr>
+        <p:spPr>
+          <a:xfrm>
+            <a:off x="481449" y="393032"/>
+            <a:ext cx="2379434" cy="769441"/>
+          </a:xfrm>
+          <a:prstGeom prst="rect">
+            <a:avLst/>
+          </a:prstGeom>
+          <a:noFill/>
+        </p:spPr>
+        <p:txBody>
+          <a:bodyPr wrap="none" rtlCol="0">
+            <a:spAutoFit/>
+          </a:bodyPr>
+          <a:lstStyle/>
+          <a:p>
+            <a:r>
+              <a:rPr lang="en-US" sz="4400" dirty="0" smtClean="0"/>
+              <a:t>.</a:t>
+            </a:r>
+            <a:r>
+              <a:rPr lang="en-US" sz="4400" dirty="0" err="1" smtClean="0"/>
+              <a:t>gitignore</a:t>
+            </a:r>
+            <a:endParaRPr lang="en-US" sz="4400" dirty="0" smtClean="0"/>
+          </a:p>
+        </p:txBody>
+      </p:sp>
+      <p:sp>
+        <p:nvSpPr>
+          <p:cNvPr id="6" name="TextBox 5"/>
+          <p:cNvSpPr txBox="1"/>
+          <p:nvPr/>
+        </p:nvSpPr>
+        <p:spPr>
+          <a:xfrm>
+            <a:off x="481449" y="1295901"/>
+            <a:ext cx="6444008" cy="1200329"/>
+          </a:xfrm>
+          <a:prstGeom prst="rect">
+            <a:avLst/>
+          </a:prstGeom>
+          <a:noFill/>
+        </p:spPr>
+        <p:txBody>
+          <a:bodyPr wrap="none" rtlCol="0">
+            <a:spAutoFit/>
+          </a:bodyPr>
+          <a:lstStyle/>
+          <a:p>
+            <a:r>
+              <a:rPr lang="en-US" sz="2400" dirty="0" smtClean="0">
+                <a:cs typeface="Consolas" panose="020B0609020204030204" pitchFamily="49" charset="0"/>
+              </a:rPr>
+              <a:t>Files never meant to be in the repository</a:t>
+            </a:r>
+          </a:p>
+          <a:p>
+            <a:r>
+              <a:rPr lang="en-US" sz="2400" dirty="0" smtClean="0">
+                <a:latin typeface="Calibri" panose="020F0502020204030204" pitchFamily="34" charset="0"/>
+                <a:cs typeface="Consolas" panose="020B0609020204030204" pitchFamily="49" charset="0"/>
+              </a:rPr>
+              <a:t>Commit into repository to be used by all members</a:t>
+            </a:r>
+            <a:endParaRPr lang="en-US" sz="2400" dirty="0" smtClean="0">
+              <a:latin typeface="Calibri" panose="020F0502020204030204" pitchFamily="34" charset="0"/>
+              <a:cs typeface="Consolas" panose="020B0609020204030204" pitchFamily="49" charset="0"/>
+            </a:endParaRPr>
+          </a:p>
+          <a:p>
+            <a:endParaRPr lang="en-US" sz="2400" dirty="0">
+              <a:latin typeface="Consolas" panose="020B0609020204030204" pitchFamily="49" charset="0"/>
+              <a:cs typeface="Consolas" panose="020B0609020204030204" pitchFamily="49" charset="0"/>
+            </a:endParaRPr>
+          </a:p>
+        </p:txBody>
+      </p:sp>
+      <p:sp>
+        <p:nvSpPr>
+          <p:cNvPr id="2" name="Rectangle 1"/>
+          <p:cNvSpPr/>
+          <p:nvPr/>
+        </p:nvSpPr>
+        <p:spPr>
+          <a:xfrm>
+            <a:off x="481449" y="2104761"/>
+            <a:ext cx="6096000" cy="4247317"/>
+          </a:xfrm>
+          <a:prstGeom prst="rect">
+            <a:avLst/>
+          </a:prstGeom>
+        </p:spPr>
+        <p:txBody>
+          <a:bodyPr>
+            <a:spAutoFit/>
+          </a:bodyPr>
+          <a:lstStyle/>
+          <a:p>
+            <a:r>
+              <a:rPr lang="en-US" dirty="0"/>
+              <a:t># User-specific files</a:t>
+            </a:r>
+          </a:p>
+          <a:p>
+            <a:r>
+              <a:rPr lang="en-US" dirty="0"/>
+              <a:t>*.</a:t>
+            </a:r>
+            <a:r>
+              <a:rPr lang="en-US" dirty="0" err="1"/>
+              <a:t>suo</a:t>
+            </a:r>
+            <a:endParaRPr lang="en-US" dirty="0"/>
+          </a:p>
+          <a:p>
+            <a:r>
+              <a:rPr lang="en-US" dirty="0"/>
+              <a:t>*.user</a:t>
+            </a:r>
+          </a:p>
+          <a:p>
+            <a:endParaRPr lang="en-US" dirty="0"/>
+          </a:p>
+          <a:p>
+            <a:r>
+              <a:rPr lang="en-US" dirty="0" smtClean="0"/>
+              <a:t># Build results</a:t>
+            </a:r>
+          </a:p>
+          <a:p>
+            <a:r>
+              <a:rPr lang="en-US" dirty="0" smtClean="0"/>
+              <a:t>[</a:t>
+            </a:r>
+            <a:r>
+              <a:rPr lang="en-US" dirty="0" err="1"/>
+              <a:t>Dd</a:t>
+            </a:r>
+            <a:r>
+              <a:rPr lang="en-US" dirty="0"/>
+              <a:t>]</a:t>
+            </a:r>
+            <a:r>
+              <a:rPr lang="en-US" dirty="0" err="1"/>
+              <a:t>ebug</a:t>
+            </a:r>
+            <a:r>
+              <a:rPr lang="en-US" dirty="0"/>
+              <a:t>/</a:t>
+            </a:r>
+          </a:p>
+          <a:p>
+            <a:r>
+              <a:rPr lang="en-US" dirty="0"/>
+              <a:t>[</a:t>
+            </a:r>
+            <a:r>
+              <a:rPr lang="en-US" dirty="0" err="1"/>
+              <a:t>Dd</a:t>
+            </a:r>
+            <a:r>
+              <a:rPr lang="en-US" dirty="0"/>
+              <a:t>]</a:t>
+            </a:r>
+            <a:r>
+              <a:rPr lang="en-US" dirty="0" err="1"/>
+              <a:t>ebugPublic</a:t>
+            </a:r>
+            <a:r>
+              <a:rPr lang="en-US" dirty="0"/>
+              <a:t>/</a:t>
+            </a:r>
+          </a:p>
+          <a:p>
+            <a:r>
+              <a:rPr lang="en-US" dirty="0"/>
+              <a:t>[Rr]</a:t>
+            </a:r>
+            <a:r>
+              <a:rPr lang="en-US" dirty="0" err="1"/>
+              <a:t>elease</a:t>
+            </a:r>
+            <a:r>
+              <a:rPr lang="en-US" dirty="0"/>
+              <a:t>/</a:t>
+            </a:r>
+          </a:p>
+          <a:p>
+            <a:r>
+              <a:rPr lang="en-US" dirty="0"/>
+              <a:t>[Rr]</a:t>
+            </a:r>
+            <a:r>
+              <a:rPr lang="en-US" dirty="0" err="1"/>
+              <a:t>eleases</a:t>
+            </a:r>
+            <a:r>
+              <a:rPr lang="en-US" dirty="0"/>
+              <a:t>/</a:t>
+            </a:r>
+          </a:p>
+          <a:p>
+            <a:r>
+              <a:rPr lang="en-US" dirty="0"/>
+              <a:t>x64/</a:t>
+            </a:r>
+          </a:p>
+          <a:p>
+            <a:r>
+              <a:rPr lang="en-US" dirty="0"/>
+              <a:t>x86/</a:t>
+            </a:r>
+          </a:p>
+          <a:p>
+            <a:r>
+              <a:rPr lang="en-US" dirty="0"/>
+              <a:t>build/</a:t>
+            </a:r>
+          </a:p>
+          <a:p>
+            <a:r>
+              <a:rPr lang="en-US" dirty="0" err="1"/>
+              <a:t>bld</a:t>
+            </a:r>
+            <a:r>
+              <a:rPr lang="en-US" dirty="0"/>
+              <a:t>/</a:t>
+            </a:r>
+          </a:p>
+          <a:p>
+            <a:r>
+              <a:rPr lang="en-US" dirty="0"/>
+              <a:t>[Bb]in/</a:t>
+            </a:r>
+          </a:p>
+          <a:p>
+            <a:r>
+              <a:rPr lang="en-US" dirty="0"/>
+              <a:t>[</a:t>
+            </a:r>
+            <a:r>
+              <a:rPr lang="en-US" dirty="0" err="1"/>
+              <a:t>Oo</a:t>
+            </a:r>
+            <a:r>
+              <a:rPr lang="en-US" dirty="0"/>
+              <a:t>]</a:t>
+            </a:r>
+            <a:r>
+              <a:rPr lang="en-US" dirty="0" err="1"/>
+              <a:t>bj</a:t>
+            </a:r>
+            <a:r>
+              <a:rPr lang="en-US" dirty="0"/>
+              <a:t>/</a:t>
+            </a:r>
+          </a:p>
+        </p:txBody>
+      </p:sp>
+    </p:spTree>
+    <p:extLst>
+      <p:ext uri="{BB962C8B-B14F-4D97-AF65-F5344CB8AC3E}">
+        <p14:creationId xmlns:p14="http://schemas.microsoft.com/office/powerpoint/2010/main" val="1502701563"/>
+      </p:ext>
+    </p:extLst>
+  </p:cSld>
+  <p:clrMapOvr>
+    <a:masterClrMapping/>
+  </p:clrMapOvr>
+</p:sld>
+</file>
+
+<file path=ppt/slides/slide14.xml><?xml version="1.0" encoding="utf-8"?>
+<p:sld xmlns:a="http://schemas.openxmlformats.org/drawingml/2006/main" xmlns:r="http://schemas.openxmlformats.org/officeDocument/2006/relationships" xmlns:p="http://schemas.openxmlformats.org/presentationml/2006/main">
+  <p:cSld>
+    <p:spTree>
+      <p:nvGrpSpPr>
+        <p:cNvPr id="1" name=""/>
+        <p:cNvGrpSpPr/>
+        <p:nvPr/>
+      </p:nvGrpSpPr>
+      <p:grpSpPr>
+        <a:xfrm>
+          <a:off x="0" y="0"/>
+          <a:ext cx="0" cy="0"/>
+          <a:chOff x="0" y="0"/>
+          <a:chExt cx="0" cy="0"/>
+        </a:xfrm>
+      </p:grpSpPr>
+      <p:sp>
+        <p:nvSpPr>
+          <p:cNvPr id="5" name="TextBox 4"/>
+          <p:cNvSpPr txBox="1"/>
+          <p:nvPr/>
+        </p:nvSpPr>
+        <p:spPr>
+          <a:xfrm>
+            <a:off x="481449" y="393032"/>
             <a:ext cx="5411803" cy="769441"/>
           </a:xfrm>
           <a:prstGeom prst="rect">
@@ -3201,7 +6197,7 @@
         <p:spPr>
           <a:xfrm>
             <a:off x="481449" y="1857375"/>
-            <a:ext cx="4498347" cy="3046988"/>
+            <a:ext cx="6493124" cy="4278094"/>
           </a:xfrm>
           <a:prstGeom prst="rect">
             <a:avLst/>
@@ -3245,8 +6241,58 @@
                 <a:latin typeface="Consolas" panose="020B0609020204030204" pitchFamily="49" charset="0"/>
                 <a:cs typeface="Consolas" panose="020B0609020204030204" pitchFamily="49" charset="0"/>
               </a:rPr>
-              <a:t> log</a:t>
-            </a:r>
+              <a:t> </a:t>
+            </a:r>
+            <a:r>
+              <a:rPr lang="en-US" sz="3200" dirty="0" smtClean="0">
+                <a:latin typeface="Consolas" panose="020B0609020204030204" pitchFamily="49" charset="0"/>
+                <a:cs typeface="Consolas" panose="020B0609020204030204" pitchFamily="49" charset="0"/>
+              </a:rPr>
+              <a:t>log</a:t>
+            </a:r>
+          </a:p>
+          <a:p>
+            <a:r>
+              <a:rPr lang="en-US" sz="3200" dirty="0" smtClean="0">
+                <a:latin typeface="Consolas" panose="020B0609020204030204" pitchFamily="49" charset="0"/>
+                <a:cs typeface="Consolas" panose="020B0609020204030204" pitchFamily="49" charset="0"/>
+              </a:rPr>
+              <a:t>	</a:t>
+            </a:r>
+            <a:r>
+              <a:rPr lang="en-US" sz="3200" dirty="0" err="1" smtClean="0">
+                <a:latin typeface="Consolas" panose="020B0609020204030204" pitchFamily="49" charset="0"/>
+                <a:cs typeface="Consolas" panose="020B0609020204030204" pitchFamily="49" charset="0"/>
+              </a:rPr>
+              <a:t>git</a:t>
+            </a:r>
+            <a:r>
+              <a:rPr lang="en-US" sz="3200" dirty="0" smtClean="0">
+                <a:latin typeface="Consolas" panose="020B0609020204030204" pitchFamily="49" charset="0"/>
+                <a:cs typeface="Consolas" panose="020B0609020204030204" pitchFamily="49" charset="0"/>
+              </a:rPr>
+              <a:t> show</a:t>
+            </a:r>
+          </a:p>
+          <a:p>
+            <a:r>
+              <a:rPr lang="en-US" sz="3200" dirty="0">
+                <a:latin typeface="Consolas" panose="020B0609020204030204" pitchFamily="49" charset="0"/>
+                <a:cs typeface="Consolas" panose="020B0609020204030204" pitchFamily="49" charset="0"/>
+              </a:rPr>
+              <a:t>	</a:t>
+            </a:r>
+            <a:r>
+              <a:rPr lang="en-US" sz="3200" dirty="0" err="1" smtClean="0">
+                <a:latin typeface="Consolas" panose="020B0609020204030204" pitchFamily="49" charset="0"/>
+                <a:cs typeface="Consolas" panose="020B0609020204030204" pitchFamily="49" charset="0"/>
+              </a:rPr>
+              <a:t>gitk</a:t>
+            </a:r>
+            <a:endParaRPr lang="en-US" sz="3200" dirty="0" smtClean="0">
+              <a:latin typeface="Consolas" panose="020B0609020204030204" pitchFamily="49" charset="0"/>
+              <a:cs typeface="Consolas" panose="020B0609020204030204" pitchFamily="49" charset="0"/>
+            </a:endParaRPr>
           </a:p>
           <a:p>
             <a:endParaRPr lang="en-US" sz="3200" dirty="0">
@@ -3263,8 +6309,17 @@
               <a:rPr lang="en-US" sz="3200" dirty="0" smtClean="0">
                 <a:cs typeface="Consolas" panose="020B0609020204030204" pitchFamily="49" charset="0"/>
               </a:rPr>
-              <a:t>Go back</a:t>
-            </a:r>
+              <a:t>Go </a:t>
+            </a:r>
+            <a:r>
+              <a:rPr lang="en-US" sz="3200" dirty="0" smtClean="0">
+                <a:cs typeface="Consolas" panose="020B0609020204030204" pitchFamily="49" charset="0"/>
+              </a:rPr>
+              <a:t>back and forth</a:t>
+            </a:r>
+            <a:endParaRPr lang="en-US" sz="3200" dirty="0" smtClean="0">
+              <a:cs typeface="Consolas" panose="020B0609020204030204" pitchFamily="49" charset="0"/>
+            </a:endParaRPr>
           </a:p>
           <a:p>
             <a:r>
@@ -3286,12 +6341,39 @@
                 <a:latin typeface="Consolas" panose="020B0609020204030204" pitchFamily="49" charset="0"/>
                 <a:cs typeface="Consolas" panose="020B0609020204030204" pitchFamily="49" charset="0"/>
               </a:rPr>
-              <a:t> checkout &lt;&gt;</a:t>
+              <a:t> checkout </a:t>
+            </a:r>
+            <a:r>
+              <a:rPr lang="en-US" sz="3200" dirty="0" smtClean="0">
+                <a:latin typeface="Consolas" panose="020B0609020204030204" pitchFamily="49" charset="0"/>
+                <a:cs typeface="Consolas" panose="020B0609020204030204" pitchFamily="49" charset="0"/>
+              </a:rPr>
+              <a:t>&lt;commit&gt;</a:t>
             </a:r>
           </a:p>
           <a:p>
             <a:endParaRPr lang="en-US" sz="3200" dirty="0">
               <a:latin typeface="Consolas" panose="020B0609020204030204" pitchFamily="49" charset="0"/>
+              <a:cs typeface="Consolas" panose="020B0609020204030204" pitchFamily="49" charset="0"/>
+            </a:endParaRPr>
+          </a:p>
+          <a:p>
+            <a:r>
+              <a:rPr lang="en-US" sz="1600" dirty="0" smtClean="0">
+                <a:latin typeface="Calibri" panose="020F0502020204030204" pitchFamily="34" charset="0"/>
+                <a:cs typeface="Consolas" panose="020B0609020204030204" pitchFamily="49" charset="0"/>
+              </a:rPr>
+              <a:t>Bonus: From any point, you can mess with the code and start a </a:t>
+            </a:r>
+            <a:r>
+              <a:rPr lang="en-US" sz="1600" smtClean="0">
+                <a:latin typeface="Calibri" panose="020F0502020204030204" pitchFamily="34" charset="0"/>
+                <a:cs typeface="Consolas" panose="020B0609020204030204" pitchFamily="49" charset="0"/>
+              </a:rPr>
+              <a:t>new branch!</a:t>
+            </a:r>
+            <a:endParaRPr lang="en-US" sz="1600" dirty="0" smtClean="0">
+              <a:latin typeface="Calibri" panose="020F0502020204030204" pitchFamily="34" charset="0"/>
               <a:cs typeface="Consolas" panose="020B0609020204030204" pitchFamily="49" charset="0"/>
             </a:endParaRPr>
           </a:p>
@@ -3340,7 +6422,7 @@
       </p:pic>
       <p:pic>
         <p:nvPicPr>
-          <p:cNvPr id="10248" name="Picture 8" descr="back_to_the_future_time_dates_by_mjmstudios2020-d8zq0r9.png (768×410)"/>
+          <p:cNvPr id="1026" name="Picture 2" descr="https://c1.staticflickr.com/5/4068/4660187571_8a5c3f380d.jpg"/>
           <p:cNvPicPr>
             <a:picLocks noChangeAspect="1" noChangeArrowheads="1"/>
           </p:cNvPicPr>
@@ -3361,8 +6443,8 @@
         </p:blipFill>
         <p:spPr bwMode="auto">
           <a:xfrm>
-            <a:off x="7560127" y="4119532"/>
-            <a:ext cx="3955598" cy="2111713"/>
+            <a:off x="8198768" y="3790450"/>
+            <a:ext cx="3341437" cy="2506078"/>
           </a:xfrm>
           <a:prstGeom prst="rect">
             <a:avLst/>
@@ -3389,17 +6471,10 @@
   <p:clrMapOvr>
     <a:masterClrMapping/>
   </p:clrMapOvr>
-  <p:timing>
-    <p:tnLst>
-      <p:par>
-        <p:cTn id="1" dur="indefinite" restart="never" nodeType="tmRoot"/>
-      </p:par>
-    </p:tnLst>
-  </p:timing>
 </p:sld>
 </file>
 
-<file path=ppt/slides/slide11.xml><?xml version="1.0" encoding="utf-8"?>
+<file path=ppt/slides/slide15.xml><?xml version="1.0" encoding="utf-8"?>
 <p:sld xmlns:a="http://schemas.openxmlformats.org/drawingml/2006/main" xmlns:r="http://schemas.openxmlformats.org/officeDocument/2006/relationships" xmlns:p="http://schemas.openxmlformats.org/presentationml/2006/main">
   <p:cSld>
     <p:spTree>
@@ -3424,7 +6499,7 @@
         </p:nvSpPr>
         <p:spPr>
           <a:xfrm>
-            <a:off x="481449" y="393032"/>
+            <a:off x="481449" y="146222"/>
             <a:ext cx="4994316" cy="769441"/>
           </a:xfrm>
           <a:prstGeom prst="rect">
@@ -3454,8 +6529,8 @@
         </p:nvSpPr>
         <p:spPr>
           <a:xfrm>
-            <a:off x="481449" y="1348800"/>
-            <a:ext cx="7662675" cy="5509200"/>
+            <a:off x="481449" y="915663"/>
+            <a:ext cx="11053026" cy="6001643"/>
           </a:xfrm>
           <a:prstGeom prst="rect">
             <a:avLst/>
@@ -3474,10 +6549,23 @@
             </a:pPr>
             <a:r>
               <a:rPr lang="en-US" sz="3200" dirty="0" smtClean="0">
-                <a:cs typeface="Consolas" panose="020B0609020204030204" pitchFamily="49" charset="0"/>
-              </a:rPr>
-              <a:t>UUID</a:t>
-            </a:r>
+                <a:solidFill>
+                  <a:schemeClr val="accent1">
+                    <a:lumMod val="75000"/>
+                  </a:schemeClr>
+                </a:solidFill>
+                <a:cs typeface="Consolas" panose="020B0609020204030204" pitchFamily="49" charset="0"/>
+              </a:rPr>
+              <a:t>SHA-1 hash</a:t>
+            </a:r>
+            <a:endParaRPr lang="en-US" sz="3200" dirty="0" smtClean="0">
+              <a:solidFill>
+                <a:schemeClr val="accent1">
+                  <a:lumMod val="75000"/>
+                </a:schemeClr>
+              </a:solidFill>
+              <a:cs typeface="Consolas" panose="020B0609020204030204" pitchFamily="49" charset="0"/>
+            </a:endParaRPr>
           </a:p>
           <a:p>
             <a:r>
@@ -3485,11 +6573,46 @@
                 <a:latin typeface="Consolas" panose="020B0609020204030204" pitchFamily="49" charset="0"/>
                 <a:cs typeface="Consolas" panose="020B0609020204030204" pitchFamily="49" charset="0"/>
               </a:rPr>
-              <a:t>	because of distributed nature</a:t>
-            </a:r>
-          </a:p>
-          <a:p>
-            <a:endParaRPr lang="en-US" sz="3200" dirty="0">
+              <a:t>	</a:t>
+            </a:r>
+            <a:r>
+              <a:rPr lang="en-US" sz="3200" dirty="0" smtClean="0">
+                <a:latin typeface="Consolas" panose="020B0609020204030204" pitchFamily="49" charset="0"/>
+                <a:cs typeface="Consolas" panose="020B0609020204030204" pitchFamily="49" charset="0"/>
+              </a:rPr>
+              <a:t>not sequential because </a:t>
+            </a:r>
+            <a:r>
+              <a:rPr lang="en-US" sz="3200" dirty="0" smtClean="0">
+                <a:latin typeface="Consolas" panose="020B0609020204030204" pitchFamily="49" charset="0"/>
+                <a:cs typeface="Consolas" panose="020B0609020204030204" pitchFamily="49" charset="0"/>
+              </a:rPr>
+              <a:t>of distributed </a:t>
+            </a:r>
+            <a:r>
+              <a:rPr lang="en-US" sz="3200" dirty="0" smtClean="0">
+                <a:latin typeface="Consolas" panose="020B0609020204030204" pitchFamily="49" charset="0"/>
+                <a:cs typeface="Consolas" panose="020B0609020204030204" pitchFamily="49" charset="0"/>
+              </a:rPr>
+              <a:t>nature</a:t>
+            </a:r>
+          </a:p>
+          <a:p>
+            <a:r>
+              <a:rPr lang="en-US" sz="3200" dirty="0">
+                <a:latin typeface="Consolas" panose="020B0609020204030204" pitchFamily="49" charset="0"/>
+                <a:cs typeface="Consolas" panose="020B0609020204030204" pitchFamily="49" charset="0"/>
+              </a:rPr>
+              <a:t>	</a:t>
+            </a:r>
+            <a:r>
+              <a:rPr lang="en-US" sz="3200" dirty="0" smtClean="0">
+                <a:latin typeface="Consolas" panose="020B0609020204030204" pitchFamily="49" charset="0"/>
+                <a:cs typeface="Consolas" panose="020B0609020204030204" pitchFamily="49" charset="0"/>
+              </a:rPr>
+              <a:t>usually several first digits are enough</a:t>
+            </a:r>
+            <a:endParaRPr lang="en-US" sz="3200" dirty="0" smtClean="0">
               <a:latin typeface="Consolas" panose="020B0609020204030204" pitchFamily="49" charset="0"/>
               <a:cs typeface="Consolas" panose="020B0609020204030204" pitchFamily="49" charset="0"/>
             </a:endParaRPr>
@@ -3503,8 +6626,62 @@
               <a:rPr lang="en-US" sz="3200" dirty="0" smtClean="0">
                 <a:cs typeface="Consolas" panose="020B0609020204030204" pitchFamily="49" charset="0"/>
               </a:rPr>
+              <a:t>&lt;</a:t>
+            </a:r>
+            <a:r>
+              <a:rPr lang="en-US" sz="3200" dirty="0" smtClean="0">
+                <a:solidFill>
+                  <a:schemeClr val="accent1">
+                    <a:lumMod val="75000"/>
+                  </a:schemeClr>
+                </a:solidFill>
+                <a:cs typeface="Consolas" panose="020B0609020204030204" pitchFamily="49" charset="0"/>
+              </a:rPr>
+              <a:t>branch name</a:t>
+            </a:r>
+            <a:r>
+              <a:rPr lang="en-US" sz="3200" dirty="0" smtClean="0">
+                <a:cs typeface="Consolas" panose="020B0609020204030204" pitchFamily="49" charset="0"/>
+              </a:rPr>
+              <a:t>&gt;</a:t>
+            </a:r>
+          </a:p>
+          <a:p>
+            <a:pPr lvl="1"/>
+            <a:r>
+              <a:rPr lang="en-US" sz="3200" dirty="0" smtClean="0">
+                <a:cs typeface="Consolas" panose="020B0609020204030204" pitchFamily="49" charset="0"/>
+              </a:rPr>
+              <a:t>	top commit of the branch</a:t>
+            </a:r>
+            <a:endParaRPr lang="en-US" sz="3200" dirty="0" smtClean="0">
+              <a:cs typeface="Consolas" panose="020B0609020204030204" pitchFamily="49" charset="0"/>
+            </a:endParaRPr>
+          </a:p>
+          <a:p>
+            <a:pPr marL="285750" indent="-285750">
+              <a:buFont typeface="Arial" panose="020B0604020202020204" pitchFamily="34" charset="0"/>
+              <a:buChar char="•"/>
+            </a:pPr>
+            <a:r>
+              <a:rPr lang="en-US" sz="3200" dirty="0" smtClean="0">
+                <a:solidFill>
+                  <a:schemeClr val="accent1">
+                    <a:lumMod val="75000"/>
+                  </a:schemeClr>
+                </a:solidFill>
+                <a:cs typeface="Consolas" panose="020B0609020204030204" pitchFamily="49" charset="0"/>
+              </a:rPr>
               <a:t>HEAD</a:t>
             </a:r>
+            <a:endParaRPr lang="en-US" sz="3200" dirty="0" smtClean="0">
+              <a:solidFill>
+                <a:schemeClr val="accent1">
+                  <a:lumMod val="75000"/>
+                </a:schemeClr>
+              </a:solidFill>
+              <a:cs typeface="Consolas" panose="020B0609020204030204" pitchFamily="49" charset="0"/>
+            </a:endParaRPr>
           </a:p>
           <a:p>
             <a:r>
@@ -3512,7 +6689,14 @@
                 <a:latin typeface="Consolas" panose="020B0609020204030204" pitchFamily="49" charset="0"/>
                 <a:cs typeface="Consolas" panose="020B0609020204030204" pitchFamily="49" charset="0"/>
               </a:rPr>
-              <a:t>	where are we currently</a:t>
+              <a:t>	where are we </a:t>
+            </a:r>
+            <a:r>
+              <a:rPr lang="en-US" sz="3200" dirty="0" smtClean="0">
+                <a:latin typeface="Consolas" panose="020B0609020204030204" pitchFamily="49" charset="0"/>
+                <a:cs typeface="Consolas" panose="020B0609020204030204" pitchFamily="49" charset="0"/>
+              </a:rPr>
+              <a:t>currently</a:t>
             </a:r>
           </a:p>
           <a:p>
@@ -3520,6 +6704,65 @@
               <a:buFont typeface="Arial" panose="020B0604020202020204" pitchFamily="34" charset="0"/>
               <a:buChar char="•"/>
             </a:pPr>
+            <a:r>
+              <a:rPr lang="en-US" sz="3200" dirty="0" smtClean="0">
+                <a:solidFill>
+                  <a:schemeClr val="accent1">
+                    <a:lumMod val="75000"/>
+                  </a:schemeClr>
+                </a:solidFill>
+                <a:latin typeface="Consolas" panose="020B0609020204030204" pitchFamily="49" charset="0"/>
+                <a:cs typeface="Consolas" panose="020B0609020204030204" pitchFamily="49" charset="0"/>
+              </a:rPr>
+              <a:t>HEAD~</a:t>
+            </a:r>
+            <a:endParaRPr lang="en-US" sz="3200" dirty="0" smtClean="0">
+              <a:solidFill>
+                <a:schemeClr val="accent1">
+                  <a:lumMod val="75000"/>
+                </a:schemeClr>
+              </a:solidFill>
+              <a:latin typeface="Consolas" panose="020B0609020204030204" pitchFamily="49" charset="0"/>
+              <a:cs typeface="Consolas" panose="020B0609020204030204" pitchFamily="49" charset="0"/>
+            </a:endParaRPr>
+          </a:p>
+          <a:p>
+            <a:pPr marL="0" lvl="1"/>
+            <a:r>
+              <a:rPr lang="en-US" sz="3200" dirty="0" smtClean="0">
+                <a:latin typeface="Consolas" panose="020B0609020204030204" pitchFamily="49" charset="0"/>
+                <a:cs typeface="Consolas" panose="020B0609020204030204" pitchFamily="49" charset="0"/>
+              </a:rPr>
+              <a:t>	</a:t>
+            </a:r>
+            <a:r>
+              <a:rPr lang="en-US" sz="3200" dirty="0" smtClean="0">
+                <a:latin typeface="Consolas" panose="020B0609020204030204" pitchFamily="49" charset="0"/>
+                <a:cs typeface="Consolas" panose="020B0609020204030204" pitchFamily="49" charset="0"/>
+              </a:rPr>
+              <a:t>parent, the commit </a:t>
+            </a:r>
+            <a:r>
+              <a:rPr lang="en-US" sz="3200" dirty="0" smtClean="0">
+                <a:latin typeface="Consolas" panose="020B0609020204030204" pitchFamily="49" charset="0"/>
+                <a:cs typeface="Consolas" panose="020B0609020204030204" pitchFamily="49" charset="0"/>
+              </a:rPr>
+              <a:t>before </a:t>
+            </a:r>
+            <a:r>
+              <a:rPr lang="en-US" sz="3200" dirty="0" smtClean="0">
+                <a:latin typeface="Consolas" panose="020B0609020204030204" pitchFamily="49" charset="0"/>
+                <a:cs typeface="Consolas" panose="020B0609020204030204" pitchFamily="49" charset="0"/>
+              </a:rPr>
+              <a:t>where are </a:t>
+            </a:r>
+            <a:r>
+              <a:rPr lang="en-US" sz="3200" dirty="0" smtClean="0">
+                <a:latin typeface="Consolas" panose="020B0609020204030204" pitchFamily="49" charset="0"/>
+                <a:cs typeface="Consolas" panose="020B0609020204030204" pitchFamily="49" charset="0"/>
+              </a:rPr>
+              <a:t>we</a:t>
+            </a:r>
             <a:endParaRPr lang="en-US" sz="3200" dirty="0" smtClean="0">
               <a:latin typeface="Consolas" panose="020B0609020204030204" pitchFamily="49" charset="0"/>
               <a:cs typeface="Consolas" panose="020B0609020204030204" pitchFamily="49" charset="0"/>
@@ -3532,44 +6775,36 @@
             </a:pPr>
             <a:r>
               <a:rPr lang="en-US" sz="3200" dirty="0" smtClean="0">
+                <a:solidFill>
+                  <a:schemeClr val="accent1">
+                    <a:lumMod val="75000"/>
+                  </a:schemeClr>
+                </a:solidFill>
                 <a:latin typeface="Consolas" panose="020B0609020204030204" pitchFamily="49" charset="0"/>
                 <a:cs typeface="Consolas" panose="020B0609020204030204" pitchFamily="49" charset="0"/>
               </a:rPr>
-              <a:t>HEAD~1</a:t>
-            </a:r>
-          </a:p>
-          <a:p>
-            <a:pPr marL="0" lvl="1"/>
+              <a:t>HEAD~2</a:t>
+            </a:r>
+          </a:p>
+          <a:p>
+            <a:r>
+              <a:rPr lang="en-US" sz="3200" dirty="0">
+                <a:latin typeface="Consolas" panose="020B0609020204030204" pitchFamily="49" charset="0"/>
+                <a:cs typeface="Consolas" panose="020B0609020204030204" pitchFamily="49" charset="0"/>
+              </a:rPr>
+              <a:t>	</a:t>
+            </a:r>
             <a:r>
               <a:rPr lang="en-US" sz="3200" dirty="0" smtClean="0">
                 <a:latin typeface="Consolas" panose="020B0609020204030204" pitchFamily="49" charset="0"/>
                 <a:cs typeface="Consolas" panose="020B0609020204030204" pitchFamily="49" charset="0"/>
               </a:rPr>
-              <a:t>	the one before where are we</a:t>
-            </a:r>
-          </a:p>
-          <a:p>
-            <a:pPr marL="457200" indent="-457200">
-              <a:buFont typeface="Arial" panose="020B0604020202020204" pitchFamily="34" charset="0"/>
-              <a:buChar char="•"/>
-            </a:pPr>
+              <a:t>two commits before etc.</a:t>
+            </a:r>
             <a:endParaRPr lang="en-US" sz="3200" dirty="0" smtClean="0">
               <a:latin typeface="Consolas" panose="020B0609020204030204" pitchFamily="49" charset="0"/>
               <a:cs typeface="Consolas" panose="020B0609020204030204" pitchFamily="49" charset="0"/>
             </a:endParaRPr>
-          </a:p>
-          <a:p>
-            <a:pPr marL="457200" indent="-457200">
-              <a:buFont typeface="Arial" panose="020B0604020202020204" pitchFamily="34" charset="0"/>
-              <a:buChar char="•"/>
-            </a:pPr>
-            <a:r>
-              <a:rPr lang="en-US" sz="3200" dirty="0" smtClean="0">
-                <a:latin typeface="Consolas" panose="020B0609020204030204" pitchFamily="49" charset="0"/>
-                <a:cs typeface="Consolas" panose="020B0609020204030204" pitchFamily="49" charset="0"/>
-              </a:rPr>
-              <a:t>HEAD~2 etc.</a:t>
-            </a:r>
           </a:p>
           <a:p>
             <a:endParaRPr lang="en-US" sz="3200" dirty="0">
@@ -3589,17 +6824,10 @@
   <p:clrMapOvr>
     <a:masterClrMapping/>
   </p:clrMapOvr>
-  <p:timing>
-    <p:tnLst>
-      <p:par>
-        <p:cTn id="1" dur="indefinite" restart="never" nodeType="tmRoot"/>
-      </p:par>
-    </p:tnLst>
-  </p:timing>
 </p:sld>
 </file>
 
-<file path=ppt/slides/slide12.xml><?xml version="1.0" encoding="utf-8"?>
+<file path=ppt/slides/slide16.xml><?xml version="1.0" encoding="utf-8"?>
 <p:sld xmlns:a="http://schemas.openxmlformats.org/drawingml/2006/main" xmlns:r="http://schemas.openxmlformats.org/officeDocument/2006/relationships" xmlns:p="http://schemas.openxmlformats.org/presentationml/2006/main">
   <p:cSld>
     <p:spTree>
@@ -3676,8 +6904,17 @@
               <a:rPr lang="en-US" sz="3200" dirty="0" smtClean="0">
                 <a:cs typeface="Consolas" panose="020B0609020204030204" pitchFamily="49" charset="0"/>
               </a:rPr>
-              <a:t>Difference to last commit</a:t>
-            </a:r>
+              <a:t>Difference </a:t>
+            </a:r>
+            <a:r>
+              <a:rPr lang="en-US" sz="3200" dirty="0" smtClean="0">
+                <a:cs typeface="Consolas" panose="020B0609020204030204" pitchFamily="49" charset="0"/>
+              </a:rPr>
+              <a:t>to index</a:t>
+            </a:r>
+            <a:endParaRPr lang="en-US" sz="3200" dirty="0" smtClean="0">
+              <a:cs typeface="Consolas" panose="020B0609020204030204" pitchFamily="49" charset="0"/>
+            </a:endParaRPr>
           </a:p>
           <a:p>
             <a:r>
@@ -3895,13 +7132,305 @@
   <p:clrMapOvr>
     <a:masterClrMapping/>
   </p:clrMapOvr>
-  <p:timing>
-    <p:tnLst>
-      <p:par>
-        <p:cTn id="1" dur="indefinite" restart="never" nodeType="tmRoot"/>
-      </p:par>
-    </p:tnLst>
-  </p:timing>
+</p:sld>
+</file>
+
+<file path=ppt/slides/slide17.xml><?xml version="1.0" encoding="utf-8"?>
+<p:sld xmlns:a="http://schemas.openxmlformats.org/drawingml/2006/main" xmlns:r="http://schemas.openxmlformats.org/officeDocument/2006/relationships" xmlns:p="http://schemas.openxmlformats.org/presentationml/2006/main">
+  <p:cSld>
+    <p:spTree>
+      <p:nvGrpSpPr>
+        <p:cNvPr id="1" name=""/>
+        <p:cNvGrpSpPr/>
+        <p:nvPr/>
+      </p:nvGrpSpPr>
+      <p:grpSpPr>
+        <a:xfrm>
+          <a:off x="0" y="0"/>
+          <a:ext cx="0" cy="0"/>
+          <a:chOff x="0" y="0"/>
+          <a:chExt cx="0" cy="0"/>
+        </a:xfrm>
+      </p:grpSpPr>
+      <p:sp>
+        <p:nvSpPr>
+          <p:cNvPr id="5" name="TextBox 4"/>
+          <p:cNvSpPr txBox="1"/>
+          <p:nvPr/>
+        </p:nvSpPr>
+        <p:spPr>
+          <a:xfrm>
+            <a:off x="481449" y="393032"/>
+            <a:ext cx="1213666" cy="769441"/>
+          </a:xfrm>
+          <a:prstGeom prst="rect">
+            <a:avLst/>
+          </a:prstGeom>
+          <a:noFill/>
+        </p:spPr>
+        <p:txBody>
+          <a:bodyPr wrap="none" rtlCol="0">
+            <a:spAutoFit/>
+          </a:bodyPr>
+          <a:lstStyle/>
+          <a:p>
+            <a:r>
+              <a:rPr lang="en-US" sz="4400" dirty="0" smtClean="0"/>
+              <a:t>Diffs</a:t>
+            </a:r>
+            <a:endParaRPr lang="en-US" sz="4400" dirty="0"/>
+          </a:p>
+        </p:txBody>
+      </p:sp>
+      <p:sp>
+        <p:nvSpPr>
+          <p:cNvPr id="3" name="TextBox 2"/>
+          <p:cNvSpPr txBox="1"/>
+          <p:nvPr/>
+        </p:nvSpPr>
+        <p:spPr>
+          <a:xfrm>
+            <a:off x="481449" y="1348800"/>
+            <a:ext cx="6296917" cy="6494085"/>
+          </a:xfrm>
+          <a:prstGeom prst="rect">
+            <a:avLst/>
+          </a:prstGeom>
+          <a:noFill/>
+        </p:spPr>
+        <p:txBody>
+          <a:bodyPr wrap="none" rtlCol="0">
+            <a:spAutoFit/>
+          </a:bodyPr>
+          <a:lstStyle/>
+          <a:p>
+            <a:pPr marL="285750" indent="-285750">
+              <a:buFont typeface="Arial" panose="020B0604020202020204" pitchFamily="34" charset="0"/>
+              <a:buChar char="•"/>
+            </a:pPr>
+            <a:r>
+              <a:rPr lang="en-US" sz="3200" dirty="0" smtClean="0">
+                <a:cs typeface="Consolas" panose="020B0609020204030204" pitchFamily="49" charset="0"/>
+              </a:rPr>
+              <a:t>Difference to last commit</a:t>
+            </a:r>
+          </a:p>
+          <a:p>
+            <a:r>
+              <a:rPr lang="en-US" sz="3200" dirty="0">
+                <a:latin typeface="Consolas" panose="020B0609020204030204" pitchFamily="49" charset="0"/>
+                <a:cs typeface="Consolas" panose="020B0609020204030204" pitchFamily="49" charset="0"/>
+              </a:rPr>
+              <a:t>	</a:t>
+            </a:r>
+            <a:r>
+              <a:rPr lang="en-US" sz="3200" dirty="0" err="1" smtClean="0">
+                <a:latin typeface="Consolas" panose="020B0609020204030204" pitchFamily="49" charset="0"/>
+                <a:cs typeface="Consolas" panose="020B0609020204030204" pitchFamily="49" charset="0"/>
+              </a:rPr>
+              <a:t>git</a:t>
+            </a:r>
+            <a:r>
+              <a:rPr lang="en-US" sz="3200" dirty="0" smtClean="0">
+                <a:latin typeface="Consolas" panose="020B0609020204030204" pitchFamily="49" charset="0"/>
+                <a:cs typeface="Consolas" panose="020B0609020204030204" pitchFamily="49" charset="0"/>
+              </a:rPr>
+              <a:t> diff</a:t>
+            </a:r>
+          </a:p>
+          <a:p>
+            <a:endParaRPr lang="en-US" sz="3200" dirty="0">
+              <a:latin typeface="Consolas" panose="020B0609020204030204" pitchFamily="49" charset="0"/>
+              <a:cs typeface="Consolas" panose="020B0609020204030204" pitchFamily="49" charset="0"/>
+            </a:endParaRPr>
+          </a:p>
+          <a:p>
+            <a:pPr marL="285750" indent="-285750">
+              <a:buFont typeface="Arial" panose="020B0604020202020204" pitchFamily="34" charset="0"/>
+              <a:buChar char="•"/>
+            </a:pPr>
+            <a:r>
+              <a:rPr lang="en-US" sz="3200" dirty="0" smtClean="0">
+                <a:cs typeface="Consolas" panose="020B0609020204030204" pitchFamily="49" charset="0"/>
+              </a:rPr>
+              <a:t>Graphical one</a:t>
+            </a:r>
+          </a:p>
+          <a:p>
+            <a:r>
+              <a:rPr lang="en-US" sz="3200" dirty="0">
+                <a:latin typeface="Consolas" panose="020B0609020204030204" pitchFamily="49" charset="0"/>
+                <a:cs typeface="Consolas" panose="020B0609020204030204" pitchFamily="49" charset="0"/>
+              </a:rPr>
+              <a:t>	</a:t>
+            </a:r>
+            <a:r>
+              <a:rPr lang="en-US" sz="3200" dirty="0" err="1" smtClean="0">
+                <a:latin typeface="Consolas" panose="020B0609020204030204" pitchFamily="49" charset="0"/>
+                <a:cs typeface="Consolas" panose="020B0609020204030204" pitchFamily="49" charset="0"/>
+              </a:rPr>
+              <a:t>git</a:t>
+            </a:r>
+            <a:r>
+              <a:rPr lang="en-US" sz="3200" dirty="0" smtClean="0">
+                <a:latin typeface="Consolas" panose="020B0609020204030204" pitchFamily="49" charset="0"/>
+                <a:cs typeface="Consolas" panose="020B0609020204030204" pitchFamily="49" charset="0"/>
+              </a:rPr>
+              <a:t> </a:t>
+            </a:r>
+            <a:r>
+              <a:rPr lang="en-US" sz="3200" dirty="0" err="1" smtClean="0">
+                <a:latin typeface="Consolas" panose="020B0609020204030204" pitchFamily="49" charset="0"/>
+                <a:cs typeface="Consolas" panose="020B0609020204030204" pitchFamily="49" charset="0"/>
+              </a:rPr>
+              <a:t>difftool</a:t>
+            </a:r>
+            <a:endParaRPr lang="en-US" sz="3200" dirty="0" smtClean="0">
+              <a:latin typeface="Consolas" panose="020B0609020204030204" pitchFamily="49" charset="0"/>
+              <a:cs typeface="Consolas" panose="020B0609020204030204" pitchFamily="49" charset="0"/>
+            </a:endParaRPr>
+          </a:p>
+          <a:p>
+            <a:pPr marL="457200" indent="-457200">
+              <a:buFont typeface="Arial" panose="020B0604020202020204" pitchFamily="34" charset="0"/>
+              <a:buChar char="•"/>
+            </a:pPr>
+            <a:endParaRPr lang="en-US" sz="3200" dirty="0" smtClean="0">
+              <a:latin typeface="Consolas" panose="020B0609020204030204" pitchFamily="49" charset="0"/>
+              <a:cs typeface="Consolas" panose="020B0609020204030204" pitchFamily="49" charset="0"/>
+            </a:endParaRPr>
+          </a:p>
+          <a:p>
+            <a:pPr marL="457200" indent="-457200">
+              <a:buFont typeface="Arial" panose="020B0604020202020204" pitchFamily="34" charset="0"/>
+              <a:buChar char="•"/>
+            </a:pPr>
+            <a:r>
+              <a:rPr lang="en-US" sz="3200" dirty="0" smtClean="0">
+                <a:latin typeface="Consolas" panose="020B0609020204030204" pitchFamily="49" charset="0"/>
+                <a:cs typeface="Consolas" panose="020B0609020204030204" pitchFamily="49" charset="0"/>
+              </a:rPr>
+              <a:t>How to setup </a:t>
+            </a:r>
+            <a:r>
+              <a:rPr lang="en-US" sz="3200" dirty="0" err="1" smtClean="0">
+                <a:latin typeface="Consolas" panose="020B0609020204030204" pitchFamily="49" charset="0"/>
+                <a:cs typeface="Consolas" panose="020B0609020204030204" pitchFamily="49" charset="0"/>
+              </a:rPr>
+              <a:t>difftool</a:t>
+            </a:r>
+            <a:endParaRPr lang="en-US" sz="3200" dirty="0" smtClean="0">
+              <a:latin typeface="Consolas" panose="020B0609020204030204" pitchFamily="49" charset="0"/>
+              <a:cs typeface="Consolas" panose="020B0609020204030204" pitchFamily="49" charset="0"/>
+            </a:endParaRPr>
+          </a:p>
+          <a:p>
+            <a:pPr lvl="1"/>
+            <a:r>
+              <a:rPr lang="en-US" sz="3200" dirty="0" smtClean="0">
+                <a:latin typeface="Consolas" panose="020B0609020204030204" pitchFamily="49" charset="0"/>
+                <a:cs typeface="Consolas" panose="020B0609020204030204" pitchFamily="49" charset="0"/>
+              </a:rPr>
+              <a:t>	.</a:t>
+            </a:r>
+            <a:r>
+              <a:rPr lang="en-US" sz="3200" dirty="0" err="1" smtClean="0">
+                <a:latin typeface="Consolas" panose="020B0609020204030204" pitchFamily="49" charset="0"/>
+                <a:cs typeface="Consolas" panose="020B0609020204030204" pitchFamily="49" charset="0"/>
+              </a:rPr>
+              <a:t>gitconfig</a:t>
+            </a:r>
+            <a:endParaRPr lang="en-US" sz="3200" dirty="0" smtClean="0">
+              <a:latin typeface="Consolas" panose="020B0609020204030204" pitchFamily="49" charset="0"/>
+              <a:cs typeface="Consolas" panose="020B0609020204030204" pitchFamily="49" charset="0"/>
+            </a:endParaRPr>
+          </a:p>
+          <a:p>
+            <a:pPr lvl="1"/>
+            <a:endParaRPr lang="en-US" sz="3200" dirty="0" smtClean="0">
+              <a:latin typeface="Consolas" panose="020B0609020204030204" pitchFamily="49" charset="0"/>
+              <a:cs typeface="Consolas" panose="020B0609020204030204" pitchFamily="49" charset="0"/>
+            </a:endParaRPr>
+          </a:p>
+          <a:p>
+            <a:pPr lvl="1" indent="-457200">
+              <a:buFont typeface="Arial" panose="020B0604020202020204" pitchFamily="34" charset="0"/>
+              <a:buChar char="•"/>
+            </a:pPr>
+            <a:r>
+              <a:rPr lang="en-US" sz="3200" dirty="0" smtClean="0">
+                <a:latin typeface="Consolas" panose="020B0609020204030204" pitchFamily="49" charset="0"/>
+                <a:cs typeface="Consolas" panose="020B0609020204030204" pitchFamily="49" charset="0"/>
+              </a:rPr>
+              <a:t>Diff to different version</a:t>
+            </a:r>
+          </a:p>
+          <a:p>
+            <a:pPr marL="457200" lvl="2"/>
+            <a:r>
+              <a:rPr lang="en-US" sz="3200" dirty="0">
+                <a:latin typeface="Consolas" panose="020B0609020204030204" pitchFamily="49" charset="0"/>
+                <a:cs typeface="Consolas" panose="020B0609020204030204" pitchFamily="49" charset="0"/>
+              </a:rPr>
+              <a:t>	</a:t>
+            </a:r>
+            <a:r>
+              <a:rPr lang="en-US" sz="3200" dirty="0" err="1" smtClean="0">
+                <a:latin typeface="Consolas" panose="020B0609020204030204" pitchFamily="49" charset="0"/>
+                <a:cs typeface="Consolas" panose="020B0609020204030204" pitchFamily="49" charset="0"/>
+              </a:rPr>
+              <a:t>git</a:t>
+            </a:r>
+            <a:r>
+              <a:rPr lang="en-US" sz="3200" dirty="0" smtClean="0">
+                <a:latin typeface="Consolas" panose="020B0609020204030204" pitchFamily="49" charset="0"/>
+                <a:cs typeface="Consolas" panose="020B0609020204030204" pitchFamily="49" charset="0"/>
+              </a:rPr>
+              <a:t> </a:t>
+            </a:r>
+            <a:r>
+              <a:rPr lang="en-US" sz="3200" dirty="0" err="1" smtClean="0">
+                <a:latin typeface="Consolas" panose="020B0609020204030204" pitchFamily="49" charset="0"/>
+                <a:cs typeface="Consolas" panose="020B0609020204030204" pitchFamily="49" charset="0"/>
+              </a:rPr>
+              <a:t>difftool</a:t>
+            </a:r>
+            <a:r>
+              <a:rPr lang="en-US" sz="3200" dirty="0" smtClean="0">
+                <a:latin typeface="Consolas" panose="020B0609020204030204" pitchFamily="49" charset="0"/>
+                <a:cs typeface="Consolas" panose="020B0609020204030204" pitchFamily="49" charset="0"/>
+              </a:rPr>
+              <a:t> &lt;commit&gt;</a:t>
+            </a:r>
+          </a:p>
+          <a:p>
+            <a:pPr marL="457200" indent="-457200">
+              <a:buFont typeface="Arial" panose="020B0604020202020204" pitchFamily="34" charset="0"/>
+              <a:buChar char="•"/>
+            </a:pPr>
+            <a:endParaRPr lang="en-US" sz="3200" dirty="0" smtClean="0">
+              <a:latin typeface="Consolas" panose="020B0609020204030204" pitchFamily="49" charset="0"/>
+              <a:cs typeface="Consolas" panose="020B0609020204030204" pitchFamily="49" charset="0"/>
+            </a:endParaRPr>
+          </a:p>
+          <a:p>
+            <a:endParaRPr lang="en-US" sz="3200" dirty="0">
+              <a:latin typeface="Consolas" panose="020B0609020204030204" pitchFamily="49" charset="0"/>
+              <a:cs typeface="Consolas" panose="020B0609020204030204" pitchFamily="49" charset="0"/>
+            </a:endParaRPr>
+          </a:p>
+        </p:txBody>
+      </p:sp>
+    </p:spTree>
+    <p:extLst>
+      <p:ext uri="{BB962C8B-B14F-4D97-AF65-F5344CB8AC3E}">
+        <p14:creationId xmlns:p14="http://schemas.microsoft.com/office/powerpoint/2010/main" val="707092663"/>
+      </p:ext>
+    </p:extLst>
+  </p:cSld>
+  <p:clrMapOvr>
+    <a:masterClrMapping/>
+  </p:clrMapOvr>
 </p:sld>
 </file>
 
@@ -4194,13 +7723,6 @@
   <p:clrMapOvr>
     <a:masterClrMapping/>
   </p:clrMapOvr>
-  <p:timing>
-    <p:tnLst>
-      <p:par>
-        <p:cTn id="1" dur="indefinite" restart="never" nodeType="tmRoot"/>
-      </p:par>
-    </p:tnLst>
-  </p:timing>
 </p:sld>
 </file>
 
@@ -4551,13 +8073,6 @@
   <p:clrMapOvr>
     <a:masterClrMapping/>
   </p:clrMapOvr>
-  <p:timing>
-    <p:tnLst>
-      <p:par>
-        <p:cTn id="1" dur="indefinite" restart="never" nodeType="tmRoot"/>
-      </p:par>
-    </p:tnLst>
-  </p:timing>
 </p:sld>
 </file>
 
@@ -4726,13 +8241,6 @@
   <p:clrMapOvr>
     <a:masterClrMapping/>
   </p:clrMapOvr>
-  <p:timing>
-    <p:tnLst>
-      <p:par>
-        <p:cTn id="1" dur="indefinite" restart="never" nodeType="tmRoot"/>
-      </p:par>
-    </p:tnLst>
-  </p:timing>
 </p:sld>
 </file>
 
@@ -4939,13 +8447,6 @@
   <p:clrMapOvr>
     <a:masterClrMapping/>
   </p:clrMapOvr>
-  <p:timing>
-    <p:tnLst>
-      <p:par>
-        <p:cTn id="1" dur="indefinite" restart="never" nodeType="tmRoot"/>
-      </p:par>
-    </p:tnLst>
-  </p:timing>
 </p:sld>
 </file>
 
@@ -5273,13 +8774,6 @@
   <p:clrMapOvr>
     <a:masterClrMapping/>
   </p:clrMapOvr>
-  <p:timing>
-    <p:tnLst>
-      <p:par>
-        <p:cTn id="1" dur="indefinite" restart="never" nodeType="tmRoot"/>
-      </p:par>
-    </p:tnLst>
-  </p:timing>
 </p:sld>
 </file>
 
@@ -5450,13 +8944,6 @@
   <p:clrMapOvr>
     <a:masterClrMapping/>
   </p:clrMapOvr>
-  <p:timing>
-    <p:tnLst>
-      <p:par>
-        <p:cTn id="1" dur="indefinite" restart="never" nodeType="tmRoot"/>
-      </p:par>
-    </p:tnLst>
-  </p:timing>
 </p:sld>
 </file>
 
@@ -5516,7 +9003,7 @@
         <p:spPr>
           <a:xfrm>
             <a:off x="481449" y="1857375"/>
-            <a:ext cx="3368230" cy="4524315"/>
+            <a:ext cx="3368230" cy="4031873"/>
           </a:xfrm>
           <a:prstGeom prst="rect">
             <a:avLst/>
@@ -5642,15 +9129,16 @@
                 <a:latin typeface="Consolas" panose="020B0609020204030204" pitchFamily="49" charset="0"/>
                 <a:cs typeface="Consolas" panose="020B0609020204030204" pitchFamily="49" charset="0"/>
               </a:rPr>
-              <a:t> commit</a:t>
+              <a:t> </a:t>
+            </a:r>
+            <a:r>
+              <a:rPr lang="en-US" sz="3200" dirty="0" smtClean="0">
+                <a:latin typeface="Consolas" panose="020B0609020204030204" pitchFamily="49" charset="0"/>
+                <a:cs typeface="Consolas" panose="020B0609020204030204" pitchFamily="49" charset="0"/>
+              </a:rPr>
+              <a:t>commit</a:t>
             </a:r>
             <a:endParaRPr lang="en-US" sz="3200" dirty="0">
-              <a:latin typeface="Consolas" panose="020B0609020204030204" pitchFamily="49" charset="0"/>
-              <a:cs typeface="Consolas" panose="020B0609020204030204" pitchFamily="49" charset="0"/>
-            </a:endParaRPr>
-          </a:p>
-          <a:p>
-            <a:endParaRPr lang="en-US" sz="3200" dirty="0" smtClean="0">
               <a:latin typeface="Consolas" panose="020B0609020204030204" pitchFamily="49" charset="0"/>
               <a:cs typeface="Consolas" panose="020B0609020204030204" pitchFamily="49" charset="0"/>
             </a:endParaRPr>
@@ -5756,13 +9244,6 @@
   <p:clrMapOvr>
     <a:masterClrMapping/>
   </p:clrMapOvr>
-  <p:timing>
-    <p:tnLst>
-      <p:par>
-        <p:cTn id="1" dur="indefinite" restart="never" nodeType="tmRoot"/>
-      </p:par>
-    </p:tnLst>
-  </p:timing>
 </p:sld>
 </file>
 
@@ -5983,20 +9464,13 @@
     </p:spTree>
     <p:extLst>
       <p:ext uri="{BB962C8B-B14F-4D97-AF65-F5344CB8AC3E}">
-        <p14:creationId xmlns:p14="http://schemas.microsoft.com/office/powerpoint/2010/main" val="1502701563"/>
+        <p14:creationId xmlns:p14="http://schemas.microsoft.com/office/powerpoint/2010/main" val="2617299375"/>
       </p:ext>
     </p:extLst>
   </p:cSld>
   <p:clrMapOvr>
     <a:masterClrMapping/>
   </p:clrMapOvr>
-  <p:timing>
-    <p:tnLst>
-      <p:par>
-        <p:cTn id="1" dur="indefinite" restart="never" nodeType="tmRoot"/>
-      </p:par>
-    </p:tnLst>
-  </p:timing>
 </p:sld>
 </file>
 

</xml_diff>

<commit_message>
Updates regarding trips and tricks
</commit_message>
<xml_diff>
--- a/git101.pptx
+++ b/git101.pptx
@@ -34,6 +34,12 @@
     <p:sldId id="281" r:id="rId28"/>
     <p:sldId id="283" r:id="rId29"/>
     <p:sldId id="282" r:id="rId30"/>
+    <p:sldId id="287" r:id="rId31"/>
+    <p:sldId id="288" r:id="rId32"/>
+    <p:sldId id="289" r:id="rId33"/>
+    <p:sldId id="286" r:id="rId34"/>
+    <p:sldId id="290" r:id="rId35"/>
+    <p:sldId id="291" r:id="rId36"/>
   </p:sldIdLst>
   <p:sldSz cx="12192000" cy="6858000"/>
   <p:notesSz cx="6858000" cy="9144000"/>
@@ -271,7 +277,7 @@
           <a:p>
             <a:fld id="{7DBCE0E9-B642-4654-B380-6C7D8CA0540E}" type="datetimeFigureOut">
               <a:rPr lang="en-US" smtClean="0"/>
-              <a:t>01-Feb-16</a:t>
+              <a:t>06-Feb-16</a:t>
             </a:fld>
             <a:endParaRPr lang="en-US"/>
           </a:p>
@@ -441,7 +447,7 @@
           <a:p>
             <a:fld id="{7DBCE0E9-B642-4654-B380-6C7D8CA0540E}" type="datetimeFigureOut">
               <a:rPr lang="en-US" smtClean="0"/>
-              <a:t>01-Feb-16</a:t>
+              <a:t>06-Feb-16</a:t>
             </a:fld>
             <a:endParaRPr lang="en-US"/>
           </a:p>
@@ -621,7 +627,7 @@
           <a:p>
             <a:fld id="{7DBCE0E9-B642-4654-B380-6C7D8CA0540E}" type="datetimeFigureOut">
               <a:rPr lang="en-US" smtClean="0"/>
-              <a:t>01-Feb-16</a:t>
+              <a:t>06-Feb-16</a:t>
             </a:fld>
             <a:endParaRPr lang="en-US"/>
           </a:p>
@@ -791,7 +797,7 @@
           <a:p>
             <a:fld id="{7DBCE0E9-B642-4654-B380-6C7D8CA0540E}" type="datetimeFigureOut">
               <a:rPr lang="en-US" smtClean="0"/>
-              <a:t>01-Feb-16</a:t>
+              <a:t>06-Feb-16</a:t>
             </a:fld>
             <a:endParaRPr lang="en-US"/>
           </a:p>
@@ -1037,7 +1043,7 @@
           <a:p>
             <a:fld id="{7DBCE0E9-B642-4654-B380-6C7D8CA0540E}" type="datetimeFigureOut">
               <a:rPr lang="en-US" smtClean="0"/>
-              <a:t>01-Feb-16</a:t>
+              <a:t>06-Feb-16</a:t>
             </a:fld>
             <a:endParaRPr lang="en-US"/>
           </a:p>
@@ -1269,7 +1275,7 @@
           <a:p>
             <a:fld id="{7DBCE0E9-B642-4654-B380-6C7D8CA0540E}" type="datetimeFigureOut">
               <a:rPr lang="en-US" smtClean="0"/>
-              <a:t>01-Feb-16</a:t>
+              <a:t>06-Feb-16</a:t>
             </a:fld>
             <a:endParaRPr lang="en-US"/>
           </a:p>
@@ -1636,7 +1642,7 @@
           <a:p>
             <a:fld id="{7DBCE0E9-B642-4654-B380-6C7D8CA0540E}" type="datetimeFigureOut">
               <a:rPr lang="en-US" smtClean="0"/>
-              <a:t>01-Feb-16</a:t>
+              <a:t>06-Feb-16</a:t>
             </a:fld>
             <a:endParaRPr lang="en-US"/>
           </a:p>
@@ -1754,7 +1760,7 @@
           <a:p>
             <a:fld id="{7DBCE0E9-B642-4654-B380-6C7D8CA0540E}" type="datetimeFigureOut">
               <a:rPr lang="en-US" smtClean="0"/>
-              <a:t>01-Feb-16</a:t>
+              <a:t>06-Feb-16</a:t>
             </a:fld>
             <a:endParaRPr lang="en-US"/>
           </a:p>
@@ -1849,7 +1855,7 @@
           <a:p>
             <a:fld id="{7DBCE0E9-B642-4654-B380-6C7D8CA0540E}" type="datetimeFigureOut">
               <a:rPr lang="en-US" smtClean="0"/>
-              <a:t>01-Feb-16</a:t>
+              <a:t>06-Feb-16</a:t>
             </a:fld>
             <a:endParaRPr lang="en-US"/>
           </a:p>
@@ -2126,7 +2132,7 @@
           <a:p>
             <a:fld id="{7DBCE0E9-B642-4654-B380-6C7D8CA0540E}" type="datetimeFigureOut">
               <a:rPr lang="en-US" smtClean="0"/>
-              <a:t>01-Feb-16</a:t>
+              <a:t>06-Feb-16</a:t>
             </a:fld>
             <a:endParaRPr lang="en-US"/>
           </a:p>
@@ -2379,7 +2385,7 @@
           <a:p>
             <a:fld id="{7DBCE0E9-B642-4654-B380-6C7D8CA0540E}" type="datetimeFigureOut">
               <a:rPr lang="en-US" smtClean="0"/>
-              <a:t>01-Feb-16</a:t>
+              <a:t>06-Feb-16</a:t>
             </a:fld>
             <a:endParaRPr lang="en-US"/>
           </a:p>
@@ -2592,7 +2598,7 @@
           <a:p>
             <a:fld id="{7DBCE0E9-B642-4654-B380-6C7D8CA0540E}" type="datetimeFigureOut">
               <a:rPr lang="en-US" smtClean="0"/>
-              <a:t>01-Feb-16</a:t>
+              <a:t>06-Feb-16</a:t>
             </a:fld>
             <a:endParaRPr lang="en-US"/>
           </a:p>
@@ -5851,7 +5857,7 @@
         <p:spPr>
           <a:xfrm>
             <a:off x="481449" y="393032"/>
-            <a:ext cx="2435026" cy="769441"/>
+            <a:ext cx="2625591" cy="769441"/>
           </a:xfrm>
           <a:prstGeom prst="rect">
             <a:avLst/>
@@ -5865,8 +5871,8 @@
           <a:lstStyle/>
           <a:p>
             <a:r>
-              <a:rPr lang="en-US" sz="4400" dirty="0" err="1" smtClean="0"/>
-              <a:t>Shorcuts</a:t>
+              <a:rPr lang="en-US" sz="4400" dirty="0" smtClean="0"/>
+              <a:t>Shortcuts</a:t>
             </a:r>
             <a:r>
               <a:rPr lang="en-US" sz="4400" dirty="0" smtClean="0"/>
@@ -5908,9 +5914,6 @@
               </a:rPr>
               <a:t>Commit with a message</a:t>
             </a:r>
-            <a:endParaRPr lang="en-US" sz="3200" dirty="0" smtClean="0">
-              <a:cs typeface="Consolas" panose="020B0609020204030204" pitchFamily="49" charset="0"/>
-            </a:endParaRPr>
           </a:p>
           <a:p>
             <a:r>
@@ -5947,29 +5950,8 @@
                 <a:latin typeface="Consolas" panose="020B0609020204030204" pitchFamily="49" charset="0"/>
                 <a:cs typeface="Consolas" panose="020B0609020204030204" pitchFamily="49" charset="0"/>
               </a:rPr>
-              <a:t> </a:t>
-            </a:r>
-            <a:r>
-              <a:rPr lang="en-US" sz="3200" dirty="0" smtClean="0">
-                <a:solidFill>
-                  <a:schemeClr val="accent1">
-                    <a:lumMod val="75000"/>
-                  </a:schemeClr>
-                </a:solidFill>
-                <a:latin typeface="Consolas" panose="020B0609020204030204" pitchFamily="49" charset="0"/>
-                <a:cs typeface="Consolas" panose="020B0609020204030204" pitchFamily="49" charset="0"/>
-              </a:rPr>
-              <a:t>commit –m “Refactored everything”</a:t>
-            </a:r>
-            <a:endParaRPr lang="en-US" sz="3200" dirty="0" smtClean="0">
-              <a:solidFill>
-                <a:schemeClr val="accent1">
-                  <a:lumMod val="75000"/>
-                </a:schemeClr>
-              </a:solidFill>
-              <a:latin typeface="Consolas" panose="020B0609020204030204" pitchFamily="49" charset="0"/>
-              <a:cs typeface="Consolas" panose="020B0609020204030204" pitchFamily="49" charset="0"/>
-            </a:endParaRPr>
+              <a:t> commit –m “Refactored everything”</a:t>
+            </a:r>
           </a:p>
           <a:p>
             <a:endParaRPr lang="en-US" sz="3200" dirty="0">
@@ -5988,9 +5970,6 @@
               </a:rPr>
               <a:t>Automatically add modified files to index</a:t>
             </a:r>
-            <a:endParaRPr lang="en-US" sz="3200" dirty="0" smtClean="0">
-              <a:cs typeface="Consolas" panose="020B0609020204030204" pitchFamily="49" charset="0"/>
-            </a:endParaRPr>
           </a:p>
           <a:p>
             <a:r>
@@ -6027,19 +6006,7 @@
                 <a:latin typeface="Consolas" panose="020B0609020204030204" pitchFamily="49" charset="0"/>
                 <a:cs typeface="Consolas" panose="020B0609020204030204" pitchFamily="49" charset="0"/>
               </a:rPr>
-              <a:t> </a:t>
-            </a:r>
-            <a:r>
-              <a:rPr lang="en-US" sz="3200" dirty="0" smtClean="0">
-                <a:solidFill>
-                  <a:schemeClr val="accent1">
-                    <a:lumMod val="75000"/>
-                  </a:schemeClr>
-                </a:solidFill>
-                <a:latin typeface="Consolas" panose="020B0609020204030204" pitchFamily="49" charset="0"/>
-                <a:cs typeface="Consolas" panose="020B0609020204030204" pitchFamily="49" charset="0"/>
-              </a:rPr>
-              <a:t>commit –a</a:t>
+              <a:t> commit –a</a:t>
             </a:r>
             <a:endParaRPr lang="en-US" sz="3200" dirty="0">
               <a:solidFill>
@@ -6523,7 +6490,19 @@
                 <a:latin typeface="Consolas" panose="020B0609020204030204" pitchFamily="49" charset="0"/>
                 <a:cs typeface="Consolas" panose="020B0609020204030204" pitchFamily="49" charset="0"/>
               </a:rPr>
-              <a:t> log</a:t>
+              <a:t> </a:t>
+            </a:r>
+            <a:r>
+              <a:rPr lang="en-US" sz="3200" dirty="0" smtClean="0">
+                <a:solidFill>
+                  <a:schemeClr val="accent1">
+                    <a:lumMod val="75000"/>
+                  </a:schemeClr>
+                </a:solidFill>
+                <a:latin typeface="Consolas" panose="020B0609020204030204" pitchFamily="49" charset="0"/>
+                <a:cs typeface="Consolas" panose="020B0609020204030204" pitchFamily="49" charset="0"/>
+              </a:rPr>
+              <a:t>log</a:t>
             </a:r>
           </a:p>
           <a:p>
@@ -6600,21 +6579,30 @@
             </a:endParaRPr>
           </a:p>
           <a:p>
-            <a:endParaRPr lang="en-US" sz="3200" dirty="0">
-              <a:latin typeface="Consolas" panose="020B0609020204030204" pitchFamily="49" charset="0"/>
-              <a:cs typeface="Consolas" panose="020B0609020204030204" pitchFamily="49" charset="0"/>
-            </a:endParaRPr>
-          </a:p>
-          <a:p>
             <a:pPr marL="285750" indent="-285750">
               <a:buFont typeface="Arial" panose="020B0604020202020204" pitchFamily="34" charset="0"/>
               <a:buChar char="•"/>
             </a:pPr>
+            <a:endParaRPr lang="en-US" sz="3200" dirty="0" smtClean="0">
+              <a:cs typeface="Consolas" panose="020B0609020204030204" pitchFamily="49" charset="0"/>
+            </a:endParaRPr>
+          </a:p>
+          <a:p>
+            <a:pPr marL="285750" indent="-285750">
+              <a:buFont typeface="Arial" panose="020B0604020202020204" pitchFamily="34" charset="0"/>
+              <a:buChar char="•"/>
+            </a:pPr>
             <a:r>
               <a:rPr lang="en-US" sz="3200" dirty="0" smtClean="0">
                 <a:cs typeface="Consolas" panose="020B0609020204030204" pitchFamily="49" charset="0"/>
               </a:rPr>
-              <a:t>Go back and forth</a:t>
+              <a:t>Go </a:t>
+            </a:r>
+            <a:r>
+              <a:rPr lang="en-US" sz="3200" dirty="0" smtClean="0">
+                <a:cs typeface="Consolas" panose="020B0609020204030204" pitchFamily="49" charset="0"/>
+              </a:rPr>
+              <a:t>back and forth</a:t>
             </a:r>
           </a:p>
           <a:p>
@@ -9333,7 +9321,7 @@
         <p:spPr>
           <a:xfrm>
             <a:off x="481449" y="393032"/>
-            <a:ext cx="2118400" cy="2123658"/>
+            <a:ext cx="1958870" cy="2123658"/>
           </a:xfrm>
           <a:prstGeom prst="rect">
             <a:avLst/>
@@ -9356,8 +9344,8 @@
           </a:p>
           <a:p>
             <a:r>
-              <a:rPr lang="en-US" sz="4400" smtClean="0"/>
-              <a:t>example</a:t>
+              <a:rPr lang="en-US" sz="4400" dirty="0" smtClean="0"/>
+              <a:t>TODO</a:t>
             </a:r>
             <a:endParaRPr lang="en-US" sz="4400" dirty="0"/>
           </a:p>
@@ -9903,47 +9891,6 @@
           </a:p>
         </p:txBody>
       </p:sp>
-      <p:pic>
-        <p:nvPicPr>
-          <p:cNvPr id="1026" name="Picture 2" descr="https://c2.staticflickr.com/4/3096/2450871003_16b7862cb7_b.jpg"/>
-          <p:cNvPicPr>
-            <a:picLocks noChangeAspect="1" noChangeArrowheads="1"/>
-          </p:cNvPicPr>
-          <p:nvPr/>
-        </p:nvPicPr>
-        <p:blipFill>
-          <a:blip r:embed="rId2" cstate="print">
-            <a:extLst>
-              <a:ext uri="{28A0092B-C50C-407E-A947-70E740481C1C}">
-                <a14:useLocalDpi xmlns:a14="http://schemas.microsoft.com/office/drawing/2010/main" val="0"/>
-              </a:ext>
-            </a:extLst>
-          </a:blip>
-          <a:srcRect/>
-          <a:stretch>
-            <a:fillRect/>
-          </a:stretch>
-        </p:blipFill>
-        <p:spPr bwMode="auto">
-          <a:xfrm>
-            <a:off x="10164678" y="0"/>
-            <a:ext cx="2027321" cy="2703095"/>
-          </a:xfrm>
-          <a:prstGeom prst="rect">
-            <a:avLst/>
-          </a:prstGeom>
-          <a:noFill/>
-          <a:extLst>
-            <a:ext uri="{909E8E84-426E-40DD-AFC4-6F175D3DCCD1}">
-              <a14:hiddenFill xmlns:a14="http://schemas.microsoft.com/office/drawing/2010/main">
-                <a:solidFill>
-                  <a:srgbClr val="FFFFFF"/>
-                </a:solidFill>
-              </a14:hiddenFill>
-            </a:ext>
-          </a:extLst>
-        </p:spPr>
-      </p:pic>
       <p:sp>
         <p:nvSpPr>
           <p:cNvPr id="7" name="Rectangle 6"/>
@@ -10788,11 +10735,7 @@
           <a:p>
             <a:r>
               <a:rPr lang="en-US" sz="4400" dirty="0" smtClean="0"/>
-              <a:t>External repositories: under the </a:t>
-            </a:r>
-            <a:r>
-              <a:rPr lang="en-US" sz="4400" dirty="0" smtClean="0"/>
-              <a:t>hood</a:t>
+              <a:t>External repositories: under the hood</a:t>
             </a:r>
             <a:endParaRPr lang="en-US" sz="4400" dirty="0"/>
           </a:p>
@@ -10874,9 +10817,6 @@
               </a:rPr>
               <a:t>remote repositories (remotes)</a:t>
             </a:r>
-            <a:endParaRPr lang="en-US" sz="3200" dirty="0" smtClean="0">
-              <a:cs typeface="Consolas" panose="020B0609020204030204" pitchFamily="49" charset="0"/>
-            </a:endParaRPr>
           </a:p>
           <a:p>
             <a:pPr marL="285750" indent="-285750">
@@ -11063,11 +11003,7 @@
           <a:p>
             <a:r>
               <a:rPr lang="en-US" sz="4400" dirty="0" smtClean="0"/>
-              <a:t>External repositories: under the </a:t>
-            </a:r>
-            <a:r>
-              <a:rPr lang="en-US" sz="4400" dirty="0" smtClean="0"/>
-              <a:t>hood</a:t>
+              <a:t>External repositories: under the hood</a:t>
             </a:r>
             <a:endParaRPr lang="en-US" sz="4400" dirty="0"/>
           </a:p>
@@ -11302,11 +11238,7 @@
           <a:p>
             <a:r>
               <a:rPr lang="en-US" sz="4400" dirty="0" smtClean="0"/>
-              <a:t>External repositories: under the </a:t>
-            </a:r>
-            <a:r>
-              <a:rPr lang="en-US" sz="4400" dirty="0" smtClean="0"/>
-              <a:t>hood</a:t>
+              <a:t>External repositories: under the hood</a:t>
             </a:r>
             <a:endParaRPr lang="en-US" sz="4400" dirty="0"/>
           </a:p>
@@ -11669,11 +11601,7 @@
           <a:p>
             <a:r>
               <a:rPr lang="en-US" sz="4400" dirty="0" smtClean="0"/>
-              <a:t>External repositories: under the </a:t>
-            </a:r>
-            <a:r>
-              <a:rPr lang="en-US" sz="4400" dirty="0" smtClean="0"/>
-              <a:t>hood</a:t>
+              <a:t>External repositories: under the hood</a:t>
             </a:r>
             <a:endParaRPr lang="en-US" sz="4400" dirty="0"/>
           </a:p>
@@ -13090,6 +13018,1697 @@
 </p:sld>
 </file>
 
+<file path=ppt/slides/slide30.xml><?xml version="1.0" encoding="utf-8"?>
+<p:sld xmlns:a="http://schemas.openxmlformats.org/drawingml/2006/main" xmlns:r="http://schemas.openxmlformats.org/officeDocument/2006/relationships" xmlns:p="http://schemas.openxmlformats.org/presentationml/2006/main">
+  <p:cSld>
+    <p:spTree>
+      <p:nvGrpSpPr>
+        <p:cNvPr id="1" name=""/>
+        <p:cNvGrpSpPr/>
+        <p:nvPr/>
+      </p:nvGrpSpPr>
+      <p:grpSpPr>
+        <a:xfrm>
+          <a:off x="0" y="0"/>
+          <a:ext cx="0" cy="0"/>
+          <a:chOff x="0" y="0"/>
+          <a:chExt cx="0" cy="0"/>
+        </a:xfrm>
+      </p:grpSpPr>
+      <p:sp>
+        <p:nvSpPr>
+          <p:cNvPr id="5" name="TextBox 4"/>
+          <p:cNvSpPr txBox="1"/>
+          <p:nvPr/>
+        </p:nvSpPr>
+        <p:spPr>
+          <a:xfrm>
+            <a:off x="481449" y="288758"/>
+            <a:ext cx="4816640" cy="769441"/>
+          </a:xfrm>
+          <a:prstGeom prst="rect">
+            <a:avLst/>
+          </a:prstGeom>
+          <a:noFill/>
+        </p:spPr>
+        <p:txBody>
+          <a:bodyPr wrap="none" rtlCol="0">
+            <a:spAutoFit/>
+          </a:bodyPr>
+          <a:lstStyle/>
+          <a:p>
+            <a:r>
+              <a:rPr lang="en-US" sz="4400" dirty="0" smtClean="0"/>
+              <a:t>Branching strategies</a:t>
+            </a:r>
+            <a:endParaRPr lang="en-US" sz="4400" dirty="0"/>
+          </a:p>
+        </p:txBody>
+      </p:sp>
+      <p:cxnSp>
+        <p:nvCxnSpPr>
+          <p:cNvPr id="25" name="Straight Connector 24"/>
+          <p:cNvCxnSpPr/>
+          <p:nvPr/>
+        </p:nvCxnSpPr>
+        <p:spPr>
+          <a:xfrm>
+            <a:off x="1575632" y="2497978"/>
+            <a:ext cx="22282" cy="1742576"/>
+          </a:xfrm>
+          <a:prstGeom prst="line">
+            <a:avLst/>
+          </a:prstGeom>
+          <a:ln w="57150">
+            <a:solidFill>
+              <a:schemeClr val="bg1"/>
+            </a:solidFill>
+            <a:prstDash val="sysDot"/>
+          </a:ln>
+        </p:spPr>
+        <p:style>
+          <a:lnRef idx="1">
+            <a:schemeClr val="accent1"/>
+          </a:lnRef>
+          <a:fillRef idx="0">
+            <a:schemeClr val="accent1"/>
+          </a:fillRef>
+          <a:effectRef idx="0">
+            <a:schemeClr val="accent1"/>
+          </a:effectRef>
+          <a:fontRef idx="minor">
+            <a:schemeClr val="tx1"/>
+          </a:fontRef>
+        </p:style>
+      </p:cxnSp>
+      <p:sp>
+        <p:nvSpPr>
+          <p:cNvPr id="28" name="TextBox 27"/>
+          <p:cNvSpPr txBox="1"/>
+          <p:nvPr/>
+        </p:nvSpPr>
+        <p:spPr>
+          <a:xfrm>
+            <a:off x="481449" y="1137831"/>
+            <a:ext cx="1460272" cy="584775"/>
+          </a:xfrm>
+          <a:prstGeom prst="rect">
+            <a:avLst/>
+          </a:prstGeom>
+          <a:noFill/>
+        </p:spPr>
+        <p:txBody>
+          <a:bodyPr wrap="none" rtlCol="0">
+            <a:spAutoFit/>
+          </a:bodyPr>
+          <a:lstStyle/>
+          <a:p>
+            <a:pPr marL="285750" indent="-285750">
+              <a:buFont typeface="Arial" panose="020B0604020202020204" pitchFamily="34" charset="0"/>
+              <a:buChar char="•"/>
+            </a:pPr>
+            <a:r>
+              <a:rPr lang="en-US" sz="3200" dirty="0" smtClean="0">
+                <a:cs typeface="Consolas" panose="020B0609020204030204" pitchFamily="49" charset="0"/>
+              </a:rPr>
+              <a:t>TODO</a:t>
+            </a:r>
+            <a:endParaRPr lang="en-US" sz="3200" dirty="0" smtClean="0">
+              <a:cs typeface="Consolas" panose="020B0609020204030204" pitchFamily="49" charset="0"/>
+            </a:endParaRPr>
+          </a:p>
+        </p:txBody>
+      </p:sp>
+    </p:spTree>
+    <p:extLst>
+      <p:ext uri="{BB962C8B-B14F-4D97-AF65-F5344CB8AC3E}">
+        <p14:creationId xmlns:p14="http://schemas.microsoft.com/office/powerpoint/2010/main" val="3699226259"/>
+      </p:ext>
+    </p:extLst>
+  </p:cSld>
+  <p:clrMapOvr>
+    <a:masterClrMapping/>
+  </p:clrMapOvr>
+</p:sld>
+</file>
+
+<file path=ppt/slides/slide31.xml><?xml version="1.0" encoding="utf-8"?>
+<p:sld xmlns:a="http://schemas.openxmlformats.org/drawingml/2006/main" xmlns:r="http://schemas.openxmlformats.org/officeDocument/2006/relationships" xmlns:p="http://schemas.openxmlformats.org/presentationml/2006/main">
+  <p:cSld>
+    <p:spTree>
+      <p:nvGrpSpPr>
+        <p:cNvPr id="1" name=""/>
+        <p:cNvGrpSpPr/>
+        <p:nvPr/>
+      </p:nvGrpSpPr>
+      <p:grpSpPr>
+        <a:xfrm>
+          <a:off x="0" y="0"/>
+          <a:ext cx="0" cy="0"/>
+          <a:chOff x="0" y="0"/>
+          <a:chExt cx="0" cy="0"/>
+        </a:xfrm>
+      </p:grpSpPr>
+      <p:sp>
+        <p:nvSpPr>
+          <p:cNvPr id="5" name="TextBox 4"/>
+          <p:cNvSpPr txBox="1"/>
+          <p:nvPr/>
+        </p:nvSpPr>
+        <p:spPr>
+          <a:xfrm>
+            <a:off x="481449" y="288758"/>
+            <a:ext cx="5759654" cy="769441"/>
+          </a:xfrm>
+          <a:prstGeom prst="rect">
+            <a:avLst/>
+          </a:prstGeom>
+          <a:noFill/>
+        </p:spPr>
+        <p:txBody>
+          <a:bodyPr wrap="none" rtlCol="0">
+            <a:spAutoFit/>
+          </a:bodyPr>
+          <a:lstStyle/>
+          <a:p>
+            <a:r>
+              <a:rPr lang="en-US" sz="4400" dirty="0" smtClean="0"/>
+              <a:t>Concept of pull requests</a:t>
+            </a:r>
+            <a:endParaRPr lang="en-US" sz="4400" dirty="0"/>
+          </a:p>
+        </p:txBody>
+      </p:sp>
+      <p:cxnSp>
+        <p:nvCxnSpPr>
+          <p:cNvPr id="25" name="Straight Connector 24"/>
+          <p:cNvCxnSpPr/>
+          <p:nvPr/>
+        </p:nvCxnSpPr>
+        <p:spPr>
+          <a:xfrm>
+            <a:off x="1575632" y="2497978"/>
+            <a:ext cx="22282" cy="1742576"/>
+          </a:xfrm>
+          <a:prstGeom prst="line">
+            <a:avLst/>
+          </a:prstGeom>
+          <a:ln w="57150">
+            <a:solidFill>
+              <a:schemeClr val="bg1"/>
+            </a:solidFill>
+            <a:prstDash val="sysDot"/>
+          </a:ln>
+        </p:spPr>
+        <p:style>
+          <a:lnRef idx="1">
+            <a:schemeClr val="accent1"/>
+          </a:lnRef>
+          <a:fillRef idx="0">
+            <a:schemeClr val="accent1"/>
+          </a:fillRef>
+          <a:effectRef idx="0">
+            <a:schemeClr val="accent1"/>
+          </a:effectRef>
+          <a:fontRef idx="minor">
+            <a:schemeClr val="tx1"/>
+          </a:fontRef>
+        </p:style>
+      </p:cxnSp>
+      <p:sp>
+        <p:nvSpPr>
+          <p:cNvPr id="28" name="TextBox 27"/>
+          <p:cNvSpPr txBox="1"/>
+          <p:nvPr/>
+        </p:nvSpPr>
+        <p:spPr>
+          <a:xfrm>
+            <a:off x="481449" y="1137831"/>
+            <a:ext cx="1460272" cy="584775"/>
+          </a:xfrm>
+          <a:prstGeom prst="rect">
+            <a:avLst/>
+          </a:prstGeom>
+          <a:noFill/>
+        </p:spPr>
+        <p:txBody>
+          <a:bodyPr wrap="none" rtlCol="0">
+            <a:spAutoFit/>
+          </a:bodyPr>
+          <a:lstStyle/>
+          <a:p>
+            <a:pPr marL="285750" indent="-285750">
+              <a:buFont typeface="Arial" panose="020B0604020202020204" pitchFamily="34" charset="0"/>
+              <a:buChar char="•"/>
+            </a:pPr>
+            <a:r>
+              <a:rPr lang="en-US" sz="3200" dirty="0" smtClean="0">
+                <a:cs typeface="Consolas" panose="020B0609020204030204" pitchFamily="49" charset="0"/>
+              </a:rPr>
+              <a:t>TODO</a:t>
+            </a:r>
+            <a:endParaRPr lang="en-US" sz="3200" dirty="0" smtClean="0">
+              <a:cs typeface="Consolas" panose="020B0609020204030204" pitchFamily="49" charset="0"/>
+            </a:endParaRPr>
+          </a:p>
+        </p:txBody>
+      </p:sp>
+    </p:spTree>
+    <p:extLst>
+      <p:ext uri="{BB962C8B-B14F-4D97-AF65-F5344CB8AC3E}">
+        <p14:creationId xmlns:p14="http://schemas.microsoft.com/office/powerpoint/2010/main" val="3892780953"/>
+      </p:ext>
+    </p:extLst>
+  </p:cSld>
+  <p:clrMapOvr>
+    <a:masterClrMapping/>
+  </p:clrMapOvr>
+</p:sld>
+</file>
+
+<file path=ppt/slides/slide32.xml><?xml version="1.0" encoding="utf-8"?>
+<p:sld xmlns:a="http://schemas.openxmlformats.org/drawingml/2006/main" xmlns:r="http://schemas.openxmlformats.org/officeDocument/2006/relationships" xmlns:p="http://schemas.openxmlformats.org/presentationml/2006/main">
+  <p:cSld>
+    <p:spTree>
+      <p:nvGrpSpPr>
+        <p:cNvPr id="1" name=""/>
+        <p:cNvGrpSpPr/>
+        <p:nvPr/>
+      </p:nvGrpSpPr>
+      <p:grpSpPr>
+        <a:xfrm>
+          <a:off x="0" y="0"/>
+          <a:ext cx="0" cy="0"/>
+          <a:chOff x="0" y="0"/>
+          <a:chExt cx="0" cy="0"/>
+        </a:xfrm>
+      </p:grpSpPr>
+      <p:sp>
+        <p:nvSpPr>
+          <p:cNvPr id="5" name="TextBox 4"/>
+          <p:cNvSpPr txBox="1"/>
+          <p:nvPr/>
+        </p:nvSpPr>
+        <p:spPr>
+          <a:xfrm>
+            <a:off x="481449" y="288758"/>
+            <a:ext cx="3719288" cy="769441"/>
+          </a:xfrm>
+          <a:prstGeom prst="rect">
+            <a:avLst/>
+          </a:prstGeom>
+          <a:noFill/>
+        </p:spPr>
+        <p:txBody>
+          <a:bodyPr wrap="none" rtlCol="0">
+            <a:spAutoFit/>
+          </a:bodyPr>
+          <a:lstStyle/>
+          <a:p>
+            <a:r>
+              <a:rPr lang="en-US" sz="4400" dirty="0" smtClean="0"/>
+              <a:t>In Visual Studio</a:t>
+            </a:r>
+            <a:endParaRPr lang="en-US" sz="4400" dirty="0"/>
+          </a:p>
+        </p:txBody>
+      </p:sp>
+      <p:cxnSp>
+        <p:nvCxnSpPr>
+          <p:cNvPr id="25" name="Straight Connector 24"/>
+          <p:cNvCxnSpPr/>
+          <p:nvPr/>
+        </p:nvCxnSpPr>
+        <p:spPr>
+          <a:xfrm>
+            <a:off x="1575632" y="2497978"/>
+            <a:ext cx="22282" cy="1742576"/>
+          </a:xfrm>
+          <a:prstGeom prst="line">
+            <a:avLst/>
+          </a:prstGeom>
+          <a:ln w="57150">
+            <a:solidFill>
+              <a:schemeClr val="bg1"/>
+            </a:solidFill>
+            <a:prstDash val="sysDot"/>
+          </a:ln>
+        </p:spPr>
+        <p:style>
+          <a:lnRef idx="1">
+            <a:schemeClr val="accent1"/>
+          </a:lnRef>
+          <a:fillRef idx="0">
+            <a:schemeClr val="accent1"/>
+          </a:fillRef>
+          <a:effectRef idx="0">
+            <a:schemeClr val="accent1"/>
+          </a:effectRef>
+          <a:fontRef idx="minor">
+            <a:schemeClr val="tx1"/>
+          </a:fontRef>
+        </p:style>
+      </p:cxnSp>
+      <p:sp>
+        <p:nvSpPr>
+          <p:cNvPr id="28" name="TextBox 27"/>
+          <p:cNvSpPr txBox="1"/>
+          <p:nvPr/>
+        </p:nvSpPr>
+        <p:spPr>
+          <a:xfrm>
+            <a:off x="481449" y="1137831"/>
+            <a:ext cx="1460272" cy="584775"/>
+          </a:xfrm>
+          <a:prstGeom prst="rect">
+            <a:avLst/>
+          </a:prstGeom>
+          <a:noFill/>
+        </p:spPr>
+        <p:txBody>
+          <a:bodyPr wrap="none" rtlCol="0">
+            <a:spAutoFit/>
+          </a:bodyPr>
+          <a:lstStyle/>
+          <a:p>
+            <a:pPr marL="285750" indent="-285750">
+              <a:buFont typeface="Arial" panose="020B0604020202020204" pitchFamily="34" charset="0"/>
+              <a:buChar char="•"/>
+            </a:pPr>
+            <a:r>
+              <a:rPr lang="en-US" sz="3200" dirty="0" smtClean="0">
+                <a:cs typeface="Consolas" panose="020B0609020204030204" pitchFamily="49" charset="0"/>
+              </a:rPr>
+              <a:t>TODO</a:t>
+            </a:r>
+            <a:endParaRPr lang="en-US" sz="3200" dirty="0" smtClean="0">
+              <a:cs typeface="Consolas" panose="020B0609020204030204" pitchFamily="49" charset="0"/>
+            </a:endParaRPr>
+          </a:p>
+        </p:txBody>
+      </p:sp>
+      <p:pic>
+        <p:nvPicPr>
+          <p:cNvPr id="2050" name="Picture 2" descr="http://www.thebeancounter.com/wp-content/uploads/2015/08/for_dummies_plain.png"/>
+          <p:cNvPicPr>
+            <a:picLocks noChangeAspect="1" noChangeArrowheads="1"/>
+          </p:cNvPicPr>
+          <p:nvPr/>
+        </p:nvPicPr>
+        <p:blipFill>
+          <a:blip r:embed="rId2">
+            <a:extLst>
+              <a:ext uri="{28A0092B-C50C-407E-A947-70E740481C1C}">
+                <a14:useLocalDpi xmlns:a14="http://schemas.microsoft.com/office/drawing/2010/main" val="0"/>
+              </a:ext>
+            </a:extLst>
+          </a:blip>
+          <a:srcRect/>
+          <a:stretch>
+            <a:fillRect/>
+          </a:stretch>
+        </p:blipFill>
+        <p:spPr bwMode="auto">
+          <a:xfrm>
+            <a:off x="5834478" y="2646328"/>
+            <a:ext cx="6180691" cy="3188452"/>
+          </a:xfrm>
+          <a:prstGeom prst="rect">
+            <a:avLst/>
+          </a:prstGeom>
+          <a:noFill/>
+          <a:extLst>
+            <a:ext uri="{909E8E84-426E-40DD-AFC4-6F175D3DCCD1}">
+              <a14:hiddenFill xmlns:a14="http://schemas.microsoft.com/office/drawing/2010/main">
+                <a:solidFill>
+                  <a:srgbClr val="FFFFFF"/>
+                </a:solidFill>
+              </a14:hiddenFill>
+            </a:ext>
+          </a:extLst>
+        </p:spPr>
+      </p:pic>
+      <p:pic>
+        <p:nvPicPr>
+          <p:cNvPr id="2058" name="Picture 10" descr="https://upload.wikimedia.org/wikipedia/commons/thumb/e/e4/Visual_Studio_2013_Logo.svg/500px-Visual_Studio_2013_Logo.svg.png"/>
+          <p:cNvPicPr>
+            <a:picLocks noChangeAspect="1" noChangeArrowheads="1"/>
+          </p:cNvPicPr>
+          <p:nvPr/>
+        </p:nvPicPr>
+        <p:blipFill>
+          <a:blip r:embed="rId3">
+            <a:extLst>
+              <a:ext uri="{28A0092B-C50C-407E-A947-70E740481C1C}">
+                <a14:useLocalDpi xmlns:a14="http://schemas.microsoft.com/office/drawing/2010/main" val="0"/>
+              </a:ext>
+            </a:extLst>
+          </a:blip>
+          <a:srcRect/>
+          <a:stretch>
+            <a:fillRect/>
+          </a:stretch>
+        </p:blipFill>
+        <p:spPr bwMode="auto">
+          <a:xfrm>
+            <a:off x="8754143" y="95673"/>
+            <a:ext cx="2323312" cy="2402305"/>
+          </a:xfrm>
+          <a:prstGeom prst="rect">
+            <a:avLst/>
+          </a:prstGeom>
+          <a:noFill/>
+          <a:extLst>
+            <a:ext uri="{909E8E84-426E-40DD-AFC4-6F175D3DCCD1}">
+              <a14:hiddenFill xmlns:a14="http://schemas.microsoft.com/office/drawing/2010/main">
+                <a:solidFill>
+                  <a:srgbClr val="FFFFFF"/>
+                </a:solidFill>
+              </a14:hiddenFill>
+            </a:ext>
+          </a:extLst>
+        </p:spPr>
+      </p:pic>
+    </p:spTree>
+    <p:extLst>
+      <p:ext uri="{BB962C8B-B14F-4D97-AF65-F5344CB8AC3E}">
+        <p14:creationId xmlns:p14="http://schemas.microsoft.com/office/powerpoint/2010/main" val="3516602120"/>
+      </p:ext>
+    </p:extLst>
+  </p:cSld>
+  <p:clrMapOvr>
+    <a:masterClrMapping/>
+  </p:clrMapOvr>
+</p:sld>
+</file>
+
+<file path=ppt/slides/slide33.xml><?xml version="1.0" encoding="utf-8"?>
+<p:sld xmlns:a="http://schemas.openxmlformats.org/drawingml/2006/main" xmlns:r="http://schemas.openxmlformats.org/officeDocument/2006/relationships" xmlns:p="http://schemas.openxmlformats.org/presentationml/2006/main">
+  <p:cSld>
+    <p:spTree>
+      <p:nvGrpSpPr>
+        <p:cNvPr id="1" name=""/>
+        <p:cNvGrpSpPr/>
+        <p:nvPr/>
+      </p:nvGrpSpPr>
+      <p:grpSpPr>
+        <a:xfrm>
+          <a:off x="0" y="0"/>
+          <a:ext cx="0" cy="0"/>
+          <a:chOff x="0" y="0"/>
+          <a:chExt cx="0" cy="0"/>
+        </a:xfrm>
+      </p:grpSpPr>
+      <p:sp>
+        <p:nvSpPr>
+          <p:cNvPr id="5" name="TextBox 4"/>
+          <p:cNvSpPr txBox="1"/>
+          <p:nvPr/>
+        </p:nvSpPr>
+        <p:spPr>
+          <a:xfrm>
+            <a:off x="481449" y="288758"/>
+            <a:ext cx="1435586" cy="769441"/>
+          </a:xfrm>
+          <a:prstGeom prst="rect">
+            <a:avLst/>
+          </a:prstGeom>
+          <a:noFill/>
+        </p:spPr>
+        <p:txBody>
+          <a:bodyPr wrap="none" rtlCol="0">
+            <a:spAutoFit/>
+          </a:bodyPr>
+          <a:lstStyle/>
+          <a:p>
+            <a:r>
+              <a:rPr lang="en-US" sz="4400" dirty="0" smtClean="0"/>
+              <a:t>More</a:t>
+            </a:r>
+            <a:endParaRPr lang="en-US" sz="4400" dirty="0"/>
+          </a:p>
+        </p:txBody>
+      </p:sp>
+      <p:cxnSp>
+        <p:nvCxnSpPr>
+          <p:cNvPr id="25" name="Straight Connector 24"/>
+          <p:cNvCxnSpPr/>
+          <p:nvPr/>
+        </p:nvCxnSpPr>
+        <p:spPr>
+          <a:xfrm>
+            <a:off x="1575632" y="2497978"/>
+            <a:ext cx="22282" cy="1742576"/>
+          </a:xfrm>
+          <a:prstGeom prst="line">
+            <a:avLst/>
+          </a:prstGeom>
+          <a:ln w="57150">
+            <a:solidFill>
+              <a:schemeClr val="bg1"/>
+            </a:solidFill>
+            <a:prstDash val="sysDot"/>
+          </a:ln>
+        </p:spPr>
+        <p:style>
+          <a:lnRef idx="1">
+            <a:schemeClr val="accent1"/>
+          </a:lnRef>
+          <a:fillRef idx="0">
+            <a:schemeClr val="accent1"/>
+          </a:fillRef>
+          <a:effectRef idx="0">
+            <a:schemeClr val="accent1"/>
+          </a:effectRef>
+          <a:fontRef idx="minor">
+            <a:schemeClr val="tx1"/>
+          </a:fontRef>
+        </p:style>
+      </p:cxnSp>
+      <p:sp>
+        <p:nvSpPr>
+          <p:cNvPr id="28" name="TextBox 27"/>
+          <p:cNvSpPr txBox="1"/>
+          <p:nvPr/>
+        </p:nvSpPr>
+        <p:spPr>
+          <a:xfrm>
+            <a:off x="481449" y="1137831"/>
+            <a:ext cx="8403262" cy="5878532"/>
+          </a:xfrm>
+          <a:prstGeom prst="rect">
+            <a:avLst/>
+          </a:prstGeom>
+          <a:noFill/>
+        </p:spPr>
+        <p:txBody>
+          <a:bodyPr wrap="none" rtlCol="0">
+            <a:spAutoFit/>
+          </a:bodyPr>
+          <a:lstStyle/>
+          <a:p>
+            <a:pPr marL="285750" indent="-285750">
+              <a:buFont typeface="Arial" panose="020B0604020202020204" pitchFamily="34" charset="0"/>
+              <a:buChar char="•"/>
+            </a:pPr>
+            <a:r>
+              <a:rPr lang="en-US" sz="3200" dirty="0" smtClean="0">
+                <a:cs typeface="Consolas" panose="020B0609020204030204" pitchFamily="49" charset="0"/>
+              </a:rPr>
+              <a:t>Undo working copy changes, but save them</a:t>
+            </a:r>
+          </a:p>
+          <a:p>
+            <a:pPr lvl="2"/>
+            <a:r>
+              <a:rPr lang="en-US" sz="2800" dirty="0" err="1">
+                <a:solidFill>
+                  <a:schemeClr val="accent1">
+                    <a:lumMod val="75000"/>
+                  </a:schemeClr>
+                </a:solidFill>
+                <a:latin typeface="Consolas" panose="020B0609020204030204" pitchFamily="49" charset="0"/>
+                <a:cs typeface="Consolas" panose="020B0609020204030204" pitchFamily="49" charset="0"/>
+              </a:rPr>
+              <a:t>git</a:t>
+            </a:r>
+            <a:r>
+              <a:rPr lang="en-US" sz="2800" dirty="0">
+                <a:solidFill>
+                  <a:schemeClr val="accent1">
+                    <a:lumMod val="75000"/>
+                  </a:schemeClr>
+                </a:solidFill>
+                <a:latin typeface="Consolas" panose="020B0609020204030204" pitchFamily="49" charset="0"/>
+                <a:cs typeface="Consolas" panose="020B0609020204030204" pitchFamily="49" charset="0"/>
+              </a:rPr>
+              <a:t> </a:t>
+            </a:r>
+            <a:r>
+              <a:rPr lang="en-US" sz="2800" dirty="0" smtClean="0">
+                <a:solidFill>
+                  <a:schemeClr val="accent1">
+                    <a:lumMod val="75000"/>
+                  </a:schemeClr>
+                </a:solidFill>
+                <a:latin typeface="Consolas" panose="020B0609020204030204" pitchFamily="49" charset="0"/>
+                <a:cs typeface="Consolas" panose="020B0609020204030204" pitchFamily="49" charset="0"/>
+              </a:rPr>
+              <a:t>stash [apply]</a:t>
+            </a:r>
+          </a:p>
+          <a:p>
+            <a:pPr lvl="2"/>
+            <a:endParaRPr lang="en-US" sz="2800" dirty="0">
+              <a:solidFill>
+                <a:schemeClr val="accent1">
+                  <a:lumMod val="75000"/>
+                </a:schemeClr>
+              </a:solidFill>
+              <a:latin typeface="Consolas" panose="020B0609020204030204" pitchFamily="49" charset="0"/>
+              <a:cs typeface="Consolas" panose="020B0609020204030204" pitchFamily="49" charset="0"/>
+            </a:endParaRPr>
+          </a:p>
+          <a:p>
+            <a:pPr marL="285750" indent="-285750">
+              <a:buFont typeface="Arial" panose="020B0604020202020204" pitchFamily="34" charset="0"/>
+              <a:buChar char="•"/>
+            </a:pPr>
+            <a:r>
+              <a:rPr lang="en-US" sz="3200" dirty="0" smtClean="0">
+                <a:cs typeface="Consolas" panose="020B0609020204030204" pitchFamily="49" charset="0"/>
+              </a:rPr>
+              <a:t>Migrate commit(s) to any other branch</a:t>
+            </a:r>
+          </a:p>
+          <a:p>
+            <a:r>
+              <a:rPr lang="en-US" sz="3200" dirty="0">
+                <a:cs typeface="Consolas" panose="020B0609020204030204" pitchFamily="49" charset="0"/>
+              </a:rPr>
+              <a:t>	</a:t>
+            </a:r>
+            <a:r>
+              <a:rPr lang="en-US" sz="2800" dirty="0" err="1">
+                <a:solidFill>
+                  <a:schemeClr val="accent1">
+                    <a:lumMod val="75000"/>
+                  </a:schemeClr>
+                </a:solidFill>
+                <a:latin typeface="Consolas" panose="020B0609020204030204" pitchFamily="49" charset="0"/>
+                <a:cs typeface="Consolas" panose="020B0609020204030204" pitchFamily="49" charset="0"/>
+              </a:rPr>
+              <a:t>git</a:t>
+            </a:r>
+            <a:r>
+              <a:rPr lang="en-US" sz="2800" dirty="0">
+                <a:solidFill>
+                  <a:schemeClr val="accent1">
+                    <a:lumMod val="75000"/>
+                  </a:schemeClr>
+                </a:solidFill>
+                <a:latin typeface="Consolas" panose="020B0609020204030204" pitchFamily="49" charset="0"/>
+                <a:cs typeface="Consolas" panose="020B0609020204030204" pitchFamily="49" charset="0"/>
+              </a:rPr>
+              <a:t> </a:t>
+            </a:r>
+            <a:r>
+              <a:rPr lang="en-US" sz="2800" dirty="0" smtClean="0">
+                <a:solidFill>
+                  <a:schemeClr val="accent1">
+                    <a:lumMod val="75000"/>
+                  </a:schemeClr>
+                </a:solidFill>
+                <a:latin typeface="Consolas" panose="020B0609020204030204" pitchFamily="49" charset="0"/>
+                <a:cs typeface="Consolas" panose="020B0609020204030204" pitchFamily="49" charset="0"/>
+              </a:rPr>
+              <a:t>cherry-pick &lt;commit&gt;</a:t>
+            </a:r>
+          </a:p>
+          <a:p>
+            <a:pPr marL="285750" indent="-285750">
+              <a:buFont typeface="Arial" panose="020B0604020202020204" pitchFamily="34" charset="0"/>
+              <a:buChar char="•"/>
+            </a:pPr>
+            <a:endParaRPr lang="en-US" sz="3200" dirty="0" smtClean="0">
+              <a:cs typeface="Consolas" panose="020B0609020204030204" pitchFamily="49" charset="0"/>
+            </a:endParaRPr>
+          </a:p>
+          <a:p>
+            <a:pPr marL="285750" indent="-285750">
+              <a:buFont typeface="Arial" panose="020B0604020202020204" pitchFamily="34" charset="0"/>
+              <a:buChar char="•"/>
+            </a:pPr>
+            <a:r>
+              <a:rPr lang="en-US" sz="3200" dirty="0" smtClean="0">
+                <a:cs typeface="Consolas" panose="020B0609020204030204" pitchFamily="49" charset="0"/>
+              </a:rPr>
+              <a:t>Creating </a:t>
+            </a:r>
+            <a:r>
+              <a:rPr lang="en-US" sz="3200" dirty="0">
+                <a:cs typeface="Consolas" panose="020B0609020204030204" pitchFamily="49" charset="0"/>
+              </a:rPr>
+              <a:t>a patch</a:t>
+            </a:r>
+          </a:p>
+          <a:p>
+            <a:pPr lvl="1"/>
+            <a:r>
+              <a:rPr lang="en-US" sz="3200" dirty="0">
+                <a:cs typeface="Consolas" panose="020B0609020204030204" pitchFamily="49" charset="0"/>
+              </a:rPr>
+              <a:t>	</a:t>
+            </a:r>
+            <a:r>
+              <a:rPr lang="en-US" sz="2800" dirty="0" err="1">
+                <a:solidFill>
+                  <a:schemeClr val="accent1">
+                    <a:lumMod val="75000"/>
+                  </a:schemeClr>
+                </a:solidFill>
+                <a:latin typeface="Consolas" panose="020B0609020204030204" pitchFamily="49" charset="0"/>
+                <a:cs typeface="Consolas" panose="020B0609020204030204" pitchFamily="49" charset="0"/>
+              </a:rPr>
+              <a:t>git</a:t>
+            </a:r>
+            <a:r>
+              <a:rPr lang="en-US" sz="2800" dirty="0">
+                <a:solidFill>
+                  <a:schemeClr val="accent1">
+                    <a:lumMod val="75000"/>
+                  </a:schemeClr>
+                </a:solidFill>
+                <a:latin typeface="Consolas" panose="020B0609020204030204" pitchFamily="49" charset="0"/>
+                <a:cs typeface="Consolas" panose="020B0609020204030204" pitchFamily="49" charset="0"/>
+              </a:rPr>
+              <a:t> diff &amp;&amp; </a:t>
+            </a:r>
+            <a:r>
+              <a:rPr lang="en-US" sz="2800" dirty="0" err="1">
+                <a:solidFill>
+                  <a:schemeClr val="accent1">
+                    <a:lumMod val="75000"/>
+                  </a:schemeClr>
+                </a:solidFill>
+                <a:latin typeface="Consolas" panose="020B0609020204030204" pitchFamily="49" charset="0"/>
+                <a:cs typeface="Consolas" panose="020B0609020204030204" pitchFamily="49" charset="0"/>
+              </a:rPr>
+              <a:t>git</a:t>
+            </a:r>
+            <a:r>
+              <a:rPr lang="en-US" sz="2800" dirty="0">
+                <a:solidFill>
+                  <a:schemeClr val="accent1">
+                    <a:lumMod val="75000"/>
+                  </a:schemeClr>
+                </a:solidFill>
+                <a:latin typeface="Consolas" panose="020B0609020204030204" pitchFamily="49" charset="0"/>
+                <a:cs typeface="Consolas" panose="020B0609020204030204" pitchFamily="49" charset="0"/>
+              </a:rPr>
+              <a:t> apply</a:t>
+            </a:r>
+          </a:p>
+          <a:p>
+            <a:pPr marL="285750" indent="-285750">
+              <a:buFont typeface="Arial" panose="020B0604020202020204" pitchFamily="34" charset="0"/>
+              <a:buChar char="•"/>
+            </a:pPr>
+            <a:endParaRPr lang="en-US" sz="3200" dirty="0" smtClean="0">
+              <a:cs typeface="Consolas" panose="020B0609020204030204" pitchFamily="49" charset="0"/>
+            </a:endParaRPr>
+          </a:p>
+          <a:p>
+            <a:pPr marL="285750" indent="-285750">
+              <a:buFont typeface="Arial" panose="020B0604020202020204" pitchFamily="34" charset="0"/>
+              <a:buChar char="•"/>
+            </a:pPr>
+            <a:r>
+              <a:rPr lang="en-US" sz="3200" dirty="0" smtClean="0">
+                <a:cs typeface="Consolas" panose="020B0609020204030204" pitchFamily="49" charset="0"/>
+              </a:rPr>
+              <a:t>Aggregate several commits into</a:t>
+            </a:r>
+          </a:p>
+          <a:p>
+            <a:r>
+              <a:rPr lang="en-US" sz="3200" dirty="0">
+                <a:cs typeface="Consolas" panose="020B0609020204030204" pitchFamily="49" charset="0"/>
+              </a:rPr>
+              <a:t>	</a:t>
+            </a:r>
+            <a:r>
+              <a:rPr lang="en-US" sz="2800" dirty="0" err="1">
+                <a:solidFill>
+                  <a:schemeClr val="accent1">
+                    <a:lumMod val="75000"/>
+                  </a:schemeClr>
+                </a:solidFill>
+                <a:latin typeface="Consolas" panose="020B0609020204030204" pitchFamily="49" charset="0"/>
+                <a:cs typeface="Consolas" panose="020B0609020204030204" pitchFamily="49" charset="0"/>
+              </a:rPr>
+              <a:t>git</a:t>
+            </a:r>
+            <a:r>
+              <a:rPr lang="en-US" sz="2800" dirty="0">
+                <a:solidFill>
+                  <a:schemeClr val="accent1">
+                    <a:lumMod val="75000"/>
+                  </a:schemeClr>
+                </a:solidFill>
+                <a:latin typeface="Consolas" panose="020B0609020204030204" pitchFamily="49" charset="0"/>
+                <a:cs typeface="Consolas" panose="020B0609020204030204" pitchFamily="49" charset="0"/>
+              </a:rPr>
+              <a:t> reset --soft </a:t>
+            </a:r>
+            <a:r>
+              <a:rPr lang="en-US" sz="2800" dirty="0" err="1">
+                <a:solidFill>
+                  <a:schemeClr val="accent1">
+                    <a:lumMod val="75000"/>
+                  </a:schemeClr>
+                </a:solidFill>
+                <a:latin typeface="Consolas" panose="020B0609020204030204" pitchFamily="49" charset="0"/>
+                <a:cs typeface="Consolas" panose="020B0609020204030204" pitchFamily="49" charset="0"/>
+              </a:rPr>
+              <a:t>HEAD~n</a:t>
+            </a:r>
+            <a:r>
+              <a:rPr lang="en-US" sz="2800" dirty="0">
+                <a:solidFill>
+                  <a:schemeClr val="accent1">
+                    <a:lumMod val="75000"/>
+                  </a:schemeClr>
+                </a:solidFill>
+                <a:latin typeface="Consolas" panose="020B0609020204030204" pitchFamily="49" charset="0"/>
+                <a:cs typeface="Consolas" panose="020B0609020204030204" pitchFamily="49" charset="0"/>
+              </a:rPr>
+              <a:t> &amp;&amp; </a:t>
+            </a:r>
+            <a:r>
+              <a:rPr lang="en-US" sz="2800" dirty="0" err="1">
+                <a:solidFill>
+                  <a:schemeClr val="accent1">
+                    <a:lumMod val="75000"/>
+                  </a:schemeClr>
+                </a:solidFill>
+                <a:latin typeface="Consolas" panose="020B0609020204030204" pitchFamily="49" charset="0"/>
+                <a:cs typeface="Consolas" panose="020B0609020204030204" pitchFamily="49" charset="0"/>
+              </a:rPr>
+              <a:t>git</a:t>
+            </a:r>
+            <a:r>
+              <a:rPr lang="en-US" sz="2800" dirty="0">
+                <a:solidFill>
+                  <a:schemeClr val="accent1">
+                    <a:lumMod val="75000"/>
+                  </a:schemeClr>
+                </a:solidFill>
+                <a:latin typeface="Consolas" panose="020B0609020204030204" pitchFamily="49" charset="0"/>
+                <a:cs typeface="Consolas" panose="020B0609020204030204" pitchFamily="49" charset="0"/>
+              </a:rPr>
+              <a:t> commit</a:t>
+            </a:r>
+          </a:p>
+          <a:p>
+            <a:endParaRPr lang="en-US" sz="3200" dirty="0" smtClean="0">
+              <a:cs typeface="Consolas" panose="020B0609020204030204" pitchFamily="49" charset="0"/>
+            </a:endParaRPr>
+          </a:p>
+        </p:txBody>
+      </p:sp>
+    </p:spTree>
+    <p:extLst>
+      <p:ext uri="{BB962C8B-B14F-4D97-AF65-F5344CB8AC3E}">
+        <p14:creationId xmlns:p14="http://schemas.microsoft.com/office/powerpoint/2010/main" val="2832971978"/>
+      </p:ext>
+    </p:extLst>
+  </p:cSld>
+  <p:clrMapOvr>
+    <a:masterClrMapping/>
+  </p:clrMapOvr>
+</p:sld>
+</file>
+
+<file path=ppt/slides/slide34.xml><?xml version="1.0" encoding="utf-8"?>
+<p:sld xmlns:a="http://schemas.openxmlformats.org/drawingml/2006/main" xmlns:r="http://schemas.openxmlformats.org/officeDocument/2006/relationships" xmlns:p="http://schemas.openxmlformats.org/presentationml/2006/main">
+  <p:cSld>
+    <p:spTree>
+      <p:nvGrpSpPr>
+        <p:cNvPr id="1" name=""/>
+        <p:cNvGrpSpPr/>
+        <p:nvPr/>
+      </p:nvGrpSpPr>
+      <p:grpSpPr>
+        <a:xfrm>
+          <a:off x="0" y="0"/>
+          <a:ext cx="0" cy="0"/>
+          <a:chOff x="0" y="0"/>
+          <a:chExt cx="0" cy="0"/>
+        </a:xfrm>
+      </p:grpSpPr>
+      <p:sp>
+        <p:nvSpPr>
+          <p:cNvPr id="5" name="TextBox 4"/>
+          <p:cNvSpPr txBox="1"/>
+          <p:nvPr/>
+        </p:nvSpPr>
+        <p:spPr>
+          <a:xfrm>
+            <a:off x="481449" y="288758"/>
+            <a:ext cx="1435586" cy="769441"/>
+          </a:xfrm>
+          <a:prstGeom prst="rect">
+            <a:avLst/>
+          </a:prstGeom>
+          <a:noFill/>
+        </p:spPr>
+        <p:txBody>
+          <a:bodyPr wrap="none" rtlCol="0">
+            <a:spAutoFit/>
+          </a:bodyPr>
+          <a:lstStyle/>
+          <a:p>
+            <a:r>
+              <a:rPr lang="en-US" sz="4400" dirty="0" smtClean="0"/>
+              <a:t>More</a:t>
+            </a:r>
+            <a:endParaRPr lang="en-US" sz="4400" dirty="0"/>
+          </a:p>
+        </p:txBody>
+      </p:sp>
+      <p:cxnSp>
+        <p:nvCxnSpPr>
+          <p:cNvPr id="25" name="Straight Connector 24"/>
+          <p:cNvCxnSpPr/>
+          <p:nvPr/>
+        </p:nvCxnSpPr>
+        <p:spPr>
+          <a:xfrm>
+            <a:off x="1575632" y="2497978"/>
+            <a:ext cx="22282" cy="1742576"/>
+          </a:xfrm>
+          <a:prstGeom prst="line">
+            <a:avLst/>
+          </a:prstGeom>
+          <a:ln w="57150">
+            <a:solidFill>
+              <a:schemeClr val="bg1"/>
+            </a:solidFill>
+            <a:prstDash val="sysDot"/>
+          </a:ln>
+        </p:spPr>
+        <p:style>
+          <a:lnRef idx="1">
+            <a:schemeClr val="accent1"/>
+          </a:lnRef>
+          <a:fillRef idx="0">
+            <a:schemeClr val="accent1"/>
+          </a:fillRef>
+          <a:effectRef idx="0">
+            <a:schemeClr val="accent1"/>
+          </a:effectRef>
+          <a:fontRef idx="minor">
+            <a:schemeClr val="tx1"/>
+          </a:fontRef>
+        </p:style>
+      </p:cxnSp>
+      <p:sp>
+        <p:nvSpPr>
+          <p:cNvPr id="28" name="TextBox 27"/>
+          <p:cNvSpPr txBox="1"/>
+          <p:nvPr/>
+        </p:nvSpPr>
+        <p:spPr>
+          <a:xfrm>
+            <a:off x="481449" y="1137831"/>
+            <a:ext cx="10115270" cy="5878532"/>
+          </a:xfrm>
+          <a:prstGeom prst="rect">
+            <a:avLst/>
+          </a:prstGeom>
+          <a:noFill/>
+        </p:spPr>
+        <p:txBody>
+          <a:bodyPr wrap="none" rtlCol="0">
+            <a:spAutoFit/>
+          </a:bodyPr>
+          <a:lstStyle/>
+          <a:p>
+            <a:endParaRPr lang="en-US" sz="3200" dirty="0">
+              <a:cs typeface="Consolas" panose="020B0609020204030204" pitchFamily="49" charset="0"/>
+            </a:endParaRPr>
+          </a:p>
+          <a:p>
+            <a:pPr marL="285750" indent="-285750">
+              <a:buFont typeface="Arial" panose="020B0604020202020204" pitchFamily="34" charset="0"/>
+              <a:buChar char="•"/>
+            </a:pPr>
+            <a:r>
+              <a:rPr lang="en-US" sz="3200" dirty="0">
+                <a:cs typeface="Consolas" panose="020B0609020204030204" pitchFamily="49" charset="0"/>
+              </a:rPr>
+              <a:t>Find a commit which introduced a regression</a:t>
+            </a:r>
+          </a:p>
+          <a:p>
+            <a:r>
+              <a:rPr lang="en-US" sz="3200" dirty="0">
+                <a:cs typeface="Consolas" panose="020B0609020204030204" pitchFamily="49" charset="0"/>
+              </a:rPr>
+              <a:t>	</a:t>
+            </a:r>
+            <a:r>
+              <a:rPr lang="en-US" sz="2800" dirty="0" err="1">
+                <a:solidFill>
+                  <a:schemeClr val="accent1">
+                    <a:lumMod val="75000"/>
+                  </a:schemeClr>
+                </a:solidFill>
+                <a:latin typeface="Consolas" panose="020B0609020204030204" pitchFamily="49" charset="0"/>
+                <a:cs typeface="Consolas" panose="020B0609020204030204" pitchFamily="49" charset="0"/>
+              </a:rPr>
+              <a:t>git</a:t>
+            </a:r>
+            <a:r>
+              <a:rPr lang="en-US" sz="2800" dirty="0">
+                <a:solidFill>
+                  <a:schemeClr val="accent1">
+                    <a:lumMod val="75000"/>
+                  </a:schemeClr>
+                </a:solidFill>
+                <a:latin typeface="Consolas" panose="020B0609020204030204" pitchFamily="49" charset="0"/>
+                <a:cs typeface="Consolas" panose="020B0609020204030204" pitchFamily="49" charset="0"/>
+              </a:rPr>
+              <a:t> bisect</a:t>
+            </a:r>
+          </a:p>
+          <a:p>
+            <a:pPr marL="285750" indent="-285750">
+              <a:buFont typeface="Arial" panose="020B0604020202020204" pitchFamily="34" charset="0"/>
+              <a:buChar char="•"/>
+            </a:pPr>
+            <a:endParaRPr lang="en-US" sz="3200" dirty="0" smtClean="0">
+              <a:cs typeface="Consolas" panose="020B0609020204030204" pitchFamily="49" charset="0"/>
+            </a:endParaRPr>
+          </a:p>
+          <a:p>
+            <a:pPr marL="285750" indent="-285750">
+              <a:buFont typeface="Arial" panose="020B0604020202020204" pitchFamily="34" charset="0"/>
+              <a:buChar char="•"/>
+            </a:pPr>
+            <a:r>
+              <a:rPr lang="en-US" sz="3200" dirty="0" smtClean="0">
+                <a:cs typeface="Consolas" panose="020B0609020204030204" pitchFamily="49" charset="0"/>
+              </a:rPr>
+              <a:t>Find when some string first appeared</a:t>
+            </a:r>
+          </a:p>
+          <a:p>
+            <a:r>
+              <a:rPr lang="en-US" sz="3200" dirty="0">
+                <a:cs typeface="Consolas" panose="020B0609020204030204" pitchFamily="49" charset="0"/>
+              </a:rPr>
+              <a:t>	</a:t>
+            </a:r>
+            <a:r>
+              <a:rPr lang="en-US" sz="2800" dirty="0" err="1">
+                <a:solidFill>
+                  <a:schemeClr val="accent1">
+                    <a:lumMod val="75000"/>
+                  </a:schemeClr>
+                </a:solidFill>
+                <a:latin typeface="Consolas" panose="020B0609020204030204" pitchFamily="49" charset="0"/>
+                <a:cs typeface="Consolas" panose="020B0609020204030204" pitchFamily="49" charset="0"/>
+              </a:rPr>
+              <a:t>git</a:t>
+            </a:r>
+            <a:r>
+              <a:rPr lang="en-US" sz="2800" dirty="0">
+                <a:solidFill>
+                  <a:schemeClr val="accent1">
+                    <a:lumMod val="75000"/>
+                  </a:schemeClr>
+                </a:solidFill>
+                <a:latin typeface="Consolas" panose="020B0609020204030204" pitchFamily="49" charset="0"/>
+                <a:cs typeface="Consolas" panose="020B0609020204030204" pitchFamily="49" charset="0"/>
+              </a:rPr>
+              <a:t> log -S&lt;search term&gt;</a:t>
+            </a:r>
+          </a:p>
+          <a:p>
+            <a:pPr marL="285750" indent="-285750">
+              <a:buFont typeface="Arial" panose="020B0604020202020204" pitchFamily="34" charset="0"/>
+              <a:buChar char="•"/>
+            </a:pPr>
+            <a:endParaRPr lang="en-US" sz="3200" dirty="0" smtClean="0">
+              <a:cs typeface="Consolas" panose="020B0609020204030204" pitchFamily="49" charset="0"/>
+            </a:endParaRPr>
+          </a:p>
+          <a:p>
+            <a:pPr marL="285750" indent="-285750">
+              <a:buFont typeface="Arial" panose="020B0604020202020204" pitchFamily="34" charset="0"/>
+              <a:buChar char="•"/>
+            </a:pPr>
+            <a:r>
+              <a:rPr lang="en-US" sz="3200" dirty="0" smtClean="0">
+                <a:cs typeface="Consolas" panose="020B0609020204030204" pitchFamily="49" charset="0"/>
+              </a:rPr>
+              <a:t>Show </a:t>
+            </a:r>
+            <a:r>
+              <a:rPr lang="en-US" sz="3200" dirty="0">
+                <a:cs typeface="Consolas" panose="020B0609020204030204" pitchFamily="49" charset="0"/>
+              </a:rPr>
+              <a:t>today’s work</a:t>
+            </a:r>
+          </a:p>
+          <a:p>
+            <a:pPr lvl="1"/>
+            <a:r>
+              <a:rPr lang="en-US" sz="3200" dirty="0">
+                <a:cs typeface="Consolas" panose="020B0609020204030204" pitchFamily="49" charset="0"/>
+              </a:rPr>
+              <a:t>	</a:t>
+            </a:r>
+            <a:r>
+              <a:rPr lang="en-US" sz="2800" dirty="0" err="1" smtClean="0">
+                <a:solidFill>
+                  <a:schemeClr val="accent1">
+                    <a:lumMod val="75000"/>
+                  </a:schemeClr>
+                </a:solidFill>
+                <a:latin typeface="Consolas" panose="020B0609020204030204" pitchFamily="49" charset="0"/>
+                <a:cs typeface="Consolas" panose="020B0609020204030204" pitchFamily="49" charset="0"/>
+              </a:rPr>
+              <a:t>git</a:t>
+            </a:r>
+            <a:r>
+              <a:rPr lang="en-US" sz="2800" dirty="0" smtClean="0">
+                <a:solidFill>
+                  <a:schemeClr val="accent1">
+                    <a:lumMod val="75000"/>
+                  </a:schemeClr>
+                </a:solidFill>
+                <a:latin typeface="Consolas" panose="020B0609020204030204" pitchFamily="49" charset="0"/>
+                <a:cs typeface="Consolas" panose="020B0609020204030204" pitchFamily="49" charset="0"/>
+              </a:rPr>
+              <a:t> </a:t>
+            </a:r>
+            <a:r>
+              <a:rPr lang="en-US" sz="2800" dirty="0">
+                <a:solidFill>
+                  <a:schemeClr val="accent1">
+                    <a:lumMod val="75000"/>
+                  </a:schemeClr>
+                </a:solidFill>
+                <a:latin typeface="Consolas" panose="020B0609020204030204" pitchFamily="49" charset="0"/>
+                <a:cs typeface="Consolas" panose="020B0609020204030204" pitchFamily="49" charset="0"/>
+              </a:rPr>
+              <a:t>log --after="</a:t>
+            </a:r>
+            <a:r>
+              <a:rPr lang="en-US" sz="2800" dirty="0" smtClean="0">
+                <a:solidFill>
+                  <a:schemeClr val="accent1">
+                    <a:lumMod val="75000"/>
+                  </a:schemeClr>
+                </a:solidFill>
+                <a:latin typeface="Consolas" panose="020B0609020204030204" pitchFamily="49" charset="0"/>
+                <a:cs typeface="Consolas" panose="020B0609020204030204" pitchFamily="49" charset="0"/>
+              </a:rPr>
+              <a:t>yesterday“</a:t>
+            </a:r>
+          </a:p>
+          <a:p>
+            <a:pPr lvl="1"/>
+            <a:r>
+              <a:rPr lang="en-US" sz="2800" dirty="0">
+                <a:solidFill>
+                  <a:schemeClr val="accent1">
+                    <a:lumMod val="75000"/>
+                  </a:schemeClr>
+                </a:solidFill>
+                <a:latin typeface="Consolas" panose="020B0609020204030204" pitchFamily="49" charset="0"/>
+                <a:cs typeface="Consolas" panose="020B0609020204030204" pitchFamily="49" charset="0"/>
+              </a:rPr>
+              <a:t>	</a:t>
+            </a:r>
+            <a:r>
+              <a:rPr lang="en-US" sz="2800" dirty="0" smtClean="0">
+                <a:solidFill>
+                  <a:schemeClr val="accent1">
+                    <a:lumMod val="75000"/>
+                  </a:schemeClr>
+                </a:solidFill>
+                <a:latin typeface="Consolas" panose="020B0609020204030204" pitchFamily="49" charset="0"/>
+                <a:cs typeface="Consolas" panose="020B0609020204030204" pitchFamily="49" charset="0"/>
+              </a:rPr>
+              <a:t>	--</a:t>
+            </a:r>
+            <a:r>
+              <a:rPr lang="en-US" sz="2800" dirty="0">
+                <a:solidFill>
+                  <a:schemeClr val="accent1">
+                    <a:lumMod val="75000"/>
+                  </a:schemeClr>
+                </a:solidFill>
+                <a:latin typeface="Consolas" panose="020B0609020204030204" pitchFamily="49" charset="0"/>
+                <a:cs typeface="Consolas" panose="020B0609020204030204" pitchFamily="49" charset="0"/>
+              </a:rPr>
+              <a:t>pretty=format:%s --author="Oleg </a:t>
+            </a:r>
+            <a:r>
+              <a:rPr lang="en-US" sz="2800" dirty="0" err="1">
+                <a:solidFill>
+                  <a:schemeClr val="accent1">
+                    <a:lumMod val="75000"/>
+                  </a:schemeClr>
+                </a:solidFill>
+                <a:latin typeface="Consolas" panose="020B0609020204030204" pitchFamily="49" charset="0"/>
+                <a:cs typeface="Consolas" panose="020B0609020204030204" pitchFamily="49" charset="0"/>
+              </a:rPr>
+              <a:t>Volkov</a:t>
+            </a:r>
+            <a:r>
+              <a:rPr lang="en-US" sz="2800" dirty="0">
+                <a:solidFill>
+                  <a:schemeClr val="accent1">
+                    <a:lumMod val="75000"/>
+                  </a:schemeClr>
+                </a:solidFill>
+                <a:latin typeface="Consolas" panose="020B0609020204030204" pitchFamily="49" charset="0"/>
+                <a:cs typeface="Consolas" panose="020B0609020204030204" pitchFamily="49" charset="0"/>
+              </a:rPr>
+              <a:t>"</a:t>
+            </a:r>
+          </a:p>
+          <a:p>
+            <a:pPr lvl="1"/>
+            <a:endParaRPr lang="en-US" sz="2800" dirty="0">
+              <a:solidFill>
+                <a:schemeClr val="accent1">
+                  <a:lumMod val="75000"/>
+                </a:schemeClr>
+              </a:solidFill>
+              <a:latin typeface="Consolas" panose="020B0609020204030204" pitchFamily="49" charset="0"/>
+              <a:cs typeface="Consolas" panose="020B0609020204030204" pitchFamily="49" charset="0"/>
+            </a:endParaRPr>
+          </a:p>
+          <a:p>
+            <a:endParaRPr lang="en-US" sz="3200" dirty="0">
+              <a:cs typeface="Consolas" panose="020B0609020204030204" pitchFamily="49" charset="0"/>
+            </a:endParaRPr>
+          </a:p>
+        </p:txBody>
+      </p:sp>
+    </p:spTree>
+    <p:extLst>
+      <p:ext uri="{BB962C8B-B14F-4D97-AF65-F5344CB8AC3E}">
+        <p14:creationId xmlns:p14="http://schemas.microsoft.com/office/powerpoint/2010/main" val="1563695401"/>
+      </p:ext>
+    </p:extLst>
+  </p:cSld>
+  <p:clrMapOvr>
+    <a:masterClrMapping/>
+  </p:clrMapOvr>
+</p:sld>
+</file>
+
+<file path=ppt/slides/slide35.xml><?xml version="1.0" encoding="utf-8"?>
+<p:sld xmlns:a="http://schemas.openxmlformats.org/drawingml/2006/main" xmlns:r="http://schemas.openxmlformats.org/officeDocument/2006/relationships" xmlns:p="http://schemas.openxmlformats.org/presentationml/2006/main">
+  <p:cSld>
+    <p:spTree>
+      <p:nvGrpSpPr>
+        <p:cNvPr id="1" name=""/>
+        <p:cNvGrpSpPr/>
+        <p:nvPr/>
+      </p:nvGrpSpPr>
+      <p:grpSpPr>
+        <a:xfrm>
+          <a:off x="0" y="0"/>
+          <a:ext cx="0" cy="0"/>
+          <a:chOff x="0" y="0"/>
+          <a:chExt cx="0" cy="0"/>
+        </a:xfrm>
+      </p:grpSpPr>
+      <p:sp>
+        <p:nvSpPr>
+          <p:cNvPr id="5" name="TextBox 4"/>
+          <p:cNvSpPr txBox="1"/>
+          <p:nvPr/>
+        </p:nvSpPr>
+        <p:spPr>
+          <a:xfrm>
+            <a:off x="481449" y="288758"/>
+            <a:ext cx="1435586" cy="769441"/>
+          </a:xfrm>
+          <a:prstGeom prst="rect">
+            <a:avLst/>
+          </a:prstGeom>
+          <a:noFill/>
+        </p:spPr>
+        <p:txBody>
+          <a:bodyPr wrap="none" rtlCol="0">
+            <a:spAutoFit/>
+          </a:bodyPr>
+          <a:lstStyle/>
+          <a:p>
+            <a:r>
+              <a:rPr lang="en-US" sz="4400" dirty="0" smtClean="0"/>
+              <a:t>More</a:t>
+            </a:r>
+            <a:endParaRPr lang="en-US" sz="4400" dirty="0"/>
+          </a:p>
+        </p:txBody>
+      </p:sp>
+      <p:cxnSp>
+        <p:nvCxnSpPr>
+          <p:cNvPr id="25" name="Straight Connector 24"/>
+          <p:cNvCxnSpPr/>
+          <p:nvPr/>
+        </p:nvCxnSpPr>
+        <p:spPr>
+          <a:xfrm>
+            <a:off x="1575632" y="2497978"/>
+            <a:ext cx="22282" cy="1742576"/>
+          </a:xfrm>
+          <a:prstGeom prst="line">
+            <a:avLst/>
+          </a:prstGeom>
+          <a:ln w="57150">
+            <a:solidFill>
+              <a:schemeClr val="bg1"/>
+            </a:solidFill>
+            <a:prstDash val="sysDot"/>
+          </a:ln>
+        </p:spPr>
+        <p:style>
+          <a:lnRef idx="1">
+            <a:schemeClr val="accent1"/>
+          </a:lnRef>
+          <a:fillRef idx="0">
+            <a:schemeClr val="accent1"/>
+          </a:fillRef>
+          <a:effectRef idx="0">
+            <a:schemeClr val="accent1"/>
+          </a:effectRef>
+          <a:fontRef idx="minor">
+            <a:schemeClr val="tx1"/>
+          </a:fontRef>
+        </p:style>
+      </p:cxnSp>
+      <p:sp>
+        <p:nvSpPr>
+          <p:cNvPr id="28" name="TextBox 27"/>
+          <p:cNvSpPr txBox="1"/>
+          <p:nvPr/>
+        </p:nvSpPr>
+        <p:spPr>
+          <a:xfrm>
+            <a:off x="481448" y="1137831"/>
+            <a:ext cx="10306867" cy="4770537"/>
+          </a:xfrm>
+          <a:prstGeom prst="rect">
+            <a:avLst/>
+          </a:prstGeom>
+          <a:noFill/>
+        </p:spPr>
+        <p:txBody>
+          <a:bodyPr wrap="square" rtlCol="0">
+            <a:spAutoFit/>
+          </a:bodyPr>
+          <a:lstStyle/>
+          <a:p>
+            <a:pPr marL="285750" indent="-285750">
+              <a:buFont typeface="Arial" panose="020B0604020202020204" pitchFamily="34" charset="0"/>
+              <a:buChar char="•"/>
+            </a:pPr>
+            <a:r>
+              <a:rPr lang="en-US" sz="3200" dirty="0" smtClean="0">
+                <a:cs typeface="Consolas" panose="020B0609020204030204" pitchFamily="49" charset="0"/>
+              </a:rPr>
+              <a:t>Create alias for frequently used commands</a:t>
+            </a:r>
+          </a:p>
+          <a:p>
+            <a:pPr lvl="1"/>
+            <a:r>
+              <a:rPr lang="en-US" sz="3200" dirty="0">
+                <a:cs typeface="Consolas" panose="020B0609020204030204" pitchFamily="49" charset="0"/>
+              </a:rPr>
+              <a:t>	</a:t>
+            </a:r>
+            <a:r>
+              <a:rPr lang="en-US" sz="2800" dirty="0" err="1" smtClean="0">
+                <a:solidFill>
+                  <a:schemeClr val="accent1">
+                    <a:lumMod val="75000"/>
+                  </a:schemeClr>
+                </a:solidFill>
+                <a:latin typeface="Consolas" panose="020B0609020204030204" pitchFamily="49" charset="0"/>
+                <a:cs typeface="Consolas" panose="020B0609020204030204" pitchFamily="49" charset="0"/>
+              </a:rPr>
+              <a:t>git</a:t>
+            </a:r>
+            <a:r>
+              <a:rPr lang="en-US" sz="2800" dirty="0" smtClean="0">
+                <a:solidFill>
+                  <a:schemeClr val="accent1">
+                    <a:lumMod val="75000"/>
+                  </a:schemeClr>
+                </a:solidFill>
+                <a:latin typeface="Consolas" panose="020B0609020204030204" pitchFamily="49" charset="0"/>
+                <a:cs typeface="Consolas" panose="020B0609020204030204" pitchFamily="49" charset="0"/>
+              </a:rPr>
+              <a:t> </a:t>
+            </a:r>
+            <a:r>
+              <a:rPr lang="en-US" sz="2800" dirty="0" err="1" smtClean="0">
+                <a:solidFill>
+                  <a:schemeClr val="accent1">
+                    <a:lumMod val="75000"/>
+                  </a:schemeClr>
+                </a:solidFill>
+                <a:latin typeface="Consolas" panose="020B0609020204030204" pitchFamily="49" charset="0"/>
+                <a:cs typeface="Consolas" panose="020B0609020204030204" pitchFamily="49" charset="0"/>
+              </a:rPr>
+              <a:t>config</a:t>
+            </a:r>
+            <a:r>
+              <a:rPr lang="en-US" sz="2800" dirty="0" smtClean="0">
+                <a:solidFill>
+                  <a:schemeClr val="accent1">
+                    <a:lumMod val="75000"/>
+                  </a:schemeClr>
+                </a:solidFill>
+                <a:latin typeface="Consolas" panose="020B0609020204030204" pitchFamily="49" charset="0"/>
+                <a:cs typeface="Consolas" panose="020B0609020204030204" pitchFamily="49" charset="0"/>
+              </a:rPr>
+              <a:t> --global </a:t>
+            </a:r>
+            <a:r>
+              <a:rPr lang="en-US" sz="2800" dirty="0" err="1" smtClean="0">
+                <a:solidFill>
+                  <a:schemeClr val="accent1">
+                    <a:lumMod val="75000"/>
+                  </a:schemeClr>
+                </a:solidFill>
+                <a:latin typeface="Consolas" panose="020B0609020204030204" pitchFamily="49" charset="0"/>
+                <a:cs typeface="Consolas" panose="020B0609020204030204" pitchFamily="49" charset="0"/>
+              </a:rPr>
+              <a:t>alias.daily</a:t>
+            </a:r>
+            <a:endParaRPr lang="en-US" sz="2800" dirty="0" smtClean="0">
+              <a:solidFill>
+                <a:schemeClr val="accent1">
+                  <a:lumMod val="75000"/>
+                </a:schemeClr>
+              </a:solidFill>
+              <a:latin typeface="Consolas" panose="020B0609020204030204" pitchFamily="49" charset="0"/>
+              <a:cs typeface="Consolas" panose="020B0609020204030204" pitchFamily="49" charset="0"/>
+            </a:endParaRPr>
+          </a:p>
+          <a:p>
+            <a:pPr lvl="1"/>
+            <a:r>
+              <a:rPr lang="en-US" sz="2800" dirty="0" smtClean="0">
+                <a:solidFill>
+                  <a:schemeClr val="accent1">
+                    <a:lumMod val="75000"/>
+                  </a:schemeClr>
+                </a:solidFill>
+                <a:latin typeface="Consolas" panose="020B0609020204030204" pitchFamily="49" charset="0"/>
+                <a:cs typeface="Consolas" panose="020B0609020204030204" pitchFamily="49" charset="0"/>
+              </a:rPr>
+              <a:t>‘log --</a:t>
+            </a:r>
+            <a:r>
+              <a:rPr lang="en-US" sz="2800" dirty="0">
+                <a:solidFill>
+                  <a:schemeClr val="accent1">
+                    <a:lumMod val="75000"/>
+                  </a:schemeClr>
+                </a:solidFill>
+                <a:latin typeface="Consolas" panose="020B0609020204030204" pitchFamily="49" charset="0"/>
+                <a:cs typeface="Consolas" panose="020B0609020204030204" pitchFamily="49" charset="0"/>
+              </a:rPr>
+              <a:t>after="yesterday</a:t>
+            </a:r>
+            <a:r>
+              <a:rPr lang="en-US" sz="2800" dirty="0" smtClean="0">
+                <a:solidFill>
+                  <a:schemeClr val="accent1">
+                    <a:lumMod val="75000"/>
+                  </a:schemeClr>
+                </a:solidFill>
+                <a:latin typeface="Consolas" panose="020B0609020204030204" pitchFamily="49" charset="0"/>
+                <a:cs typeface="Consolas" panose="020B0609020204030204" pitchFamily="49" charset="0"/>
+              </a:rPr>
+              <a:t>“ --</a:t>
+            </a:r>
+            <a:r>
+              <a:rPr lang="en-US" sz="2800" dirty="0">
+                <a:solidFill>
+                  <a:schemeClr val="accent1">
+                    <a:lumMod val="75000"/>
+                  </a:schemeClr>
+                </a:solidFill>
+                <a:latin typeface="Consolas" panose="020B0609020204030204" pitchFamily="49" charset="0"/>
+                <a:cs typeface="Consolas" panose="020B0609020204030204" pitchFamily="49" charset="0"/>
+              </a:rPr>
+              <a:t>pretty=format:%</a:t>
+            </a:r>
+            <a:r>
+              <a:rPr lang="en-US" sz="2800" dirty="0" smtClean="0">
+                <a:solidFill>
+                  <a:schemeClr val="accent1">
+                    <a:lumMod val="75000"/>
+                  </a:schemeClr>
+                </a:solidFill>
+                <a:latin typeface="Consolas" panose="020B0609020204030204" pitchFamily="49" charset="0"/>
+                <a:cs typeface="Consolas" panose="020B0609020204030204" pitchFamily="49" charset="0"/>
+              </a:rPr>
+              <a:t>s		--</a:t>
+            </a:r>
+            <a:r>
+              <a:rPr lang="en-US" sz="2800" dirty="0">
+                <a:solidFill>
+                  <a:schemeClr val="accent1">
+                    <a:lumMod val="75000"/>
+                  </a:schemeClr>
+                </a:solidFill>
+                <a:latin typeface="Consolas" panose="020B0609020204030204" pitchFamily="49" charset="0"/>
+                <a:cs typeface="Consolas" panose="020B0609020204030204" pitchFamily="49" charset="0"/>
+              </a:rPr>
+              <a:t>author="Oleg </a:t>
+            </a:r>
+            <a:r>
+              <a:rPr lang="en-US" sz="2800" dirty="0" err="1" smtClean="0">
+                <a:solidFill>
+                  <a:schemeClr val="accent1">
+                    <a:lumMod val="75000"/>
+                  </a:schemeClr>
+                </a:solidFill>
+                <a:latin typeface="Consolas" panose="020B0609020204030204" pitchFamily="49" charset="0"/>
+                <a:cs typeface="Consolas" panose="020B0609020204030204" pitchFamily="49" charset="0"/>
+              </a:rPr>
+              <a:t>Volkov</a:t>
+            </a:r>
+            <a:r>
+              <a:rPr lang="en-US" sz="2800" dirty="0" smtClean="0">
+                <a:solidFill>
+                  <a:schemeClr val="accent1">
+                    <a:lumMod val="75000"/>
+                  </a:schemeClr>
+                </a:solidFill>
+                <a:latin typeface="Consolas" panose="020B0609020204030204" pitchFamily="49" charset="0"/>
+                <a:cs typeface="Consolas" panose="020B0609020204030204" pitchFamily="49" charset="0"/>
+              </a:rPr>
+              <a:t>“’</a:t>
+            </a:r>
+          </a:p>
+          <a:p>
+            <a:pPr lvl="1"/>
+            <a:endParaRPr lang="en-US" sz="3200" dirty="0">
+              <a:cs typeface="Consolas" panose="020B0609020204030204" pitchFamily="49" charset="0"/>
+            </a:endParaRPr>
+          </a:p>
+          <a:p>
+            <a:pPr marL="285750" indent="-285750">
+              <a:buFont typeface="Arial" panose="020B0604020202020204" pitchFamily="34" charset="0"/>
+              <a:buChar char="•"/>
+            </a:pPr>
+            <a:r>
+              <a:rPr lang="en-US" sz="3200" dirty="0" smtClean="0">
+                <a:cs typeface="Consolas" panose="020B0609020204030204" pitchFamily="49" charset="0"/>
+              </a:rPr>
+              <a:t>Rewrite </a:t>
+            </a:r>
+            <a:r>
+              <a:rPr lang="en-US" sz="3200" dirty="0">
+                <a:cs typeface="Consolas" panose="020B0609020204030204" pitchFamily="49" charset="0"/>
+              </a:rPr>
+              <a:t>all commits in a branch</a:t>
+            </a:r>
+          </a:p>
+          <a:p>
+            <a:pPr lvl="1"/>
+            <a:r>
+              <a:rPr lang="en-US" sz="3200" dirty="0">
+                <a:cs typeface="Consolas" panose="020B0609020204030204" pitchFamily="49" charset="0"/>
+              </a:rPr>
+              <a:t>	</a:t>
+            </a:r>
+            <a:r>
+              <a:rPr lang="en-US" sz="2800" dirty="0" err="1">
+                <a:solidFill>
+                  <a:schemeClr val="accent1">
+                    <a:lumMod val="75000"/>
+                  </a:schemeClr>
+                </a:solidFill>
+                <a:latin typeface="Consolas" panose="020B0609020204030204" pitchFamily="49" charset="0"/>
+                <a:cs typeface="Consolas" panose="020B0609020204030204" pitchFamily="49" charset="0"/>
+              </a:rPr>
+              <a:t>git</a:t>
+            </a:r>
+            <a:r>
+              <a:rPr lang="en-US" sz="2800" dirty="0">
+                <a:solidFill>
+                  <a:schemeClr val="accent1">
+                    <a:lumMod val="75000"/>
+                  </a:schemeClr>
+                </a:solidFill>
+                <a:latin typeface="Consolas" panose="020B0609020204030204" pitchFamily="49" charset="0"/>
+                <a:cs typeface="Consolas" panose="020B0609020204030204" pitchFamily="49" charset="0"/>
+              </a:rPr>
+              <a:t> filter-branch &lt;operation&gt;</a:t>
+            </a:r>
+          </a:p>
+          <a:p>
+            <a:pPr lvl="1"/>
+            <a:endParaRPr lang="en-US" sz="2800" dirty="0">
+              <a:solidFill>
+                <a:schemeClr val="accent1">
+                  <a:lumMod val="75000"/>
+                </a:schemeClr>
+              </a:solidFill>
+              <a:latin typeface="Consolas" panose="020B0609020204030204" pitchFamily="49" charset="0"/>
+              <a:cs typeface="Consolas" panose="020B0609020204030204" pitchFamily="49" charset="0"/>
+            </a:endParaRPr>
+          </a:p>
+          <a:p>
+            <a:pPr lvl="1"/>
+            <a:endParaRPr lang="en-US" sz="2800" dirty="0">
+              <a:solidFill>
+                <a:schemeClr val="accent1">
+                  <a:lumMod val="75000"/>
+                </a:schemeClr>
+              </a:solidFill>
+              <a:latin typeface="Consolas" panose="020B0609020204030204" pitchFamily="49" charset="0"/>
+              <a:cs typeface="Consolas" panose="020B0609020204030204" pitchFamily="49" charset="0"/>
+            </a:endParaRPr>
+          </a:p>
+          <a:p>
+            <a:endParaRPr lang="en-US" sz="3200" dirty="0">
+              <a:cs typeface="Consolas" panose="020B0609020204030204" pitchFamily="49" charset="0"/>
+            </a:endParaRPr>
+          </a:p>
+        </p:txBody>
+      </p:sp>
+    </p:spTree>
+    <p:extLst>
+      <p:ext uri="{BB962C8B-B14F-4D97-AF65-F5344CB8AC3E}">
+        <p14:creationId xmlns:p14="http://schemas.microsoft.com/office/powerpoint/2010/main" val="4172263649"/>
+      </p:ext>
+    </p:extLst>
+  </p:cSld>
+  <p:clrMapOvr>
+    <a:masterClrMapping/>
+  </p:clrMapOvr>
+</p:sld>
+</file>
+
 <file path=ppt/slides/slide4.xml><?xml version="1.0" encoding="utf-8"?>
 <p:sld xmlns:a="http://schemas.openxmlformats.org/drawingml/2006/main" xmlns:r="http://schemas.openxmlformats.org/officeDocument/2006/relationships" xmlns:p="http://schemas.openxmlformats.org/presentationml/2006/main">
   <p:cSld>

</xml_diff>

<commit_message>
Extra notes about creating and deleting remote branches
</commit_message>
<xml_diff>
--- a/git101.pptx
+++ b/git101.pptx
@@ -48,18 +48,17 @@
     <p:sldId id="295" r:id="rId42"/>
     <p:sldId id="278" r:id="rId43"/>
     <p:sldId id="279" r:id="rId44"/>
-    <p:sldId id="292" r:id="rId45"/>
+    <p:sldId id="313" r:id="rId45"/>
     <p:sldId id="280" r:id="rId46"/>
     <p:sldId id="281" r:id="rId47"/>
     <p:sldId id="283" r:id="rId48"/>
     <p:sldId id="282" r:id="rId49"/>
-    <p:sldId id="299" r:id="rId50"/>
+    <p:sldId id="292" r:id="rId50"/>
     <p:sldId id="287" r:id="rId51"/>
-    <p:sldId id="288" r:id="rId52"/>
-    <p:sldId id="289" r:id="rId53"/>
-    <p:sldId id="286" r:id="rId54"/>
-    <p:sldId id="290" r:id="rId55"/>
-    <p:sldId id="291" r:id="rId56"/>
+    <p:sldId id="289" r:id="rId52"/>
+    <p:sldId id="286" r:id="rId53"/>
+    <p:sldId id="290" r:id="rId54"/>
+    <p:sldId id="291" r:id="rId55"/>
   </p:sldIdLst>
   <p:sldSz cx="12192000" cy="6858000"/>
   <p:notesSz cx="6858000" cy="9144000"/>
@@ -6200,7 +6199,7 @@
         <p:spPr>
           <a:xfrm>
             <a:off x="481449" y="1857375"/>
-            <a:ext cx="9470862" cy="3046988"/>
+            <a:ext cx="9470862" cy="3539430"/>
           </a:xfrm>
           <a:prstGeom prst="rect">
             <a:avLst/>
@@ -6324,6 +6323,11 @@
                 </a:schemeClr>
               </a:solidFill>
               <a:latin typeface="Consolas" panose="020B0609020204030204" pitchFamily="49" charset="0"/>
+              <a:cs typeface="Consolas" panose="020B0609020204030204" pitchFamily="49" charset="0"/>
+            </a:endParaRPr>
+          </a:p>
+          <a:p>
+            <a:endParaRPr lang="en-US" sz="3200" dirty="0" smtClean="0">
               <a:cs typeface="Consolas" panose="020B0609020204030204" pitchFamily="49" charset="0"/>
             </a:endParaRPr>
           </a:p>
@@ -9290,23 +9294,8 @@
               <a:rPr lang="en-US" sz="3200" dirty="0" smtClean="0">
                 <a:cs typeface="Consolas" panose="020B0609020204030204" pitchFamily="49" charset="0"/>
               </a:rPr>
-              <a:t>All </a:t>
-            </a:r>
-            <a:r>
-              <a:rPr lang="en-US" sz="3200" dirty="0" smtClean="0">
-                <a:cs typeface="Consolas" panose="020B0609020204030204" pitchFamily="49" charset="0"/>
-              </a:rPr>
-              <a:t>commits from the source branch appear on </a:t>
-            </a:r>
-            <a:r>
-              <a:rPr lang="en-US" sz="3200" dirty="0" smtClean="0">
-                <a:cs typeface="Consolas" panose="020B0609020204030204" pitchFamily="49" charset="0"/>
-              </a:rPr>
-              <a:t>the target!</a:t>
-            </a:r>
-            <a:endParaRPr lang="en-US" sz="3200" dirty="0" smtClean="0">
-              <a:cs typeface="Consolas" panose="020B0609020204030204" pitchFamily="49" charset="0"/>
-            </a:endParaRPr>
+              <a:t>All commits from the source branch appear on the target!</a:t>
+            </a:r>
           </a:p>
           <a:p>
             <a:r>
@@ -9343,19 +9332,7 @@
                 <a:latin typeface="Consolas" panose="020B0609020204030204" pitchFamily="49" charset="0"/>
                 <a:cs typeface="Consolas" panose="020B0609020204030204" pitchFamily="49" charset="0"/>
               </a:rPr>
-              <a:t> </a:t>
-            </a:r>
-            <a:r>
-              <a:rPr lang="en-US" sz="3200" dirty="0" smtClean="0">
-                <a:solidFill>
-                  <a:schemeClr val="accent1">
-                    <a:lumMod val="75000"/>
-                  </a:schemeClr>
-                </a:solidFill>
-                <a:latin typeface="Consolas" panose="020B0609020204030204" pitchFamily="49" charset="0"/>
-                <a:cs typeface="Consolas" panose="020B0609020204030204" pitchFamily="49" charset="0"/>
-              </a:rPr>
-              <a:t>log</a:t>
+              <a:t> log</a:t>
             </a:r>
           </a:p>
           <a:p>
@@ -10203,11 +10180,7 @@
                     <a:p>
                       <a:r>
                         <a:rPr lang="en-US" dirty="0" smtClean="0"/>
-                        <a:t>b6b7ca1c</a:t>
-                      </a:r>
-                      <a:r>
-                        <a:rPr lang="en-US" dirty="0" smtClean="0"/>
-                        <a:t>…</a:t>
+                        <a:t>b6b7ca1c…</a:t>
                       </a:r>
                       <a:endParaRPr lang="en-US" dirty="0"/>
                     </a:p>
@@ -11289,11 +11262,7 @@
                     <a:p>
                       <a:r>
                         <a:rPr lang="en-US" dirty="0" smtClean="0"/>
-                        <a:t>b6b7ca1c</a:t>
-                      </a:r>
-                      <a:r>
-                        <a:rPr lang="en-US" dirty="0" smtClean="0"/>
-                        <a:t>…</a:t>
+                        <a:t>b6b7ca1c…</a:t>
                       </a:r>
                       <a:endParaRPr lang="en-US" dirty="0"/>
                     </a:p>
@@ -11796,13 +11765,7 @@
               <a:rPr lang="en-US" sz="3200" dirty="0" smtClean="0">
                 <a:cs typeface="Consolas" panose="020B0609020204030204" pitchFamily="49" charset="0"/>
               </a:rPr>
-              <a:t>Any subsequent commit lists the previous one as a </a:t>
-            </a:r>
-            <a:r>
-              <a:rPr lang="en-US" sz="3200" dirty="0" smtClean="0">
-                <a:cs typeface="Consolas" panose="020B0609020204030204" pitchFamily="49" charset="0"/>
-              </a:rPr>
-              <a:t>parent</a:t>
+              <a:t>Any subsequent commit lists the previous one as a parent</a:t>
             </a:r>
             <a:endParaRPr lang="en-US" sz="3200" dirty="0">
               <a:latin typeface="Consolas" panose="020B0609020204030204" pitchFamily="49" charset="0"/>
@@ -22014,7 +21977,7 @@
         <p:spPr>
           <a:xfrm>
             <a:off x="5484217" y="6120063"/>
-            <a:ext cx="1849609" cy="369332"/>
+            <a:ext cx="1924951" cy="369332"/>
           </a:xfrm>
           <a:prstGeom prst="rect">
             <a:avLst/>
@@ -22029,7 +21992,11 @@
           <a:p>
             <a:r>
               <a:rPr lang="en-US" dirty="0" smtClean="0"/>
-              <a:t>no merge commit</a:t>
+              <a:t>no merge </a:t>
+            </a:r>
+            <a:r>
+              <a:rPr lang="en-US" dirty="0" smtClean="0"/>
+              <a:t>commit!</a:t>
             </a:r>
             <a:endParaRPr lang="en-US" dirty="0"/>
           </a:p>
@@ -24190,7 +24157,7 @@
         <p:spPr>
           <a:xfrm>
             <a:off x="481449" y="1485158"/>
-            <a:ext cx="10375341" cy="1508105"/>
+            <a:ext cx="10544746" cy="4647426"/>
           </a:xfrm>
           <a:prstGeom prst="rect">
             <a:avLst/>
@@ -24213,7 +24180,19 @@
               <a:rPr lang="en-US" sz="2800" dirty="0" smtClean="0">
                 <a:cs typeface="Consolas" panose="020B0609020204030204" pitchFamily="49" charset="0"/>
               </a:rPr>
-              <a:t>when feature branch is merged into master and no longer needed</a:t>
+              <a:t>when </a:t>
+            </a:r>
+            <a:r>
+              <a:rPr lang="en-US" sz="2800" dirty="0" smtClean="0">
+                <a:cs typeface="Consolas" panose="020B0609020204030204" pitchFamily="49" charset="0"/>
+              </a:rPr>
+              <a:t>a feature </a:t>
+            </a:r>
+            <a:r>
+              <a:rPr lang="en-US" sz="2800" dirty="0" smtClean="0">
+                <a:cs typeface="Consolas" panose="020B0609020204030204" pitchFamily="49" charset="0"/>
+              </a:rPr>
+              <a:t>branch is merged into master and no longer needed</a:t>
             </a:r>
             <a:endParaRPr lang="en-US" sz="2800" dirty="0">
               <a:cs typeface="Consolas" panose="020B0609020204030204" pitchFamily="49" charset="0"/>
@@ -24265,10 +24244,89 @@
                 <a:latin typeface="Consolas" panose="020B0609020204030204" pitchFamily="49" charset="0"/>
                 <a:cs typeface="Consolas" panose="020B0609020204030204" pitchFamily="49" charset="0"/>
               </a:rPr>
-              <a:t> branch -d &lt;branch name&gt;</a:t>
-            </a:r>
-            <a:endParaRPr lang="en-US" sz="2000" dirty="0" smtClean="0">
-              <a:latin typeface="Cambria" panose="02040503050406030204" pitchFamily="18" charset="0"/>
+              <a:t> branch -d &lt;branch name</a:t>
+            </a:r>
+            <a:r>
+              <a:rPr lang="en-US" sz="3200" dirty="0" smtClean="0">
+                <a:solidFill>
+                  <a:schemeClr val="accent1">
+                    <a:lumMod val="75000"/>
+                  </a:schemeClr>
+                </a:solidFill>
+                <a:latin typeface="Consolas" panose="020B0609020204030204" pitchFamily="49" charset="0"/>
+                <a:cs typeface="Consolas" panose="020B0609020204030204" pitchFamily="49" charset="0"/>
+              </a:rPr>
+              <a:t>&gt;</a:t>
+            </a:r>
+          </a:p>
+          <a:p>
+            <a:endParaRPr lang="en-US" sz="3200" dirty="0">
+              <a:solidFill>
+                <a:schemeClr val="accent1">
+                  <a:lumMod val="75000"/>
+                </a:schemeClr>
+              </a:solidFill>
+              <a:latin typeface="Consolas" panose="020B0609020204030204" pitchFamily="49" charset="0"/>
+              <a:cs typeface="Consolas" panose="020B0609020204030204" pitchFamily="49" charset="0"/>
+            </a:endParaRPr>
+          </a:p>
+          <a:p>
+            <a:endParaRPr lang="en-US" sz="3200" dirty="0" smtClean="0">
+              <a:solidFill>
+                <a:schemeClr val="accent1">
+                  <a:lumMod val="75000"/>
+                </a:schemeClr>
+              </a:solidFill>
+              <a:latin typeface="Consolas" panose="020B0609020204030204" pitchFamily="49" charset="0"/>
+              <a:cs typeface="Consolas" panose="020B0609020204030204" pitchFamily="49" charset="0"/>
+            </a:endParaRPr>
+          </a:p>
+          <a:p>
+            <a:r>
+              <a:rPr lang="en-US" sz="2800" dirty="0">
+                <a:cs typeface="Consolas" panose="020B0609020204030204" pitchFamily="49" charset="0"/>
+              </a:rPr>
+              <a:t>If the deleted branch </a:t>
+            </a:r>
+            <a:r>
+              <a:rPr lang="en-US" sz="2800" dirty="0" smtClean="0">
+                <a:cs typeface="Consolas" panose="020B0609020204030204" pitchFamily="49" charset="0"/>
+              </a:rPr>
+              <a:t>has been merged into another,</a:t>
+            </a:r>
+            <a:endParaRPr lang="en-US" sz="2800" dirty="0">
+              <a:cs typeface="Consolas" panose="020B0609020204030204" pitchFamily="49" charset="0"/>
+            </a:endParaRPr>
+          </a:p>
+          <a:p>
+            <a:r>
+              <a:rPr lang="en-US" sz="2800" dirty="0" smtClean="0">
+                <a:cs typeface="Consolas" panose="020B0609020204030204" pitchFamily="49" charset="0"/>
+              </a:rPr>
+              <a:t>commits are not deleted</a:t>
+            </a:r>
+          </a:p>
+          <a:p>
+            <a:endParaRPr lang="en-US" sz="2800" dirty="0">
+              <a:cs typeface="Consolas" panose="020B0609020204030204" pitchFamily="49" charset="0"/>
+            </a:endParaRPr>
+          </a:p>
+          <a:p>
+            <a:r>
+              <a:rPr lang="en-US" sz="2800" dirty="0" smtClean="0">
+                <a:cs typeface="Consolas" panose="020B0609020204030204" pitchFamily="49" charset="0"/>
+              </a:rPr>
+              <a:t>Only commits that are not referenced by any branch</a:t>
+            </a:r>
+          </a:p>
+          <a:p>
+            <a:r>
+              <a:rPr lang="en-US" sz="2800" dirty="0" smtClean="0">
+                <a:cs typeface="Consolas" panose="020B0609020204030204" pitchFamily="49" charset="0"/>
+              </a:rPr>
+              <a:t>will be deleted eventually</a:t>
+            </a:r>
+            <a:endParaRPr lang="en-US" sz="2800" dirty="0">
               <a:cs typeface="Consolas" panose="020B0609020204030204" pitchFamily="49" charset="0"/>
             </a:endParaRPr>
           </a:p>
@@ -24297,7 +24355,7 @@
         </p:blipFill>
         <p:spPr bwMode="auto">
           <a:xfrm>
-            <a:off x="8433301" y="2703011"/>
+            <a:off x="8569659" y="2751138"/>
             <a:ext cx="3286125" cy="3171826"/>
           </a:xfrm>
           <a:prstGeom prst="rect">
@@ -24384,7 +24442,7 @@
         <p:spPr>
           <a:xfrm>
             <a:off x="481449" y="865694"/>
-            <a:ext cx="9018816" cy="5509200"/>
+            <a:ext cx="8008924" cy="6309420"/>
           </a:xfrm>
           <a:prstGeom prst="rect">
             <a:avLst/>
@@ -24419,19 +24477,19 @@
               <a:buChar char="•"/>
             </a:pPr>
             <a:r>
-              <a:rPr lang="en-US" sz="3200" dirty="0" smtClean="0">
+              <a:rPr lang="en-US" sz="2800" dirty="0" smtClean="0">
                 <a:cs typeface="Consolas" panose="020B0609020204030204" pitchFamily="49" charset="0"/>
               </a:rPr>
               <a:t>Clone </a:t>
             </a:r>
             <a:r>
-              <a:rPr lang="en-US" sz="3200" dirty="0">
+              <a:rPr lang="en-US" sz="2800" dirty="0">
                 <a:cs typeface="Consolas" panose="020B0609020204030204" pitchFamily="49" charset="0"/>
               </a:rPr>
               <a:t>existing </a:t>
             </a:r>
             <a:r>
-              <a:rPr lang="en-US" sz="3200" dirty="0" smtClean="0">
+              <a:rPr lang="en-US" sz="2800" dirty="0" smtClean="0">
                 <a:cs typeface="Consolas" panose="020B0609020204030204" pitchFamily="49" charset="0"/>
               </a:rPr>
               <a:t>repository</a:t>
@@ -24440,13 +24498,13 @@
           <a:p>
             <a:pPr lvl="1"/>
             <a:r>
-              <a:rPr lang="en-US" sz="3200" dirty="0" smtClean="0">
+              <a:rPr lang="en-US" sz="2800" dirty="0" smtClean="0">
                 <a:cs typeface="Consolas" panose="020B0609020204030204" pitchFamily="49" charset="0"/>
               </a:rPr>
               <a:t>	</a:t>
             </a:r>
             <a:r>
-              <a:rPr lang="en-US" sz="3200" dirty="0" err="1">
+              <a:rPr lang="en-US" sz="2800" dirty="0" err="1">
                 <a:solidFill>
                   <a:schemeClr val="accent1">
                     <a:lumMod val="75000"/>
@@ -24458,7 +24516,7 @@
               <a:t>git</a:t>
             </a:r>
             <a:r>
-              <a:rPr lang="en-US" sz="3200" dirty="0">
+              <a:rPr lang="en-US" sz="2800" dirty="0">
                 <a:solidFill>
                   <a:schemeClr val="accent1">
                     <a:lumMod val="75000"/>
@@ -24470,7 +24528,7 @@
               <a:t> clone &lt;repo</a:t>
             </a:r>
             <a:r>
-              <a:rPr lang="en-US" sz="3200" dirty="0" smtClean="0">
+              <a:rPr lang="en-US" sz="2800" dirty="0" smtClean="0">
                 <a:solidFill>
                   <a:schemeClr val="accent1">
                     <a:lumMod val="75000"/>
@@ -24483,167 +24541,8 @@
             </a:r>
           </a:p>
           <a:p>
-            <a:pPr marL="457200" indent="-457200">
-              <a:buFont typeface="Arial" panose="020B0604020202020204" pitchFamily="34" charset="0"/>
-              <a:buChar char="•"/>
-            </a:pPr>
-            <a:r>
-              <a:rPr lang="en-US" sz="3200" dirty="0" smtClean="0">
-                <a:cs typeface="Consolas" panose="020B0609020204030204" pitchFamily="49" charset="0"/>
-              </a:rPr>
-              <a:t>Work locally</a:t>
-            </a:r>
-          </a:p>
-          <a:p>
             <a:pPr lvl="1"/>
-            <a:r>
-              <a:rPr lang="en-US" sz="3200" dirty="0" smtClean="0">
-                <a:cs typeface="Consolas" panose="020B0609020204030204" pitchFamily="49" charset="0"/>
-              </a:rPr>
-              <a:t>	</a:t>
-            </a:r>
-            <a:r>
-              <a:rPr lang="en-US" sz="3200" dirty="0">
-                <a:solidFill>
-                  <a:schemeClr val="accent1">
-                    <a:lumMod val="75000"/>
-                  </a:schemeClr>
-                </a:solidFill>
-                <a:latin typeface="Consolas" panose="020B0609020204030204" pitchFamily="49" charset="0"/>
-                <a:cs typeface="Consolas" panose="020B0609020204030204" pitchFamily="49" charset="0"/>
-              </a:rPr>
-              <a:t>edit </a:t>
-            </a:r>
-            <a:r>
-              <a:rPr lang="en-US" sz="3200" dirty="0" smtClean="0">
-                <a:solidFill>
-                  <a:schemeClr val="accent1">
-                    <a:lumMod val="75000"/>
-                  </a:schemeClr>
-                </a:solidFill>
-                <a:latin typeface="Consolas" panose="020B0609020204030204" pitchFamily="49" charset="0"/>
-                <a:cs typeface="Consolas" panose="020B0609020204030204" pitchFamily="49" charset="0"/>
-              </a:rPr>
-              <a:t>files / </a:t>
-            </a:r>
-            <a:r>
-              <a:rPr lang="en-US" sz="3200" dirty="0" err="1">
-                <a:solidFill>
-                  <a:schemeClr val="accent1">
-                    <a:lumMod val="75000"/>
-                  </a:schemeClr>
-                </a:solidFill>
-                <a:latin typeface="Consolas" panose="020B0609020204030204" pitchFamily="49" charset="0"/>
-                <a:cs typeface="Consolas" panose="020B0609020204030204" pitchFamily="49" charset="0"/>
-              </a:rPr>
-              <a:t>git</a:t>
-            </a:r>
-            <a:r>
-              <a:rPr lang="en-US" sz="3200" dirty="0">
-                <a:solidFill>
-                  <a:schemeClr val="accent1">
-                    <a:lumMod val="75000"/>
-                  </a:schemeClr>
-                </a:solidFill>
-                <a:latin typeface="Consolas" panose="020B0609020204030204" pitchFamily="49" charset="0"/>
-                <a:cs typeface="Consolas" panose="020B0609020204030204" pitchFamily="49" charset="0"/>
-              </a:rPr>
-              <a:t> add . / </a:t>
-            </a:r>
-            <a:r>
-              <a:rPr lang="en-US" sz="3200" dirty="0" err="1">
-                <a:solidFill>
-                  <a:schemeClr val="accent1">
-                    <a:lumMod val="75000"/>
-                  </a:schemeClr>
-                </a:solidFill>
-                <a:latin typeface="Consolas" panose="020B0609020204030204" pitchFamily="49" charset="0"/>
-                <a:cs typeface="Consolas" panose="020B0609020204030204" pitchFamily="49" charset="0"/>
-              </a:rPr>
-              <a:t>git</a:t>
-            </a:r>
-            <a:r>
-              <a:rPr lang="en-US" sz="3200" dirty="0">
-                <a:solidFill>
-                  <a:schemeClr val="accent1">
-                    <a:lumMod val="75000"/>
-                  </a:schemeClr>
-                </a:solidFill>
-                <a:latin typeface="Consolas" panose="020B0609020204030204" pitchFamily="49" charset="0"/>
-                <a:cs typeface="Consolas" panose="020B0609020204030204" pitchFamily="49" charset="0"/>
-              </a:rPr>
-              <a:t> </a:t>
-            </a:r>
-            <a:r>
-              <a:rPr lang="en-US" sz="3200" dirty="0" smtClean="0">
-                <a:solidFill>
-                  <a:schemeClr val="accent1">
-                    <a:lumMod val="75000"/>
-                  </a:schemeClr>
-                </a:solidFill>
-                <a:latin typeface="Consolas" panose="020B0609020204030204" pitchFamily="49" charset="0"/>
-                <a:cs typeface="Consolas" panose="020B0609020204030204" pitchFamily="49" charset="0"/>
-              </a:rPr>
-              <a:t>commit</a:t>
-            </a:r>
-          </a:p>
-          <a:p>
-            <a:pPr marL="457200" indent="-457200">
-              <a:buFont typeface="Arial" panose="020B0604020202020204" pitchFamily="34" charset="0"/>
-              <a:buChar char="•"/>
-            </a:pPr>
-            <a:r>
-              <a:rPr lang="en-US" sz="3200" dirty="0" smtClean="0">
-                <a:cs typeface="Consolas" panose="020B0609020204030204" pitchFamily="49" charset="0"/>
-              </a:rPr>
-              <a:t>Take changes from the remote repository</a:t>
-            </a:r>
-          </a:p>
-          <a:p>
-            <a:pPr lvl="1"/>
-            <a:r>
-              <a:rPr lang="en-US" sz="3200" dirty="0" smtClean="0">
-                <a:cs typeface="Consolas" panose="020B0609020204030204" pitchFamily="49" charset="0"/>
-              </a:rPr>
-              <a:t>	</a:t>
-            </a:r>
-            <a:r>
-              <a:rPr lang="en-US" sz="3200" dirty="0" err="1">
-                <a:solidFill>
-                  <a:schemeClr val="accent1">
-                    <a:lumMod val="75000"/>
-                  </a:schemeClr>
-                </a:solidFill>
-                <a:latin typeface="Consolas" panose="020B0609020204030204" pitchFamily="49" charset="0"/>
-                <a:cs typeface="Consolas" panose="020B0609020204030204" pitchFamily="49" charset="0"/>
-              </a:rPr>
-              <a:t>git</a:t>
-            </a:r>
-            <a:r>
-              <a:rPr lang="en-US" sz="3200" dirty="0">
-                <a:solidFill>
-                  <a:schemeClr val="accent1">
-                    <a:lumMod val="75000"/>
-                  </a:schemeClr>
-                </a:solidFill>
-                <a:latin typeface="Consolas" panose="020B0609020204030204" pitchFamily="49" charset="0"/>
-                <a:cs typeface="Consolas" panose="020B0609020204030204" pitchFamily="49" charset="0"/>
-              </a:rPr>
-              <a:t> </a:t>
-            </a:r>
-            <a:r>
-              <a:rPr lang="en-US" sz="3200" dirty="0" smtClean="0">
-                <a:solidFill>
-                  <a:schemeClr val="accent1">
-                    <a:lumMod val="75000"/>
-                  </a:schemeClr>
-                </a:solidFill>
-                <a:latin typeface="Consolas" panose="020B0609020204030204" pitchFamily="49" charset="0"/>
-                <a:cs typeface="Consolas" panose="020B0609020204030204" pitchFamily="49" charset="0"/>
-              </a:rPr>
-              <a:t>pull</a:t>
-            </a:r>
-            <a:endParaRPr lang="en-US" sz="3200" dirty="0">
+            <a:endParaRPr lang="en-US" sz="2800" dirty="0" smtClean="0">
               <a:solidFill>
                 <a:schemeClr val="accent1">
                   <a:lumMod val="75000"/>
@@ -24659,22 +24558,22 @@
               <a:buChar char="•"/>
             </a:pPr>
             <a:r>
-              <a:rPr lang="en-US" sz="3200" dirty="0" smtClean="0">
-                <a:cs typeface="Consolas" panose="020B0609020204030204" pitchFamily="49" charset="0"/>
-              </a:rPr>
-              <a:t>Submit your changes to the external repository</a:t>
+              <a:rPr lang="en-US" sz="2800" dirty="0" smtClean="0">
+                <a:cs typeface="Consolas" panose="020B0609020204030204" pitchFamily="49" charset="0"/>
+              </a:rPr>
+              <a:t>Work locally</a:t>
             </a:r>
           </a:p>
           <a:p>
             <a:pPr lvl="1"/>
             <a:r>
-              <a:rPr lang="en-US" sz="3200" dirty="0" smtClean="0">
+              <a:rPr lang="en-US" sz="2800" dirty="0" smtClean="0">
                 <a:cs typeface="Consolas" panose="020B0609020204030204" pitchFamily="49" charset="0"/>
               </a:rPr>
               <a:t>	</a:t>
             </a:r>
             <a:r>
-              <a:rPr lang="en-US" sz="3200" dirty="0" err="1">
+              <a:rPr lang="en-US" sz="2800" dirty="0">
                 <a:solidFill>
                   <a:schemeClr val="accent1">
                     <a:lumMod val="75000"/>
@@ -24683,10 +24582,10 @@
                 <a:latin typeface="Consolas" panose="020B0609020204030204" pitchFamily="49" charset="0"/>
                 <a:cs typeface="Consolas" panose="020B0609020204030204" pitchFamily="49" charset="0"/>
               </a:rPr>
-              <a:t>git</a:t>
-            </a:r>
-            <a:r>
-              <a:rPr lang="en-US" sz="3200" dirty="0">
+              <a:t>edit </a:t>
+            </a:r>
+            <a:r>
+              <a:rPr lang="en-US" sz="2800" dirty="0" smtClean="0">
                 <a:solidFill>
                   <a:schemeClr val="accent1">
                     <a:lumMod val="75000"/>
@@ -24695,6 +24594,192 @@
                 <a:latin typeface="Consolas" panose="020B0609020204030204" pitchFamily="49" charset="0"/>
                 <a:cs typeface="Consolas" panose="020B0609020204030204" pitchFamily="49" charset="0"/>
               </a:rPr>
+              <a:t>files / </a:t>
+            </a:r>
+            <a:r>
+              <a:rPr lang="en-US" sz="2800" dirty="0" err="1">
+                <a:solidFill>
+                  <a:schemeClr val="accent1">
+                    <a:lumMod val="75000"/>
+                  </a:schemeClr>
+                </a:solidFill>
+                <a:latin typeface="Consolas" panose="020B0609020204030204" pitchFamily="49" charset="0"/>
+                <a:cs typeface="Consolas" panose="020B0609020204030204" pitchFamily="49" charset="0"/>
+              </a:rPr>
+              <a:t>git</a:t>
+            </a:r>
+            <a:r>
+              <a:rPr lang="en-US" sz="2800" dirty="0">
+                <a:solidFill>
+                  <a:schemeClr val="accent1">
+                    <a:lumMod val="75000"/>
+                  </a:schemeClr>
+                </a:solidFill>
+                <a:latin typeface="Consolas" panose="020B0609020204030204" pitchFamily="49" charset="0"/>
+                <a:cs typeface="Consolas" panose="020B0609020204030204" pitchFamily="49" charset="0"/>
+              </a:rPr>
+              <a:t> add . / </a:t>
+            </a:r>
+            <a:r>
+              <a:rPr lang="en-US" sz="2800" dirty="0" err="1">
+                <a:solidFill>
+                  <a:schemeClr val="accent1">
+                    <a:lumMod val="75000"/>
+                  </a:schemeClr>
+                </a:solidFill>
+                <a:latin typeface="Consolas" panose="020B0609020204030204" pitchFamily="49" charset="0"/>
+                <a:cs typeface="Consolas" panose="020B0609020204030204" pitchFamily="49" charset="0"/>
+              </a:rPr>
+              <a:t>git</a:t>
+            </a:r>
+            <a:r>
+              <a:rPr lang="en-US" sz="2800" dirty="0">
+                <a:solidFill>
+                  <a:schemeClr val="accent1">
+                    <a:lumMod val="75000"/>
+                  </a:schemeClr>
+                </a:solidFill>
+                <a:latin typeface="Consolas" panose="020B0609020204030204" pitchFamily="49" charset="0"/>
+                <a:cs typeface="Consolas" panose="020B0609020204030204" pitchFamily="49" charset="0"/>
+              </a:rPr>
+              <a:t> </a:t>
+            </a:r>
+            <a:r>
+              <a:rPr lang="en-US" sz="2800" dirty="0" smtClean="0">
+                <a:solidFill>
+                  <a:schemeClr val="accent1">
+                    <a:lumMod val="75000"/>
+                  </a:schemeClr>
+                </a:solidFill>
+                <a:latin typeface="Consolas" panose="020B0609020204030204" pitchFamily="49" charset="0"/>
+                <a:cs typeface="Consolas" panose="020B0609020204030204" pitchFamily="49" charset="0"/>
+              </a:rPr>
+              <a:t>commit</a:t>
+            </a:r>
+          </a:p>
+          <a:p>
+            <a:pPr lvl="1"/>
+            <a:endParaRPr lang="en-US" sz="2800" dirty="0" smtClean="0">
+              <a:solidFill>
+                <a:schemeClr val="accent1">
+                  <a:lumMod val="75000"/>
+                </a:schemeClr>
+              </a:solidFill>
+              <a:latin typeface="Consolas" panose="020B0609020204030204" pitchFamily="49" charset="0"/>
+              <a:cs typeface="Consolas" panose="020B0609020204030204" pitchFamily="49" charset="0"/>
+            </a:endParaRPr>
+          </a:p>
+          <a:p>
+            <a:pPr marL="457200" indent="-457200">
+              <a:buFont typeface="Arial" panose="020B0604020202020204" pitchFamily="34" charset="0"/>
+              <a:buChar char="•"/>
+            </a:pPr>
+            <a:r>
+              <a:rPr lang="en-US" sz="2800" dirty="0" smtClean="0">
+                <a:cs typeface="Consolas" panose="020B0609020204030204" pitchFamily="49" charset="0"/>
+              </a:rPr>
+              <a:t>Take changes from the remote repository</a:t>
+            </a:r>
+          </a:p>
+          <a:p>
+            <a:pPr lvl="1"/>
+            <a:r>
+              <a:rPr lang="en-US" sz="2800" dirty="0" smtClean="0">
+                <a:cs typeface="Consolas" panose="020B0609020204030204" pitchFamily="49" charset="0"/>
+              </a:rPr>
+              <a:t>	</a:t>
+            </a:r>
+            <a:r>
+              <a:rPr lang="en-US" sz="2800" dirty="0" err="1">
+                <a:solidFill>
+                  <a:schemeClr val="accent1">
+                    <a:lumMod val="75000"/>
+                  </a:schemeClr>
+                </a:solidFill>
+                <a:latin typeface="Consolas" panose="020B0609020204030204" pitchFamily="49" charset="0"/>
+                <a:cs typeface="Consolas" panose="020B0609020204030204" pitchFamily="49" charset="0"/>
+              </a:rPr>
+              <a:t>git</a:t>
+            </a:r>
+            <a:r>
+              <a:rPr lang="en-US" sz="2800" dirty="0">
+                <a:solidFill>
+                  <a:schemeClr val="accent1">
+                    <a:lumMod val="75000"/>
+                  </a:schemeClr>
+                </a:solidFill>
+                <a:latin typeface="Consolas" panose="020B0609020204030204" pitchFamily="49" charset="0"/>
+                <a:cs typeface="Consolas" panose="020B0609020204030204" pitchFamily="49" charset="0"/>
+              </a:rPr>
+              <a:t> </a:t>
+            </a:r>
+            <a:r>
+              <a:rPr lang="en-US" sz="2800" dirty="0" smtClean="0">
+                <a:solidFill>
+                  <a:schemeClr val="accent1">
+                    <a:lumMod val="75000"/>
+                  </a:schemeClr>
+                </a:solidFill>
+                <a:latin typeface="Consolas" panose="020B0609020204030204" pitchFamily="49" charset="0"/>
+                <a:cs typeface="Consolas" panose="020B0609020204030204" pitchFamily="49" charset="0"/>
+              </a:rPr>
+              <a:t>pull</a:t>
+            </a:r>
+          </a:p>
+          <a:p>
+            <a:pPr lvl="1"/>
+            <a:endParaRPr lang="en-US" sz="2800" dirty="0">
+              <a:solidFill>
+                <a:schemeClr val="accent1">
+                  <a:lumMod val="75000"/>
+                </a:schemeClr>
+              </a:solidFill>
+              <a:latin typeface="Consolas" panose="020B0609020204030204" pitchFamily="49" charset="0"/>
+              <a:cs typeface="Consolas" panose="020B0609020204030204" pitchFamily="49" charset="0"/>
+            </a:endParaRPr>
+          </a:p>
+          <a:p>
+            <a:pPr marL="457200" indent="-457200">
+              <a:buFont typeface="Arial" panose="020B0604020202020204" pitchFamily="34" charset="0"/>
+              <a:buChar char="•"/>
+            </a:pPr>
+            <a:r>
+              <a:rPr lang="en-US" sz="2800" dirty="0" smtClean="0">
+                <a:cs typeface="Consolas" panose="020B0609020204030204" pitchFamily="49" charset="0"/>
+              </a:rPr>
+              <a:t>Submit your changes to the external repository</a:t>
+            </a:r>
+          </a:p>
+          <a:p>
+            <a:pPr lvl="1"/>
+            <a:r>
+              <a:rPr lang="en-US" sz="2800" dirty="0" smtClean="0">
+                <a:cs typeface="Consolas" panose="020B0609020204030204" pitchFamily="49" charset="0"/>
+              </a:rPr>
+              <a:t>	</a:t>
+            </a:r>
+            <a:r>
+              <a:rPr lang="en-US" sz="2800" dirty="0" err="1">
+                <a:solidFill>
+                  <a:schemeClr val="accent1">
+                    <a:lumMod val="75000"/>
+                  </a:schemeClr>
+                </a:solidFill>
+                <a:latin typeface="Consolas" panose="020B0609020204030204" pitchFamily="49" charset="0"/>
+                <a:cs typeface="Consolas" panose="020B0609020204030204" pitchFamily="49" charset="0"/>
+              </a:rPr>
+              <a:t>git</a:t>
+            </a:r>
+            <a:r>
+              <a:rPr lang="en-US" sz="2800" dirty="0">
+                <a:solidFill>
+                  <a:schemeClr val="accent1">
+                    <a:lumMod val="75000"/>
+                  </a:schemeClr>
+                </a:solidFill>
+                <a:latin typeface="Consolas" panose="020B0609020204030204" pitchFamily="49" charset="0"/>
+                <a:cs typeface="Consolas" panose="020B0609020204030204" pitchFamily="49" charset="0"/>
+              </a:rPr>
               <a:t> push</a:t>
             </a:r>
           </a:p>
@@ -24714,8 +24799,8 @@
         </p:nvSpPr>
         <p:spPr>
           <a:xfrm rot="16200000">
-            <a:off x="8817648" y="3775910"/>
-            <a:ext cx="2758741" cy="1190626"/>
+            <a:off x="8263946" y="4433887"/>
+            <a:ext cx="2935705" cy="1190626"/>
           </a:xfrm>
           <a:prstGeom prst="curvedUpArrow">
             <a:avLst>
@@ -25714,7 +25799,7 @@
         <p:spPr>
           <a:xfrm>
             <a:off x="481449" y="865694"/>
-            <a:ext cx="10136301" cy="3046988"/>
+            <a:ext cx="9974782" cy="3477875"/>
           </a:xfrm>
           <a:prstGeom prst="rect">
             <a:avLst/>
@@ -25736,6 +25821,24 @@
             </a:endParaRPr>
           </a:p>
           <a:p>
+            <a:pPr marL="457200" indent="-457200">
+              <a:buFont typeface="Arial" panose="020B0604020202020204" pitchFamily="34" charset="0"/>
+              <a:buChar char="•"/>
+            </a:pPr>
+            <a:endParaRPr lang="en-US" sz="3200" dirty="0">
+              <a:cs typeface="Consolas" panose="020B0609020204030204" pitchFamily="49" charset="0"/>
+            </a:endParaRPr>
+          </a:p>
+          <a:p>
+            <a:pPr marL="457200" indent="-457200">
+              <a:buFont typeface="Arial" panose="020B0604020202020204" pitchFamily="34" charset="0"/>
+              <a:buChar char="•"/>
+            </a:pPr>
+            <a:endParaRPr lang="en-US" sz="3200" dirty="0" smtClean="0">
+              <a:cs typeface="Consolas" panose="020B0609020204030204" pitchFamily="49" charset="0"/>
+            </a:endParaRPr>
+          </a:p>
+          <a:p>
             <a:r>
               <a:rPr lang="en-US" sz="3200" dirty="0">
                 <a:cs typeface="Consolas" panose="020B0609020204030204" pitchFamily="49" charset="0"/>
@@ -25790,7 +25893,19 @@
               <a:rPr lang="en-US" sz="3200" dirty="0">
                 <a:cs typeface="Consolas" panose="020B0609020204030204" pitchFamily="49" charset="0"/>
               </a:rPr>
-              <a:t>therefore, do a </a:t>
+              <a:t>therefore, </a:t>
+            </a:r>
+            <a:r>
+              <a:rPr lang="en-US" sz="3200" dirty="0" smtClean="0">
+                <a:cs typeface="Consolas" panose="020B0609020204030204" pitchFamily="49" charset="0"/>
+              </a:rPr>
+              <a:t>always do </a:t>
+            </a:r>
+            <a:r>
+              <a:rPr lang="en-US" sz="3200" dirty="0">
+                <a:cs typeface="Consolas" panose="020B0609020204030204" pitchFamily="49" charset="0"/>
+              </a:rPr>
+              <a:t>a </a:t>
             </a:r>
             <a:r>
               <a:rPr lang="en-US" sz="2800" dirty="0" err="1">
@@ -25830,40 +25945,27 @@
             </a:r>
           </a:p>
           <a:p>
-            <a:endParaRPr lang="en-US" sz="3200" dirty="0" smtClean="0">
-              <a:cs typeface="Consolas" panose="020B0609020204030204" pitchFamily="49" charset="0"/>
-            </a:endParaRPr>
-          </a:p>
-          <a:p>
-            <a:pPr marL="457200" indent="-457200">
-              <a:buFont typeface="Arial" panose="020B0604020202020204" pitchFamily="34" charset="0"/>
-              <a:buChar char="•"/>
-            </a:pPr>
-            <a:r>
-              <a:rPr lang="en-US" sz="3200" dirty="0" smtClean="0">
-                <a:cs typeface="Consolas" panose="020B0609020204030204" pitchFamily="49" charset="0"/>
-              </a:rPr>
-              <a:t>Create remote branch</a:t>
-            </a:r>
-          </a:p>
-          <a:p>
-            <a:pPr lvl="1"/>
-            <a:r>
-              <a:rPr lang="en-US" sz="3200" dirty="0" smtClean="0">
-                <a:cs typeface="Consolas" panose="020B0609020204030204" pitchFamily="49" charset="0"/>
-              </a:rPr>
-              <a:t>TODO</a:t>
-            </a:r>
             <a:endParaRPr lang="en-US" sz="3200" dirty="0">
               <a:cs typeface="Consolas" panose="020B0609020204030204" pitchFamily="49" charset="0"/>
             </a:endParaRPr>
           </a:p>
+          <a:p>
+            <a:endParaRPr lang="en-US" sz="2800" dirty="0">
+              <a:solidFill>
+                <a:schemeClr val="accent1">
+                  <a:lumMod val="75000"/>
+                </a:schemeClr>
+              </a:solidFill>
+              <a:latin typeface="Consolas" panose="020B0609020204030204" pitchFamily="49" charset="0"/>
+              <a:cs typeface="Consolas" panose="020B0609020204030204" pitchFamily="49" charset="0"/>
+            </a:endParaRPr>
+          </a:p>
         </p:txBody>
       </p:sp>
     </p:spTree>
     <p:extLst>
       <p:ext uri="{BB962C8B-B14F-4D97-AF65-F5344CB8AC3E}">
-        <p14:creationId xmlns:p14="http://schemas.microsoft.com/office/powerpoint/2010/main" val="1963580909"/>
+        <p14:creationId xmlns:p14="http://schemas.microsoft.com/office/powerpoint/2010/main" val="1736408521"/>
       </p:ext>
     </p:extLst>
   </p:cSld>
@@ -27873,7 +27975,7 @@
         <p:spPr>
           <a:xfrm>
             <a:off x="481449" y="288758"/>
-            <a:ext cx="8777018" cy="769441"/>
+            <a:ext cx="8246809" cy="769441"/>
           </a:xfrm>
           <a:prstGeom prst="rect">
             <a:avLst/>
@@ -27888,52 +27990,291 @@
           <a:p>
             <a:r>
               <a:rPr lang="en-US" sz="4400" dirty="0" smtClean="0"/>
-              <a:t>External repositories: under the hood</a:t>
+              <a:t>Connecting to external repositories</a:t>
             </a:r>
             <a:endParaRPr lang="en-US" sz="4400" dirty="0"/>
           </a:p>
         </p:txBody>
       </p:sp>
-      <p:cxnSp>
-        <p:nvCxnSpPr>
-          <p:cNvPr id="25" name="Straight Connector 24"/>
-          <p:cNvCxnSpPr/>
-          <p:nvPr/>
-        </p:nvCxnSpPr>
-        <p:spPr>
-          <a:xfrm>
-            <a:off x="1575632" y="2497978"/>
-            <a:ext cx="22282" cy="1742576"/>
-          </a:xfrm>
-          <a:prstGeom prst="line">
-            <a:avLst/>
-          </a:prstGeom>
-          <a:ln w="57150">
-            <a:solidFill>
-              <a:schemeClr val="bg1"/>
-            </a:solidFill>
-            <a:prstDash val="sysDot"/>
-          </a:ln>
-        </p:spPr>
-        <p:style>
-          <a:lnRef idx="1">
-            <a:schemeClr val="accent1"/>
-          </a:lnRef>
-          <a:fillRef idx="0">
-            <a:schemeClr val="accent1"/>
-          </a:fillRef>
-          <a:effectRef idx="0">
-            <a:schemeClr val="accent1"/>
-          </a:effectRef>
-          <a:fontRef idx="minor">
-            <a:schemeClr val="tx1"/>
-          </a:fontRef>
-        </p:style>
-      </p:cxnSp>
+      <p:sp>
+        <p:nvSpPr>
+          <p:cNvPr id="3" name="TextBox 2"/>
+          <p:cNvSpPr txBox="1"/>
+          <p:nvPr/>
+        </p:nvSpPr>
+        <p:spPr>
+          <a:xfrm>
+            <a:off x="481449" y="865694"/>
+            <a:ext cx="9974782" cy="4955203"/>
+          </a:xfrm>
+          <a:prstGeom prst="rect">
+            <a:avLst/>
+          </a:prstGeom>
+          <a:noFill/>
+        </p:spPr>
+        <p:txBody>
+          <a:bodyPr wrap="none" rtlCol="0">
+            <a:spAutoFit/>
+          </a:bodyPr>
+          <a:lstStyle/>
+          <a:p>
+            <a:pPr marL="457200" indent="-457200">
+              <a:buFont typeface="Arial" panose="020B0604020202020204" pitchFamily="34" charset="0"/>
+              <a:buChar char="•"/>
+            </a:pPr>
+            <a:endParaRPr lang="en-US" sz="3200" dirty="0" smtClean="0">
+              <a:cs typeface="Consolas" panose="020B0609020204030204" pitchFamily="49" charset="0"/>
+            </a:endParaRPr>
+          </a:p>
+          <a:p>
+            <a:r>
+              <a:rPr lang="en-US" sz="3200" dirty="0">
+                <a:cs typeface="Consolas" panose="020B0609020204030204" pitchFamily="49" charset="0"/>
+              </a:rPr>
+              <a:t>Note: </a:t>
+            </a:r>
+            <a:r>
+              <a:rPr lang="en-US" sz="2800" dirty="0" err="1" smtClean="0">
+                <a:solidFill>
+                  <a:schemeClr val="accent1">
+                    <a:lumMod val="75000"/>
+                  </a:schemeClr>
+                </a:solidFill>
+                <a:latin typeface="Consolas" panose="020B0609020204030204" pitchFamily="49" charset="0"/>
+                <a:cs typeface="Consolas" panose="020B0609020204030204" pitchFamily="49" charset="0"/>
+              </a:rPr>
+              <a:t>git</a:t>
+            </a:r>
+            <a:r>
+              <a:rPr lang="en-US" sz="2800" dirty="0" smtClean="0">
+                <a:solidFill>
+                  <a:schemeClr val="accent1">
+                    <a:lumMod val="75000"/>
+                  </a:schemeClr>
+                </a:solidFill>
+                <a:latin typeface="Consolas" panose="020B0609020204030204" pitchFamily="49" charset="0"/>
+                <a:cs typeface="Consolas" panose="020B0609020204030204" pitchFamily="49" charset="0"/>
+              </a:rPr>
+              <a:t> </a:t>
+            </a:r>
+            <a:r>
+              <a:rPr lang="en-US" sz="2800" dirty="0">
+                <a:solidFill>
+                  <a:schemeClr val="accent1">
+                    <a:lumMod val="75000"/>
+                  </a:schemeClr>
+                </a:solidFill>
+                <a:latin typeface="Consolas" panose="020B0609020204030204" pitchFamily="49" charset="0"/>
+                <a:cs typeface="Consolas" panose="020B0609020204030204" pitchFamily="49" charset="0"/>
+              </a:rPr>
+              <a:t>push </a:t>
+            </a:r>
+            <a:r>
+              <a:rPr lang="en-US" sz="3200" dirty="0">
+                <a:cs typeface="Consolas" panose="020B0609020204030204" pitchFamily="49" charset="0"/>
+              </a:rPr>
+              <a:t>should always be a fast-forward operation</a:t>
+            </a:r>
+          </a:p>
+          <a:p>
+            <a:r>
+              <a:rPr lang="en-US" sz="3200" dirty="0">
+                <a:cs typeface="Consolas" panose="020B0609020204030204" pitchFamily="49" charset="0"/>
+              </a:rPr>
+              <a:t>therefore, do a </a:t>
+            </a:r>
+            <a:r>
+              <a:rPr lang="en-US" sz="2800" dirty="0" err="1">
+                <a:solidFill>
+                  <a:schemeClr val="accent1">
+                    <a:lumMod val="75000"/>
+                  </a:schemeClr>
+                </a:solidFill>
+                <a:latin typeface="Consolas" panose="020B0609020204030204" pitchFamily="49" charset="0"/>
+                <a:cs typeface="Consolas" panose="020B0609020204030204" pitchFamily="49" charset="0"/>
+              </a:rPr>
+              <a:t>git</a:t>
+            </a:r>
+            <a:r>
+              <a:rPr lang="en-US" sz="2800" dirty="0">
+                <a:solidFill>
+                  <a:schemeClr val="accent1">
+                    <a:lumMod val="75000"/>
+                  </a:schemeClr>
+                </a:solidFill>
+                <a:latin typeface="Consolas" panose="020B0609020204030204" pitchFamily="49" charset="0"/>
+                <a:cs typeface="Consolas" panose="020B0609020204030204" pitchFamily="49" charset="0"/>
+              </a:rPr>
+              <a:t> pull </a:t>
+            </a:r>
+            <a:r>
+              <a:rPr lang="en-US" sz="3200" dirty="0">
+                <a:cs typeface="Consolas" panose="020B0609020204030204" pitchFamily="49" charset="0"/>
+              </a:rPr>
+              <a:t>before </a:t>
+            </a:r>
+            <a:r>
+              <a:rPr lang="en-US" sz="3200" dirty="0" smtClean="0">
+                <a:cs typeface="Consolas" panose="020B0609020204030204" pitchFamily="49" charset="0"/>
+              </a:rPr>
+              <a:t>pushing</a:t>
+            </a:r>
+          </a:p>
+          <a:p>
+            <a:endParaRPr lang="en-US" sz="3200" dirty="0" smtClean="0">
+              <a:cs typeface="Consolas" panose="020B0609020204030204" pitchFamily="49" charset="0"/>
+            </a:endParaRPr>
+          </a:p>
+          <a:p>
+            <a:pPr marL="457200" indent="-457200">
+              <a:buFont typeface="Arial" panose="020B0604020202020204" pitchFamily="34" charset="0"/>
+              <a:buChar char="•"/>
+            </a:pPr>
+            <a:r>
+              <a:rPr lang="en-US" sz="3200" dirty="0" smtClean="0">
+                <a:cs typeface="Consolas" panose="020B0609020204030204" pitchFamily="49" charset="0"/>
+              </a:rPr>
+              <a:t>Create remote </a:t>
+            </a:r>
+            <a:r>
+              <a:rPr lang="en-US" sz="3200" dirty="0" smtClean="0">
+                <a:cs typeface="Consolas" panose="020B0609020204030204" pitchFamily="49" charset="0"/>
+              </a:rPr>
+              <a:t>branch from a local one</a:t>
+            </a:r>
+          </a:p>
+          <a:p>
+            <a:r>
+              <a:rPr lang="en-US" sz="3200" dirty="0">
+                <a:solidFill>
+                  <a:schemeClr val="accent1">
+                    <a:lumMod val="75000"/>
+                  </a:schemeClr>
+                </a:solidFill>
+                <a:latin typeface="Consolas" panose="020B0609020204030204" pitchFamily="49" charset="0"/>
+                <a:cs typeface="Consolas" panose="020B0609020204030204" pitchFamily="49" charset="0"/>
+              </a:rPr>
+              <a:t>	</a:t>
+            </a:r>
+            <a:r>
+              <a:rPr lang="en-US" sz="3200" dirty="0" err="1">
+                <a:solidFill>
+                  <a:schemeClr val="accent1">
+                    <a:lumMod val="75000"/>
+                  </a:schemeClr>
+                </a:solidFill>
+                <a:latin typeface="Consolas" panose="020B0609020204030204" pitchFamily="49" charset="0"/>
+                <a:cs typeface="Consolas" panose="020B0609020204030204" pitchFamily="49" charset="0"/>
+              </a:rPr>
+              <a:t>git</a:t>
+            </a:r>
+            <a:r>
+              <a:rPr lang="en-US" sz="3200" dirty="0">
+                <a:solidFill>
+                  <a:schemeClr val="accent1">
+                    <a:lumMod val="75000"/>
+                  </a:schemeClr>
+                </a:solidFill>
+                <a:latin typeface="Consolas" panose="020B0609020204030204" pitchFamily="49" charset="0"/>
+                <a:cs typeface="Consolas" panose="020B0609020204030204" pitchFamily="49" charset="0"/>
+              </a:rPr>
+              <a:t> push -u origin &lt;branch name&gt;</a:t>
+            </a:r>
+          </a:p>
+          <a:p>
+            <a:pPr marL="457200" indent="-457200">
+              <a:buFont typeface="Arial" panose="020B0604020202020204" pitchFamily="34" charset="0"/>
+              <a:buChar char="•"/>
+            </a:pPr>
+            <a:endParaRPr lang="en-US" sz="3200" dirty="0" smtClean="0">
+              <a:cs typeface="Consolas" panose="020B0609020204030204" pitchFamily="49" charset="0"/>
+            </a:endParaRPr>
+          </a:p>
+          <a:p>
+            <a:pPr marL="457200" indent="-457200">
+              <a:buFont typeface="Arial" panose="020B0604020202020204" pitchFamily="34" charset="0"/>
+              <a:buChar char="•"/>
+            </a:pPr>
+            <a:r>
+              <a:rPr lang="en-US" sz="3200" dirty="0" smtClean="0">
+                <a:cs typeface="Consolas" panose="020B0609020204030204" pitchFamily="49" charset="0"/>
+              </a:rPr>
+              <a:t>Delete remote branch after local one is deleted</a:t>
+            </a:r>
+            <a:endParaRPr lang="en-US" sz="3200" dirty="0" smtClean="0">
+              <a:cs typeface="Consolas" panose="020B0609020204030204" pitchFamily="49" charset="0"/>
+            </a:endParaRPr>
+          </a:p>
+          <a:p>
+            <a:r>
+              <a:rPr lang="en-US" sz="3200" dirty="0">
+                <a:cs typeface="Consolas" panose="020B0609020204030204" pitchFamily="49" charset="0"/>
+              </a:rPr>
+              <a:t>	</a:t>
+            </a:r>
+            <a:r>
+              <a:rPr lang="en-US" sz="3200" dirty="0" err="1">
+                <a:solidFill>
+                  <a:schemeClr val="accent1">
+                    <a:lumMod val="75000"/>
+                  </a:schemeClr>
+                </a:solidFill>
+                <a:latin typeface="Consolas" panose="020B0609020204030204" pitchFamily="49" charset="0"/>
+                <a:cs typeface="Consolas" panose="020B0609020204030204" pitchFamily="49" charset="0"/>
+              </a:rPr>
+              <a:t>git</a:t>
+            </a:r>
+            <a:r>
+              <a:rPr lang="en-US" sz="3200" dirty="0">
+                <a:solidFill>
+                  <a:schemeClr val="accent1">
+                    <a:lumMod val="75000"/>
+                  </a:schemeClr>
+                </a:solidFill>
+                <a:latin typeface="Consolas" panose="020B0609020204030204" pitchFamily="49" charset="0"/>
+                <a:cs typeface="Consolas" panose="020B0609020204030204" pitchFamily="49" charset="0"/>
+              </a:rPr>
+              <a:t> push origin --delete </a:t>
+            </a:r>
+            <a:r>
+              <a:rPr lang="en-US" sz="3200" dirty="0">
+                <a:solidFill>
+                  <a:schemeClr val="accent1">
+                    <a:lumMod val="75000"/>
+                  </a:schemeClr>
+                </a:solidFill>
+                <a:latin typeface="Consolas" panose="020B0609020204030204" pitchFamily="49" charset="0"/>
+                <a:cs typeface="Consolas" panose="020B0609020204030204" pitchFamily="49" charset="0"/>
+              </a:rPr>
+              <a:t>&lt;branch name&gt;</a:t>
+            </a:r>
+            <a:endParaRPr lang="en-US" sz="3200" dirty="0">
+              <a:solidFill>
+                <a:schemeClr val="accent1">
+                  <a:lumMod val="75000"/>
+                </a:schemeClr>
+              </a:solidFill>
+              <a:latin typeface="Consolas" panose="020B0609020204030204" pitchFamily="49" charset="0"/>
+              <a:cs typeface="Consolas" panose="020B0609020204030204" pitchFamily="49" charset="0"/>
+            </a:endParaRPr>
+          </a:p>
+          <a:p>
+            <a:endParaRPr lang="en-US" sz="2800" dirty="0">
+              <a:solidFill>
+                <a:schemeClr val="accent1">
+                  <a:lumMod val="75000"/>
+                </a:schemeClr>
+              </a:solidFill>
+              <a:latin typeface="Consolas" panose="020B0609020204030204" pitchFamily="49" charset="0"/>
+              <a:cs typeface="Consolas" panose="020B0609020204030204" pitchFamily="49" charset="0"/>
+            </a:endParaRPr>
+          </a:p>
+        </p:txBody>
+      </p:sp>
     </p:spTree>
     <p:extLst>
       <p:ext uri="{BB962C8B-B14F-4D97-AF65-F5344CB8AC3E}">
-        <p14:creationId xmlns:p14="http://schemas.microsoft.com/office/powerpoint/2010/main" val="3029448258"/>
+        <p14:creationId xmlns:p14="http://schemas.microsoft.com/office/powerpoint/2010/main" val="1963580909"/>
       </p:ext>
     </p:extLst>
   </p:cSld>
@@ -28175,7 +28516,7 @@
         <p:spPr>
           <a:xfrm>
             <a:off x="481449" y="288758"/>
-            <a:ext cx="4816640" cy="769441"/>
+            <a:ext cx="4030975" cy="769441"/>
           </a:xfrm>
           <a:prstGeom prst="rect">
             <a:avLst/>
@@ -28190,7 +28531,7 @@
           <a:p>
             <a:r>
               <a:rPr lang="en-US" sz="4400" dirty="0" smtClean="0"/>
-              <a:t>Branching strategies</a:t>
+              <a:t>Typical workflow</a:t>
             </a:r>
             <a:endParaRPr lang="en-US" sz="4400" dirty="0"/>
           </a:p>
@@ -28240,8 +28581,8 @@
         </p:nvSpPr>
         <p:spPr>
           <a:xfrm>
-            <a:off x="481449" y="1137831"/>
-            <a:ext cx="1460272" cy="584775"/>
+            <a:off x="481449" y="1314294"/>
+            <a:ext cx="9987862" cy="4524315"/>
           </a:xfrm>
           <a:prstGeom prst="rect">
             <a:avLst/>
@@ -28262,8 +28603,90 @@
               <a:rPr lang="en-US" sz="3200" dirty="0" smtClean="0">
                 <a:cs typeface="Consolas" panose="020B0609020204030204" pitchFamily="49" charset="0"/>
               </a:rPr>
-              <a:t>TODO</a:t>
-            </a:r>
+              <a:t>For each feature, a new feature branch is created locally</a:t>
+            </a:r>
+          </a:p>
+          <a:p>
+            <a:r>
+              <a:rPr lang="en-US" sz="3200" dirty="0" smtClean="0">
+                <a:cs typeface="Consolas" panose="020B0609020204030204" pitchFamily="49" charset="0"/>
+              </a:rPr>
+              <a:t>Commit into a local branch frequently (1-10 times a day)</a:t>
+            </a:r>
+          </a:p>
+          <a:p>
+            <a:pPr marL="285750" indent="-285750">
+              <a:buFont typeface="Arial" panose="020B0604020202020204" pitchFamily="34" charset="0"/>
+              <a:buChar char="•"/>
+            </a:pPr>
+            <a:endParaRPr lang="en-US" sz="3200" dirty="0" smtClean="0">
+              <a:cs typeface="Consolas" panose="020B0609020204030204" pitchFamily="49" charset="0"/>
+            </a:endParaRPr>
+          </a:p>
+          <a:p>
+            <a:pPr marL="285750" indent="-285750">
+              <a:buFont typeface="Arial" panose="020B0604020202020204" pitchFamily="34" charset="0"/>
+              <a:buChar char="•"/>
+            </a:pPr>
+            <a:r>
+              <a:rPr lang="en-US" sz="3200" dirty="0" smtClean="0">
+                <a:cs typeface="Consolas" panose="020B0609020204030204" pitchFamily="49" charset="0"/>
+              </a:rPr>
+              <a:t>Local feature branch tracks feature branch on the server</a:t>
+            </a:r>
+          </a:p>
+          <a:p>
+            <a:r>
+              <a:rPr lang="en-US" sz="3200" dirty="0" smtClean="0">
+                <a:cs typeface="Consolas" panose="020B0609020204030204" pitchFamily="49" charset="0"/>
+              </a:rPr>
+              <a:t>Push into a server feature branch regularly (once a day)</a:t>
+            </a:r>
+          </a:p>
+          <a:p>
+            <a:pPr marL="285750" indent="-285750">
+              <a:buFont typeface="Arial" panose="020B0604020202020204" pitchFamily="34" charset="0"/>
+              <a:buChar char="•"/>
+            </a:pPr>
+            <a:endParaRPr lang="en-US" sz="3200" dirty="0">
+              <a:cs typeface="Consolas" panose="020B0609020204030204" pitchFamily="49" charset="0"/>
+            </a:endParaRPr>
+          </a:p>
+          <a:p>
+            <a:pPr marL="285750" indent="-285750">
+              <a:buFont typeface="Arial" panose="020B0604020202020204" pitchFamily="34" charset="0"/>
+              <a:buChar char="•"/>
+            </a:pPr>
+            <a:r>
+              <a:rPr lang="en-US" sz="3200" dirty="0" smtClean="0">
+                <a:cs typeface="Consolas" panose="020B0609020204030204" pitchFamily="49" charset="0"/>
+              </a:rPr>
+              <a:t>In the end, feature branch is merged into a master</a:t>
+            </a:r>
+          </a:p>
+          <a:p>
+            <a:pPr marL="285750" indent="-285750">
+              <a:buFont typeface="Arial" panose="020B0604020202020204" pitchFamily="34" charset="0"/>
+              <a:buChar char="•"/>
+            </a:pPr>
+            <a:endParaRPr lang="en-US" sz="3200" dirty="0" smtClean="0">
+              <a:cs typeface="Consolas" panose="020B0609020204030204" pitchFamily="49" charset="0"/>
+            </a:endParaRPr>
+          </a:p>
+          <a:p>
+            <a:pPr marL="285750" indent="-285750">
+              <a:buFont typeface="Arial" panose="020B0604020202020204" pitchFamily="34" charset="0"/>
+              <a:buChar char="•"/>
+            </a:pPr>
+            <a:r>
+              <a:rPr lang="en-US" sz="3200" dirty="0" smtClean="0">
+                <a:cs typeface="Consolas" panose="020B0609020204030204" pitchFamily="49" charset="0"/>
+              </a:rPr>
+              <a:t>Feature branch is deleted</a:t>
+            </a:r>
+            <a:endParaRPr lang="en-US" sz="3200" dirty="0" smtClean="0">
+              <a:cs typeface="Consolas" panose="020B0609020204030204" pitchFamily="49" charset="0"/>
+            </a:endParaRPr>
           </a:p>
         </p:txBody>
       </p:sp>
@@ -28306,7 +28729,7 @@
         <p:spPr>
           <a:xfrm>
             <a:off x="481449" y="288758"/>
-            <a:ext cx="5759654" cy="769441"/>
+            <a:ext cx="3719288" cy="769441"/>
           </a:xfrm>
           <a:prstGeom prst="rect">
             <a:avLst/>
@@ -28321,7 +28744,7 @@
           <a:p>
             <a:r>
               <a:rPr lang="en-US" sz="4400" dirty="0" smtClean="0"/>
-              <a:t>Concept of pull requests</a:t>
+              <a:t>In Visual Studio</a:t>
             </a:r>
             <a:endParaRPr lang="en-US" sz="4400" dirty="0"/>
           </a:p>
@@ -28398,10 +28821,92 @@
           </a:p>
         </p:txBody>
       </p:sp>
+      <p:pic>
+        <p:nvPicPr>
+          <p:cNvPr id="2050" name="Picture 2" descr="http://www.thebeancounter.com/wp-content/uploads/2015/08/for_dummies_plain.png"/>
+          <p:cNvPicPr>
+            <a:picLocks noChangeAspect="1" noChangeArrowheads="1"/>
+          </p:cNvPicPr>
+          <p:nvPr/>
+        </p:nvPicPr>
+        <p:blipFill>
+          <a:blip r:embed="rId2">
+            <a:extLst>
+              <a:ext uri="{28A0092B-C50C-407E-A947-70E740481C1C}">
+                <a14:useLocalDpi xmlns:a14="http://schemas.microsoft.com/office/drawing/2010/main" val="0"/>
+              </a:ext>
+            </a:extLst>
+          </a:blip>
+          <a:srcRect/>
+          <a:stretch>
+            <a:fillRect/>
+          </a:stretch>
+        </p:blipFill>
+        <p:spPr bwMode="auto">
+          <a:xfrm>
+            <a:off x="5834478" y="2646328"/>
+            <a:ext cx="6180691" cy="3188452"/>
+          </a:xfrm>
+          <a:prstGeom prst="rect">
+            <a:avLst/>
+          </a:prstGeom>
+          <a:noFill/>
+          <a:extLst>
+            <a:ext uri="{909E8E84-426E-40DD-AFC4-6F175D3DCCD1}">
+              <a14:hiddenFill xmlns:a14="http://schemas.microsoft.com/office/drawing/2010/main">
+                <a:solidFill>
+                  <a:srgbClr val="FFFFFF"/>
+                </a:solidFill>
+              </a14:hiddenFill>
+            </a:ext>
+          </a:extLst>
+        </p:spPr>
+      </p:pic>
+      <p:pic>
+        <p:nvPicPr>
+          <p:cNvPr id="2058" name="Picture 10" descr="https://upload.wikimedia.org/wikipedia/commons/thumb/e/e4/Visual_Studio_2013_Logo.svg/500px-Visual_Studio_2013_Logo.svg.png"/>
+          <p:cNvPicPr>
+            <a:picLocks noChangeAspect="1" noChangeArrowheads="1"/>
+          </p:cNvPicPr>
+          <p:nvPr/>
+        </p:nvPicPr>
+        <p:blipFill>
+          <a:blip r:embed="rId3">
+            <a:extLst>
+              <a:ext uri="{28A0092B-C50C-407E-A947-70E740481C1C}">
+                <a14:useLocalDpi xmlns:a14="http://schemas.microsoft.com/office/drawing/2010/main" val="0"/>
+              </a:ext>
+            </a:extLst>
+          </a:blip>
+          <a:srcRect/>
+          <a:stretch>
+            <a:fillRect/>
+          </a:stretch>
+        </p:blipFill>
+        <p:spPr bwMode="auto">
+          <a:xfrm>
+            <a:off x="8754143" y="95673"/>
+            <a:ext cx="2323312" cy="2402305"/>
+          </a:xfrm>
+          <a:prstGeom prst="rect">
+            <a:avLst/>
+          </a:prstGeom>
+          <a:noFill/>
+          <a:extLst>
+            <a:ext uri="{909E8E84-426E-40DD-AFC4-6F175D3DCCD1}">
+              <a14:hiddenFill xmlns:a14="http://schemas.microsoft.com/office/drawing/2010/main">
+                <a:solidFill>
+                  <a:srgbClr val="FFFFFF"/>
+                </a:solidFill>
+              </a14:hiddenFill>
+            </a:ext>
+          </a:extLst>
+        </p:spPr>
+      </p:pic>
     </p:spTree>
     <p:extLst>
       <p:ext uri="{BB962C8B-B14F-4D97-AF65-F5344CB8AC3E}">
-        <p14:creationId xmlns:p14="http://schemas.microsoft.com/office/powerpoint/2010/main" val="3892780953"/>
+        <p14:creationId xmlns:p14="http://schemas.microsoft.com/office/powerpoint/2010/main" val="3516602120"/>
       </p:ext>
     </p:extLst>
   </p:cSld>
@@ -28437,7 +28942,7 @@
         <p:spPr>
           <a:xfrm>
             <a:off x="481449" y="288758"/>
-            <a:ext cx="3719288" cy="769441"/>
+            <a:ext cx="1435586" cy="769441"/>
           </a:xfrm>
           <a:prstGeom prst="rect">
             <a:avLst/>
@@ -28452,7 +28957,7 @@
           <a:p>
             <a:r>
               <a:rPr lang="en-US" sz="4400" dirty="0" smtClean="0"/>
-              <a:t>In Visual Studio</a:t>
+              <a:t>More</a:t>
             </a:r>
             <a:endParaRPr lang="en-US" sz="4400" dirty="0"/>
           </a:p>
@@ -28503,7 +29008,7 @@
         <p:spPr>
           <a:xfrm>
             <a:off x="481449" y="1137831"/>
-            <a:ext cx="1460272" cy="584775"/>
+            <a:ext cx="8403262" cy="5878532"/>
           </a:xfrm>
           <a:prstGeom prst="rect">
             <a:avLst/>
@@ -28524,97 +29029,312 @@
               <a:rPr lang="en-US" sz="3200" dirty="0" smtClean="0">
                 <a:cs typeface="Consolas" panose="020B0609020204030204" pitchFamily="49" charset="0"/>
               </a:rPr>
-              <a:t>TODO</a:t>
-            </a:r>
-          </a:p>
-        </p:txBody>
-      </p:sp>
-      <p:pic>
-        <p:nvPicPr>
-          <p:cNvPr id="2050" name="Picture 2" descr="http://www.thebeancounter.com/wp-content/uploads/2015/08/for_dummies_plain.png"/>
-          <p:cNvPicPr>
-            <a:picLocks noChangeAspect="1" noChangeArrowheads="1"/>
-          </p:cNvPicPr>
-          <p:nvPr/>
-        </p:nvPicPr>
-        <p:blipFill>
-          <a:blip r:embed="rId2">
-            <a:extLst>
-              <a:ext uri="{28A0092B-C50C-407E-A947-70E740481C1C}">
-                <a14:useLocalDpi xmlns:a14="http://schemas.microsoft.com/office/drawing/2010/main" val="0"/>
-              </a:ext>
-            </a:extLst>
-          </a:blip>
-          <a:srcRect/>
-          <a:stretch>
-            <a:fillRect/>
-          </a:stretch>
-        </p:blipFill>
-        <p:spPr bwMode="auto">
-          <a:xfrm>
-            <a:off x="5834478" y="2646328"/>
-            <a:ext cx="6180691" cy="3188452"/>
-          </a:xfrm>
-          <a:prstGeom prst="rect">
-            <a:avLst/>
-          </a:prstGeom>
-          <a:noFill/>
-          <a:extLst>
-            <a:ext uri="{909E8E84-426E-40DD-AFC4-6F175D3DCCD1}">
-              <a14:hiddenFill xmlns:a14="http://schemas.microsoft.com/office/drawing/2010/main">
+              <a:t>Undo working copy changes, but save them</a:t>
+            </a:r>
+          </a:p>
+          <a:p>
+            <a:pPr lvl="2"/>
+            <a:r>
+              <a:rPr lang="en-US" sz="2800" dirty="0" err="1">
                 <a:solidFill>
-                  <a:srgbClr val="FFFFFF"/>
+                  <a:schemeClr val="accent1">
+                    <a:lumMod val="75000"/>
+                  </a:schemeClr>
                 </a:solidFill>
-              </a14:hiddenFill>
-            </a:ext>
-          </a:extLst>
-        </p:spPr>
-      </p:pic>
-      <p:pic>
-        <p:nvPicPr>
-          <p:cNvPr id="2058" name="Picture 10" descr="https://upload.wikimedia.org/wikipedia/commons/thumb/e/e4/Visual_Studio_2013_Logo.svg/500px-Visual_Studio_2013_Logo.svg.png"/>
-          <p:cNvPicPr>
-            <a:picLocks noChangeAspect="1" noChangeArrowheads="1"/>
-          </p:cNvPicPr>
-          <p:nvPr/>
-        </p:nvPicPr>
-        <p:blipFill>
-          <a:blip r:embed="rId3">
-            <a:extLst>
-              <a:ext uri="{28A0092B-C50C-407E-A947-70E740481C1C}">
-                <a14:useLocalDpi xmlns:a14="http://schemas.microsoft.com/office/drawing/2010/main" val="0"/>
-              </a:ext>
-            </a:extLst>
-          </a:blip>
-          <a:srcRect/>
-          <a:stretch>
-            <a:fillRect/>
-          </a:stretch>
-        </p:blipFill>
-        <p:spPr bwMode="auto">
-          <a:xfrm>
-            <a:off x="8754143" y="95673"/>
-            <a:ext cx="2323312" cy="2402305"/>
-          </a:xfrm>
-          <a:prstGeom prst="rect">
-            <a:avLst/>
-          </a:prstGeom>
-          <a:noFill/>
-          <a:extLst>
-            <a:ext uri="{909E8E84-426E-40DD-AFC4-6F175D3DCCD1}">
-              <a14:hiddenFill xmlns:a14="http://schemas.microsoft.com/office/drawing/2010/main">
+                <a:latin typeface="Consolas" panose="020B0609020204030204" pitchFamily="49" charset="0"/>
+                <a:cs typeface="Consolas" panose="020B0609020204030204" pitchFamily="49" charset="0"/>
+              </a:rPr>
+              <a:t>git</a:t>
+            </a:r>
+            <a:r>
+              <a:rPr lang="en-US" sz="2800" dirty="0">
                 <a:solidFill>
-                  <a:srgbClr val="FFFFFF"/>
+                  <a:schemeClr val="accent1">
+                    <a:lumMod val="75000"/>
+                  </a:schemeClr>
                 </a:solidFill>
-              </a14:hiddenFill>
-            </a:ext>
-          </a:extLst>
-        </p:spPr>
-      </p:pic>
+                <a:latin typeface="Consolas" panose="020B0609020204030204" pitchFamily="49" charset="0"/>
+                <a:cs typeface="Consolas" panose="020B0609020204030204" pitchFamily="49" charset="0"/>
+              </a:rPr>
+              <a:t> </a:t>
+            </a:r>
+            <a:r>
+              <a:rPr lang="en-US" sz="2800" dirty="0" smtClean="0">
+                <a:solidFill>
+                  <a:schemeClr val="accent1">
+                    <a:lumMod val="75000"/>
+                  </a:schemeClr>
+                </a:solidFill>
+                <a:latin typeface="Consolas" panose="020B0609020204030204" pitchFamily="49" charset="0"/>
+                <a:cs typeface="Consolas" panose="020B0609020204030204" pitchFamily="49" charset="0"/>
+              </a:rPr>
+              <a:t>stash [apply]</a:t>
+            </a:r>
+          </a:p>
+          <a:p>
+            <a:pPr lvl="2"/>
+            <a:endParaRPr lang="en-US" sz="2800" dirty="0">
+              <a:solidFill>
+                <a:schemeClr val="accent1">
+                  <a:lumMod val="75000"/>
+                </a:schemeClr>
+              </a:solidFill>
+              <a:latin typeface="Consolas" panose="020B0609020204030204" pitchFamily="49" charset="0"/>
+              <a:cs typeface="Consolas" panose="020B0609020204030204" pitchFamily="49" charset="0"/>
+            </a:endParaRPr>
+          </a:p>
+          <a:p>
+            <a:pPr marL="285750" indent="-285750">
+              <a:buFont typeface="Arial" panose="020B0604020202020204" pitchFamily="34" charset="0"/>
+              <a:buChar char="•"/>
+            </a:pPr>
+            <a:r>
+              <a:rPr lang="en-US" sz="3200" dirty="0" smtClean="0">
+                <a:cs typeface="Consolas" panose="020B0609020204030204" pitchFamily="49" charset="0"/>
+              </a:rPr>
+              <a:t>Migrate commit(s) to any other branch</a:t>
+            </a:r>
+          </a:p>
+          <a:p>
+            <a:r>
+              <a:rPr lang="en-US" sz="3200" dirty="0">
+                <a:cs typeface="Consolas" panose="020B0609020204030204" pitchFamily="49" charset="0"/>
+              </a:rPr>
+              <a:t>	</a:t>
+            </a:r>
+            <a:r>
+              <a:rPr lang="en-US" sz="2800" dirty="0" err="1">
+                <a:solidFill>
+                  <a:schemeClr val="accent1">
+                    <a:lumMod val="75000"/>
+                  </a:schemeClr>
+                </a:solidFill>
+                <a:latin typeface="Consolas" panose="020B0609020204030204" pitchFamily="49" charset="0"/>
+                <a:cs typeface="Consolas" panose="020B0609020204030204" pitchFamily="49" charset="0"/>
+              </a:rPr>
+              <a:t>git</a:t>
+            </a:r>
+            <a:r>
+              <a:rPr lang="en-US" sz="2800" dirty="0">
+                <a:solidFill>
+                  <a:schemeClr val="accent1">
+                    <a:lumMod val="75000"/>
+                  </a:schemeClr>
+                </a:solidFill>
+                <a:latin typeface="Consolas" panose="020B0609020204030204" pitchFamily="49" charset="0"/>
+                <a:cs typeface="Consolas" panose="020B0609020204030204" pitchFamily="49" charset="0"/>
+              </a:rPr>
+              <a:t> </a:t>
+            </a:r>
+            <a:r>
+              <a:rPr lang="en-US" sz="2800" dirty="0" smtClean="0">
+                <a:solidFill>
+                  <a:schemeClr val="accent1">
+                    <a:lumMod val="75000"/>
+                  </a:schemeClr>
+                </a:solidFill>
+                <a:latin typeface="Consolas" panose="020B0609020204030204" pitchFamily="49" charset="0"/>
+                <a:cs typeface="Consolas" panose="020B0609020204030204" pitchFamily="49" charset="0"/>
+              </a:rPr>
+              <a:t>cherry-pick &lt;commit&gt;</a:t>
+            </a:r>
+          </a:p>
+          <a:p>
+            <a:pPr marL="285750" indent="-285750">
+              <a:buFont typeface="Arial" panose="020B0604020202020204" pitchFamily="34" charset="0"/>
+              <a:buChar char="•"/>
+            </a:pPr>
+            <a:endParaRPr lang="en-US" sz="3200" dirty="0" smtClean="0">
+              <a:cs typeface="Consolas" panose="020B0609020204030204" pitchFamily="49" charset="0"/>
+            </a:endParaRPr>
+          </a:p>
+          <a:p>
+            <a:pPr marL="285750" indent="-285750">
+              <a:buFont typeface="Arial" panose="020B0604020202020204" pitchFamily="34" charset="0"/>
+              <a:buChar char="•"/>
+            </a:pPr>
+            <a:r>
+              <a:rPr lang="en-US" sz="3200" dirty="0" smtClean="0">
+                <a:cs typeface="Consolas" panose="020B0609020204030204" pitchFamily="49" charset="0"/>
+              </a:rPr>
+              <a:t>Creating </a:t>
+            </a:r>
+            <a:r>
+              <a:rPr lang="en-US" sz="3200" dirty="0">
+                <a:cs typeface="Consolas" panose="020B0609020204030204" pitchFamily="49" charset="0"/>
+              </a:rPr>
+              <a:t>a patch</a:t>
+            </a:r>
+          </a:p>
+          <a:p>
+            <a:pPr lvl="1"/>
+            <a:r>
+              <a:rPr lang="en-US" sz="3200" dirty="0">
+                <a:cs typeface="Consolas" panose="020B0609020204030204" pitchFamily="49" charset="0"/>
+              </a:rPr>
+              <a:t>	</a:t>
+            </a:r>
+            <a:r>
+              <a:rPr lang="en-US" sz="2800" dirty="0" err="1">
+                <a:solidFill>
+                  <a:schemeClr val="accent1">
+                    <a:lumMod val="75000"/>
+                  </a:schemeClr>
+                </a:solidFill>
+                <a:latin typeface="Consolas" panose="020B0609020204030204" pitchFamily="49" charset="0"/>
+                <a:cs typeface="Consolas" panose="020B0609020204030204" pitchFamily="49" charset="0"/>
+              </a:rPr>
+              <a:t>git</a:t>
+            </a:r>
+            <a:r>
+              <a:rPr lang="en-US" sz="2800" dirty="0">
+                <a:solidFill>
+                  <a:schemeClr val="accent1">
+                    <a:lumMod val="75000"/>
+                  </a:schemeClr>
+                </a:solidFill>
+                <a:latin typeface="Consolas" panose="020B0609020204030204" pitchFamily="49" charset="0"/>
+                <a:cs typeface="Consolas" panose="020B0609020204030204" pitchFamily="49" charset="0"/>
+              </a:rPr>
+              <a:t> diff &amp;&amp; </a:t>
+            </a:r>
+            <a:r>
+              <a:rPr lang="en-US" sz="2800" dirty="0" err="1">
+                <a:solidFill>
+                  <a:schemeClr val="accent1">
+                    <a:lumMod val="75000"/>
+                  </a:schemeClr>
+                </a:solidFill>
+                <a:latin typeface="Consolas" panose="020B0609020204030204" pitchFamily="49" charset="0"/>
+                <a:cs typeface="Consolas" panose="020B0609020204030204" pitchFamily="49" charset="0"/>
+              </a:rPr>
+              <a:t>git</a:t>
+            </a:r>
+            <a:r>
+              <a:rPr lang="en-US" sz="2800" dirty="0">
+                <a:solidFill>
+                  <a:schemeClr val="accent1">
+                    <a:lumMod val="75000"/>
+                  </a:schemeClr>
+                </a:solidFill>
+                <a:latin typeface="Consolas" panose="020B0609020204030204" pitchFamily="49" charset="0"/>
+                <a:cs typeface="Consolas" panose="020B0609020204030204" pitchFamily="49" charset="0"/>
+              </a:rPr>
+              <a:t> apply</a:t>
+            </a:r>
+          </a:p>
+          <a:p>
+            <a:pPr marL="285750" indent="-285750">
+              <a:buFont typeface="Arial" panose="020B0604020202020204" pitchFamily="34" charset="0"/>
+              <a:buChar char="•"/>
+            </a:pPr>
+            <a:endParaRPr lang="en-US" sz="3200" dirty="0" smtClean="0">
+              <a:cs typeface="Consolas" panose="020B0609020204030204" pitchFamily="49" charset="0"/>
+            </a:endParaRPr>
+          </a:p>
+          <a:p>
+            <a:pPr marL="285750" indent="-285750">
+              <a:buFont typeface="Arial" panose="020B0604020202020204" pitchFamily="34" charset="0"/>
+              <a:buChar char="•"/>
+            </a:pPr>
+            <a:r>
+              <a:rPr lang="en-US" sz="3200" dirty="0" smtClean="0">
+                <a:cs typeface="Consolas" panose="020B0609020204030204" pitchFamily="49" charset="0"/>
+              </a:rPr>
+              <a:t>Aggregate several commits into</a:t>
+            </a:r>
+          </a:p>
+          <a:p>
+            <a:r>
+              <a:rPr lang="en-US" sz="3200" dirty="0">
+                <a:cs typeface="Consolas" panose="020B0609020204030204" pitchFamily="49" charset="0"/>
+              </a:rPr>
+              <a:t>	</a:t>
+            </a:r>
+            <a:r>
+              <a:rPr lang="en-US" sz="2800" dirty="0" err="1">
+                <a:solidFill>
+                  <a:schemeClr val="accent1">
+                    <a:lumMod val="75000"/>
+                  </a:schemeClr>
+                </a:solidFill>
+                <a:latin typeface="Consolas" panose="020B0609020204030204" pitchFamily="49" charset="0"/>
+                <a:cs typeface="Consolas" panose="020B0609020204030204" pitchFamily="49" charset="0"/>
+              </a:rPr>
+              <a:t>git</a:t>
+            </a:r>
+            <a:r>
+              <a:rPr lang="en-US" sz="2800" dirty="0">
+                <a:solidFill>
+                  <a:schemeClr val="accent1">
+                    <a:lumMod val="75000"/>
+                  </a:schemeClr>
+                </a:solidFill>
+                <a:latin typeface="Consolas" panose="020B0609020204030204" pitchFamily="49" charset="0"/>
+                <a:cs typeface="Consolas" panose="020B0609020204030204" pitchFamily="49" charset="0"/>
+              </a:rPr>
+              <a:t> reset --soft </a:t>
+            </a:r>
+            <a:r>
+              <a:rPr lang="en-US" sz="2800" dirty="0" err="1">
+                <a:solidFill>
+                  <a:schemeClr val="accent1">
+                    <a:lumMod val="75000"/>
+                  </a:schemeClr>
+                </a:solidFill>
+                <a:latin typeface="Consolas" panose="020B0609020204030204" pitchFamily="49" charset="0"/>
+                <a:cs typeface="Consolas" panose="020B0609020204030204" pitchFamily="49" charset="0"/>
+              </a:rPr>
+              <a:t>HEAD~n</a:t>
+            </a:r>
+            <a:r>
+              <a:rPr lang="en-US" sz="2800" dirty="0">
+                <a:solidFill>
+                  <a:schemeClr val="accent1">
+                    <a:lumMod val="75000"/>
+                  </a:schemeClr>
+                </a:solidFill>
+                <a:latin typeface="Consolas" panose="020B0609020204030204" pitchFamily="49" charset="0"/>
+                <a:cs typeface="Consolas" panose="020B0609020204030204" pitchFamily="49" charset="0"/>
+              </a:rPr>
+              <a:t> &amp;&amp; </a:t>
+            </a:r>
+            <a:r>
+              <a:rPr lang="en-US" sz="2800" dirty="0" err="1">
+                <a:solidFill>
+                  <a:schemeClr val="accent1">
+                    <a:lumMod val="75000"/>
+                  </a:schemeClr>
+                </a:solidFill>
+                <a:latin typeface="Consolas" panose="020B0609020204030204" pitchFamily="49" charset="0"/>
+                <a:cs typeface="Consolas" panose="020B0609020204030204" pitchFamily="49" charset="0"/>
+              </a:rPr>
+              <a:t>git</a:t>
+            </a:r>
+            <a:r>
+              <a:rPr lang="en-US" sz="2800" dirty="0">
+                <a:solidFill>
+                  <a:schemeClr val="accent1">
+                    <a:lumMod val="75000"/>
+                  </a:schemeClr>
+                </a:solidFill>
+                <a:latin typeface="Consolas" panose="020B0609020204030204" pitchFamily="49" charset="0"/>
+                <a:cs typeface="Consolas" panose="020B0609020204030204" pitchFamily="49" charset="0"/>
+              </a:rPr>
+              <a:t> commit</a:t>
+            </a:r>
+          </a:p>
+          <a:p>
+            <a:endParaRPr lang="en-US" sz="3200" dirty="0" smtClean="0">
+              <a:cs typeface="Consolas" panose="020B0609020204030204" pitchFamily="49" charset="0"/>
+            </a:endParaRPr>
+          </a:p>
+        </p:txBody>
+      </p:sp>
     </p:spTree>
     <p:extLst>
       <p:ext uri="{BB962C8B-B14F-4D97-AF65-F5344CB8AC3E}">
-        <p14:creationId xmlns:p14="http://schemas.microsoft.com/office/powerpoint/2010/main" val="3516602120"/>
+        <p14:creationId xmlns:p14="http://schemas.microsoft.com/office/powerpoint/2010/main" val="2832971978"/>
       </p:ext>
     </p:extLst>
   </p:cSld>
@@ -28716,434 +29436,6 @@
         <p:spPr>
           <a:xfrm>
             <a:off x="481449" y="1137831"/>
-            <a:ext cx="8403262" cy="5878532"/>
-          </a:xfrm>
-          <a:prstGeom prst="rect">
-            <a:avLst/>
-          </a:prstGeom>
-          <a:noFill/>
-        </p:spPr>
-        <p:txBody>
-          <a:bodyPr wrap="none" rtlCol="0">
-            <a:spAutoFit/>
-          </a:bodyPr>
-          <a:lstStyle/>
-          <a:p>
-            <a:pPr marL="285750" indent="-285750">
-              <a:buFont typeface="Arial" panose="020B0604020202020204" pitchFamily="34" charset="0"/>
-              <a:buChar char="•"/>
-            </a:pPr>
-            <a:r>
-              <a:rPr lang="en-US" sz="3200" dirty="0" smtClean="0">
-                <a:cs typeface="Consolas" panose="020B0609020204030204" pitchFamily="49" charset="0"/>
-              </a:rPr>
-              <a:t>Undo working copy changes, but save them</a:t>
-            </a:r>
-          </a:p>
-          <a:p>
-            <a:pPr lvl="2"/>
-            <a:r>
-              <a:rPr lang="en-US" sz="2800" dirty="0" err="1">
-                <a:solidFill>
-                  <a:schemeClr val="accent1">
-                    <a:lumMod val="75000"/>
-                  </a:schemeClr>
-                </a:solidFill>
-                <a:latin typeface="Consolas" panose="020B0609020204030204" pitchFamily="49" charset="0"/>
-                <a:cs typeface="Consolas" panose="020B0609020204030204" pitchFamily="49" charset="0"/>
-              </a:rPr>
-              <a:t>git</a:t>
-            </a:r>
-            <a:r>
-              <a:rPr lang="en-US" sz="2800" dirty="0">
-                <a:solidFill>
-                  <a:schemeClr val="accent1">
-                    <a:lumMod val="75000"/>
-                  </a:schemeClr>
-                </a:solidFill>
-                <a:latin typeface="Consolas" panose="020B0609020204030204" pitchFamily="49" charset="0"/>
-                <a:cs typeface="Consolas" panose="020B0609020204030204" pitchFamily="49" charset="0"/>
-              </a:rPr>
-              <a:t> </a:t>
-            </a:r>
-            <a:r>
-              <a:rPr lang="en-US" sz="2800" dirty="0" smtClean="0">
-                <a:solidFill>
-                  <a:schemeClr val="accent1">
-                    <a:lumMod val="75000"/>
-                  </a:schemeClr>
-                </a:solidFill>
-                <a:latin typeface="Consolas" panose="020B0609020204030204" pitchFamily="49" charset="0"/>
-                <a:cs typeface="Consolas" panose="020B0609020204030204" pitchFamily="49" charset="0"/>
-              </a:rPr>
-              <a:t>stash [apply]</a:t>
-            </a:r>
-          </a:p>
-          <a:p>
-            <a:pPr lvl="2"/>
-            <a:endParaRPr lang="en-US" sz="2800" dirty="0">
-              <a:solidFill>
-                <a:schemeClr val="accent1">
-                  <a:lumMod val="75000"/>
-                </a:schemeClr>
-              </a:solidFill>
-              <a:latin typeface="Consolas" panose="020B0609020204030204" pitchFamily="49" charset="0"/>
-              <a:cs typeface="Consolas" panose="020B0609020204030204" pitchFamily="49" charset="0"/>
-            </a:endParaRPr>
-          </a:p>
-          <a:p>
-            <a:pPr marL="285750" indent="-285750">
-              <a:buFont typeface="Arial" panose="020B0604020202020204" pitchFamily="34" charset="0"/>
-              <a:buChar char="•"/>
-            </a:pPr>
-            <a:r>
-              <a:rPr lang="en-US" sz="3200" dirty="0" smtClean="0">
-                <a:cs typeface="Consolas" panose="020B0609020204030204" pitchFamily="49" charset="0"/>
-              </a:rPr>
-              <a:t>Migrate commit(s) to any other branch</a:t>
-            </a:r>
-          </a:p>
-          <a:p>
-            <a:r>
-              <a:rPr lang="en-US" sz="3200" dirty="0">
-                <a:cs typeface="Consolas" panose="020B0609020204030204" pitchFamily="49" charset="0"/>
-              </a:rPr>
-              <a:t>	</a:t>
-            </a:r>
-            <a:r>
-              <a:rPr lang="en-US" sz="2800" dirty="0" err="1">
-                <a:solidFill>
-                  <a:schemeClr val="accent1">
-                    <a:lumMod val="75000"/>
-                  </a:schemeClr>
-                </a:solidFill>
-                <a:latin typeface="Consolas" panose="020B0609020204030204" pitchFamily="49" charset="0"/>
-                <a:cs typeface="Consolas" panose="020B0609020204030204" pitchFamily="49" charset="0"/>
-              </a:rPr>
-              <a:t>git</a:t>
-            </a:r>
-            <a:r>
-              <a:rPr lang="en-US" sz="2800" dirty="0">
-                <a:solidFill>
-                  <a:schemeClr val="accent1">
-                    <a:lumMod val="75000"/>
-                  </a:schemeClr>
-                </a:solidFill>
-                <a:latin typeface="Consolas" panose="020B0609020204030204" pitchFamily="49" charset="0"/>
-                <a:cs typeface="Consolas" panose="020B0609020204030204" pitchFamily="49" charset="0"/>
-              </a:rPr>
-              <a:t> </a:t>
-            </a:r>
-            <a:r>
-              <a:rPr lang="en-US" sz="2800" dirty="0" smtClean="0">
-                <a:solidFill>
-                  <a:schemeClr val="accent1">
-                    <a:lumMod val="75000"/>
-                  </a:schemeClr>
-                </a:solidFill>
-                <a:latin typeface="Consolas" panose="020B0609020204030204" pitchFamily="49" charset="0"/>
-                <a:cs typeface="Consolas" panose="020B0609020204030204" pitchFamily="49" charset="0"/>
-              </a:rPr>
-              <a:t>cherry-pick &lt;commit&gt;</a:t>
-            </a:r>
-          </a:p>
-          <a:p>
-            <a:pPr marL="285750" indent="-285750">
-              <a:buFont typeface="Arial" panose="020B0604020202020204" pitchFamily="34" charset="0"/>
-              <a:buChar char="•"/>
-            </a:pPr>
-            <a:endParaRPr lang="en-US" sz="3200" dirty="0" smtClean="0">
-              <a:cs typeface="Consolas" panose="020B0609020204030204" pitchFamily="49" charset="0"/>
-            </a:endParaRPr>
-          </a:p>
-          <a:p>
-            <a:pPr marL="285750" indent="-285750">
-              <a:buFont typeface="Arial" panose="020B0604020202020204" pitchFamily="34" charset="0"/>
-              <a:buChar char="•"/>
-            </a:pPr>
-            <a:r>
-              <a:rPr lang="en-US" sz="3200" dirty="0" smtClean="0">
-                <a:cs typeface="Consolas" panose="020B0609020204030204" pitchFamily="49" charset="0"/>
-              </a:rPr>
-              <a:t>Creating </a:t>
-            </a:r>
-            <a:r>
-              <a:rPr lang="en-US" sz="3200" dirty="0">
-                <a:cs typeface="Consolas" panose="020B0609020204030204" pitchFamily="49" charset="0"/>
-              </a:rPr>
-              <a:t>a patch</a:t>
-            </a:r>
-          </a:p>
-          <a:p>
-            <a:pPr lvl="1"/>
-            <a:r>
-              <a:rPr lang="en-US" sz="3200" dirty="0">
-                <a:cs typeface="Consolas" panose="020B0609020204030204" pitchFamily="49" charset="0"/>
-              </a:rPr>
-              <a:t>	</a:t>
-            </a:r>
-            <a:r>
-              <a:rPr lang="en-US" sz="2800" dirty="0" err="1">
-                <a:solidFill>
-                  <a:schemeClr val="accent1">
-                    <a:lumMod val="75000"/>
-                  </a:schemeClr>
-                </a:solidFill>
-                <a:latin typeface="Consolas" panose="020B0609020204030204" pitchFamily="49" charset="0"/>
-                <a:cs typeface="Consolas" panose="020B0609020204030204" pitchFamily="49" charset="0"/>
-              </a:rPr>
-              <a:t>git</a:t>
-            </a:r>
-            <a:r>
-              <a:rPr lang="en-US" sz="2800" dirty="0">
-                <a:solidFill>
-                  <a:schemeClr val="accent1">
-                    <a:lumMod val="75000"/>
-                  </a:schemeClr>
-                </a:solidFill>
-                <a:latin typeface="Consolas" panose="020B0609020204030204" pitchFamily="49" charset="0"/>
-                <a:cs typeface="Consolas" panose="020B0609020204030204" pitchFamily="49" charset="0"/>
-              </a:rPr>
-              <a:t> diff &amp;&amp; </a:t>
-            </a:r>
-            <a:r>
-              <a:rPr lang="en-US" sz="2800" dirty="0" err="1">
-                <a:solidFill>
-                  <a:schemeClr val="accent1">
-                    <a:lumMod val="75000"/>
-                  </a:schemeClr>
-                </a:solidFill>
-                <a:latin typeface="Consolas" panose="020B0609020204030204" pitchFamily="49" charset="0"/>
-                <a:cs typeface="Consolas" panose="020B0609020204030204" pitchFamily="49" charset="0"/>
-              </a:rPr>
-              <a:t>git</a:t>
-            </a:r>
-            <a:r>
-              <a:rPr lang="en-US" sz="2800" dirty="0">
-                <a:solidFill>
-                  <a:schemeClr val="accent1">
-                    <a:lumMod val="75000"/>
-                  </a:schemeClr>
-                </a:solidFill>
-                <a:latin typeface="Consolas" panose="020B0609020204030204" pitchFamily="49" charset="0"/>
-                <a:cs typeface="Consolas" panose="020B0609020204030204" pitchFamily="49" charset="0"/>
-              </a:rPr>
-              <a:t> apply</a:t>
-            </a:r>
-          </a:p>
-          <a:p>
-            <a:pPr marL="285750" indent="-285750">
-              <a:buFont typeface="Arial" panose="020B0604020202020204" pitchFamily="34" charset="0"/>
-              <a:buChar char="•"/>
-            </a:pPr>
-            <a:endParaRPr lang="en-US" sz="3200" dirty="0" smtClean="0">
-              <a:cs typeface="Consolas" panose="020B0609020204030204" pitchFamily="49" charset="0"/>
-            </a:endParaRPr>
-          </a:p>
-          <a:p>
-            <a:pPr marL="285750" indent="-285750">
-              <a:buFont typeface="Arial" panose="020B0604020202020204" pitchFamily="34" charset="0"/>
-              <a:buChar char="•"/>
-            </a:pPr>
-            <a:r>
-              <a:rPr lang="en-US" sz="3200" dirty="0" smtClean="0">
-                <a:cs typeface="Consolas" panose="020B0609020204030204" pitchFamily="49" charset="0"/>
-              </a:rPr>
-              <a:t>Aggregate several commits into</a:t>
-            </a:r>
-          </a:p>
-          <a:p>
-            <a:r>
-              <a:rPr lang="en-US" sz="3200" dirty="0">
-                <a:cs typeface="Consolas" panose="020B0609020204030204" pitchFamily="49" charset="0"/>
-              </a:rPr>
-              <a:t>	</a:t>
-            </a:r>
-            <a:r>
-              <a:rPr lang="en-US" sz="2800" dirty="0" err="1">
-                <a:solidFill>
-                  <a:schemeClr val="accent1">
-                    <a:lumMod val="75000"/>
-                  </a:schemeClr>
-                </a:solidFill>
-                <a:latin typeface="Consolas" panose="020B0609020204030204" pitchFamily="49" charset="0"/>
-                <a:cs typeface="Consolas" panose="020B0609020204030204" pitchFamily="49" charset="0"/>
-              </a:rPr>
-              <a:t>git</a:t>
-            </a:r>
-            <a:r>
-              <a:rPr lang="en-US" sz="2800" dirty="0">
-                <a:solidFill>
-                  <a:schemeClr val="accent1">
-                    <a:lumMod val="75000"/>
-                  </a:schemeClr>
-                </a:solidFill>
-                <a:latin typeface="Consolas" panose="020B0609020204030204" pitchFamily="49" charset="0"/>
-                <a:cs typeface="Consolas" panose="020B0609020204030204" pitchFamily="49" charset="0"/>
-              </a:rPr>
-              <a:t> reset --soft </a:t>
-            </a:r>
-            <a:r>
-              <a:rPr lang="en-US" sz="2800" dirty="0" err="1">
-                <a:solidFill>
-                  <a:schemeClr val="accent1">
-                    <a:lumMod val="75000"/>
-                  </a:schemeClr>
-                </a:solidFill>
-                <a:latin typeface="Consolas" panose="020B0609020204030204" pitchFamily="49" charset="0"/>
-                <a:cs typeface="Consolas" panose="020B0609020204030204" pitchFamily="49" charset="0"/>
-              </a:rPr>
-              <a:t>HEAD~n</a:t>
-            </a:r>
-            <a:r>
-              <a:rPr lang="en-US" sz="2800" dirty="0">
-                <a:solidFill>
-                  <a:schemeClr val="accent1">
-                    <a:lumMod val="75000"/>
-                  </a:schemeClr>
-                </a:solidFill>
-                <a:latin typeface="Consolas" panose="020B0609020204030204" pitchFamily="49" charset="0"/>
-                <a:cs typeface="Consolas" panose="020B0609020204030204" pitchFamily="49" charset="0"/>
-              </a:rPr>
-              <a:t> &amp;&amp; </a:t>
-            </a:r>
-            <a:r>
-              <a:rPr lang="en-US" sz="2800" dirty="0" err="1">
-                <a:solidFill>
-                  <a:schemeClr val="accent1">
-                    <a:lumMod val="75000"/>
-                  </a:schemeClr>
-                </a:solidFill>
-                <a:latin typeface="Consolas" panose="020B0609020204030204" pitchFamily="49" charset="0"/>
-                <a:cs typeface="Consolas" panose="020B0609020204030204" pitchFamily="49" charset="0"/>
-              </a:rPr>
-              <a:t>git</a:t>
-            </a:r>
-            <a:r>
-              <a:rPr lang="en-US" sz="2800" dirty="0">
-                <a:solidFill>
-                  <a:schemeClr val="accent1">
-                    <a:lumMod val="75000"/>
-                  </a:schemeClr>
-                </a:solidFill>
-                <a:latin typeface="Consolas" panose="020B0609020204030204" pitchFamily="49" charset="0"/>
-                <a:cs typeface="Consolas" panose="020B0609020204030204" pitchFamily="49" charset="0"/>
-              </a:rPr>
-              <a:t> commit</a:t>
-            </a:r>
-          </a:p>
-          <a:p>
-            <a:endParaRPr lang="en-US" sz="3200" dirty="0" smtClean="0">
-              <a:cs typeface="Consolas" panose="020B0609020204030204" pitchFamily="49" charset="0"/>
-            </a:endParaRPr>
-          </a:p>
-        </p:txBody>
-      </p:sp>
-    </p:spTree>
-    <p:extLst>
-      <p:ext uri="{BB962C8B-B14F-4D97-AF65-F5344CB8AC3E}">
-        <p14:creationId xmlns:p14="http://schemas.microsoft.com/office/powerpoint/2010/main" val="2832971978"/>
-      </p:ext>
-    </p:extLst>
-  </p:cSld>
-  <p:clrMapOvr>
-    <a:masterClrMapping/>
-  </p:clrMapOvr>
-</p:sld>
-</file>
-
-<file path=ppt/slides/slide54.xml><?xml version="1.0" encoding="utf-8"?>
-<p:sld xmlns:a="http://schemas.openxmlformats.org/drawingml/2006/main" xmlns:r="http://schemas.openxmlformats.org/officeDocument/2006/relationships" xmlns:p="http://schemas.openxmlformats.org/presentationml/2006/main">
-  <p:cSld>
-    <p:spTree>
-      <p:nvGrpSpPr>
-        <p:cNvPr id="1" name=""/>
-        <p:cNvGrpSpPr/>
-        <p:nvPr/>
-      </p:nvGrpSpPr>
-      <p:grpSpPr>
-        <a:xfrm>
-          <a:off x="0" y="0"/>
-          <a:ext cx="0" cy="0"/>
-          <a:chOff x="0" y="0"/>
-          <a:chExt cx="0" cy="0"/>
-        </a:xfrm>
-      </p:grpSpPr>
-      <p:sp>
-        <p:nvSpPr>
-          <p:cNvPr id="5" name="TextBox 4"/>
-          <p:cNvSpPr txBox="1"/>
-          <p:nvPr/>
-        </p:nvSpPr>
-        <p:spPr>
-          <a:xfrm>
-            <a:off x="481449" y="288758"/>
-            <a:ext cx="1435586" cy="769441"/>
-          </a:xfrm>
-          <a:prstGeom prst="rect">
-            <a:avLst/>
-          </a:prstGeom>
-          <a:noFill/>
-        </p:spPr>
-        <p:txBody>
-          <a:bodyPr wrap="none" rtlCol="0">
-            <a:spAutoFit/>
-          </a:bodyPr>
-          <a:lstStyle/>
-          <a:p>
-            <a:r>
-              <a:rPr lang="en-US" sz="4400" dirty="0" smtClean="0"/>
-              <a:t>More</a:t>
-            </a:r>
-            <a:endParaRPr lang="en-US" sz="4400" dirty="0"/>
-          </a:p>
-        </p:txBody>
-      </p:sp>
-      <p:cxnSp>
-        <p:nvCxnSpPr>
-          <p:cNvPr id="25" name="Straight Connector 24"/>
-          <p:cNvCxnSpPr/>
-          <p:nvPr/>
-        </p:nvCxnSpPr>
-        <p:spPr>
-          <a:xfrm>
-            <a:off x="1575632" y="2497978"/>
-            <a:ext cx="22282" cy="1742576"/>
-          </a:xfrm>
-          <a:prstGeom prst="line">
-            <a:avLst/>
-          </a:prstGeom>
-          <a:ln w="57150">
-            <a:solidFill>
-              <a:schemeClr val="bg1"/>
-            </a:solidFill>
-            <a:prstDash val="sysDot"/>
-          </a:ln>
-        </p:spPr>
-        <p:style>
-          <a:lnRef idx="1">
-            <a:schemeClr val="accent1"/>
-          </a:lnRef>
-          <a:fillRef idx="0">
-            <a:schemeClr val="accent1"/>
-          </a:fillRef>
-          <a:effectRef idx="0">
-            <a:schemeClr val="accent1"/>
-          </a:effectRef>
-          <a:fontRef idx="minor">
-            <a:schemeClr val="tx1"/>
-          </a:fontRef>
-        </p:style>
-      </p:cxnSp>
-      <p:sp>
-        <p:nvSpPr>
-          <p:cNvPr id="28" name="TextBox 27"/>
-          <p:cNvSpPr txBox="1"/>
-          <p:nvPr/>
-        </p:nvSpPr>
-        <p:spPr>
-          <a:xfrm>
-            <a:off x="481449" y="1137831"/>
             <a:ext cx="10115270" cy="5878532"/>
           </a:xfrm>
           <a:prstGeom prst="rect">
@@ -29437,7 +29729,7 @@
 </p:sld>
 </file>
 
-<file path=ppt/slides/slide55.xml><?xml version="1.0" encoding="utf-8"?>
+<file path=ppt/slides/slide54.xml><?xml version="1.0" encoding="utf-8"?>
 <p:sld xmlns:a="http://schemas.openxmlformats.org/drawingml/2006/main" xmlns:r="http://schemas.openxmlformats.org/officeDocument/2006/relationships" xmlns:p="http://schemas.openxmlformats.org/presentationml/2006/main">
   <p:cSld>
     <p:spTree>

</xml_diff>